<commit_message>
add skeleton code for DoublyLinkedList
</commit_message>
<xml_diff>
--- a/slides/datastructures/linked_list/LinkedLists.pptx
+++ b/slides/datastructures/linked_list/LinkedLists.pptx
@@ -614,7 +614,7 @@
             </a:r>
             <a:r>
               <a:rPr lang="zh-CN" altLang="en-US" dirty="0"/>
-              <a:t>，今天我们来学习单向和双向链表，两种非常有用的数据结构。本节课的内容会分成两部分，这是第一部分，在第二部分，我们会通过代码来实现一个双向链表。</a:t>
+              <a:t>，今天我们来学习单向和双向链表，它们是两种非常有用的数据结构。本节课的内容会分成两部分，这是第一部分，在第二部分，我们会通过代码来实现一个双向链表。</a:t>
             </a:r>
             <a:endParaRPr dirty="0"/>
           </a:p>
@@ -911,7 +911,23 @@
             </a:r>
             <a:r>
               <a:rPr lang="zh-CN" altLang="en-US" dirty="0"/>
-              <a:t>所在的节点。现在，我们已经准备就绪，可以插入元素</a:t>
+              <a:t>所在的节点。因为</a:t>
+            </a:r>
+            <a:r>
+              <a:rPr lang="en-US" altLang="zh-CN" dirty="0"/>
+              <a:t>23</a:t>
+            </a:r>
+            <a:r>
+              <a:rPr lang="zh-CN" altLang="en-US" dirty="0"/>
+              <a:t>在</a:t>
+            </a:r>
+            <a:r>
+              <a:rPr lang="en-US" altLang="zh-CN" dirty="0"/>
+              <a:t>7</a:t>
+            </a:r>
+            <a:r>
+              <a:rPr lang="zh-CN" altLang="en-US" dirty="0"/>
+              <a:t>的前面，所以现在，我们已经准备就绪，可以插入元素</a:t>
             </a:r>
             <a:r>
               <a:rPr lang="en-US" altLang="zh-CN" dirty="0"/>
@@ -1351,7 +1367,7 @@
           <a:p>
             <a:r>
               <a:rPr kumimoji="1" lang="zh-CN" altLang="en-US" dirty="0"/>
-              <a:t>好，到这边我们就完整演示了了单向链表的插入。</a:t>
+              <a:t>好，到这边我们就完整演示了如何在单向链表中插入一个节点。</a:t>
             </a:r>
           </a:p>
         </p:txBody>
@@ -2111,7 +2127,7 @@
             </a:r>
             <a:r>
               <a:rPr lang="zh-CN" altLang="en-US" dirty="0"/>
-              <a:t>向后遍历到元素</a:t>
+              <a:t>向前遍历到元素</a:t>
             </a:r>
             <a:r>
               <a:rPr lang="en-US" altLang="zh-CN" dirty="0"/>
@@ -2327,7 +2343,7 @@
             </a:r>
             <a:r>
               <a:rPr lang="zh-CN" altLang="en-US" dirty="0"/>
-              <a:t>处在正确的位置。</a:t>
+              <a:t>已经处在正确的位置。</a:t>
             </a:r>
             <a:endParaRPr dirty="0"/>
           </a:p>
@@ -2387,7 +2403,7 @@
           <a:p>
             <a:r>
               <a:rPr kumimoji="1" lang="zh-CN" altLang="en-US" dirty="0"/>
-              <a:t>到这边，我们就完整演示了双向链表的插入。</a:t>
+              <a:t>到这边，我们就完整演示了如何在双向链表中插入节点。</a:t>
             </a:r>
           </a:p>
         </p:txBody>
@@ -2990,7 +3006,7 @@
             </a:r>
             <a:r>
               <a:rPr lang="zh-CN" altLang="en-US" dirty="0"/>
-              <a:t>再向后移动一个位置。注意，元素</a:t>
+              <a:t>再向后移动一个位置。注意，现在元素</a:t>
             </a:r>
             <a:r>
               <a:rPr lang="en-US" altLang="zh-CN" dirty="0"/>
@@ -2998,7 +3014,7 @@
             </a:r>
             <a:r>
               <a:rPr lang="zh-CN" altLang="en-US" dirty="0"/>
-              <a:t>所在节点被标记为红色，现在其实我们已经可以移除</a:t>
+              <a:t>所在节点被标记为红色了，也就是说现在我们可以开始移除</a:t>
             </a:r>
             <a:r>
               <a:rPr lang="en-US" altLang="zh-CN" dirty="0"/>
@@ -3006,7 +3022,7 @@
             </a:r>
             <a:r>
               <a:rPr lang="zh-CN" altLang="en-US" dirty="0"/>
-              <a:t>了，但是为了演示，我们先留着它。</a:t>
+              <a:t>了。</a:t>
             </a:r>
             <a:endParaRPr dirty="0"/>
           </a:p>
@@ -3089,7 +3105,7 @@
             </a:r>
             <a:r>
               <a:rPr lang="zh-CN" altLang="en-US" dirty="0"/>
-              <a:t>指向节点的下一个节点指针指向元素</a:t>
+              <a:t>指向节点的下一个指针指向元素</a:t>
             </a:r>
             <a:r>
               <a:rPr lang="en-US" altLang="zh-CN" dirty="0"/>
@@ -3105,7 +3121,7 @@
             </a:r>
             <a:r>
               <a:rPr lang="zh-CN" altLang="en-US" dirty="0"/>
-              <a:t>了，因为它已经没有用处。</a:t>
+              <a:t>了，因为它已经没有用处了。</a:t>
             </a:r>
             <a:endParaRPr dirty="0"/>
           </a:p>
@@ -3348,7 +3364,7 @@
             </a:pPr>
             <a:r>
               <a:rPr kumimoji="1" lang="zh-CN" altLang="en-US" dirty="0"/>
-              <a:t>到这边，我们就完整演示了单向链表的移除操作。</a:t>
+              <a:t>到这边，我们就完整演示了如何从单向链表中移除一个节点。</a:t>
             </a:r>
           </a:p>
           <a:p>
@@ -3430,7 +3446,7 @@
           <a:p>
             <a:r>
               <a:rPr lang="zh-CN" altLang="en-US" dirty="0"/>
-              <a:t>好的，现在我们来看如何在双向链表中移除节点。对比单向链表的移除，在双向链表中移除会更简单。基本算法思想是类似的，我们先要找到要移除的节点，但是这次我们只需要一个指针，因为双向链表中的每一个节点，都有前向和后向两个指针。</a:t>
+              <a:t>好的，现在我们来看如何在双向链表中移除节点。对比单向链表的移除，在双向链表中移除节点会更简单。两者的基本算法思想是类似的，我们先要找到要移除的节点，但是这次我们只需要一个指针，因为双向链表中的每一个节点，都有前向和后向两个指针。</a:t>
             </a:r>
             <a:endParaRPr dirty="0"/>
           </a:p>
@@ -3935,7 +3951,7 @@
             </a:r>
             <a:r>
               <a:rPr lang="zh-CN" altLang="en-US" dirty="0"/>
-              <a:t>的下一个节点指针指向元素</a:t>
+              <a:t>的下一个指针指向元素</a:t>
             </a:r>
             <a:r>
               <a:rPr lang="en-US" altLang="zh-CN" dirty="0"/>
@@ -4066,7 +4082,7 @@
             </a:r>
             <a:r>
               <a:rPr lang="zh-CN" altLang="en-US" dirty="0"/>
-              <a:t>的前一个节点指针，指向元素</a:t>
+              <a:t>的前一个指针，指向元素</a:t>
             </a:r>
             <a:r>
               <a:rPr lang="en-US" altLang="zh-CN" dirty="0"/>
@@ -4416,7 +4432,7 @@
           <a:p>
             <a:r>
               <a:rPr lang="zh-CN" altLang="en-US" dirty="0"/>
-              <a:t>查找的时间复杂度都是线性的，因为在最坏的情况下，我们要查找的元素在链表中并不存在，于是我们需要遍历链表的所有元素。</a:t>
+              <a:t>查找的时间复杂度都是线性的，因为在最坏的情况下，我们要查找的元素在链表中并不存在，于是我们需要遍历链表中的所有元素。</a:t>
             </a:r>
             <a:endParaRPr dirty="0"/>
           </a:p>
@@ -4515,7 +4531,7 @@
             </a:r>
             <a:r>
               <a:rPr lang="zh-CN" altLang="en-US" dirty="0"/>
-              <a:t>，从单向链表中移除元素，所需时间是线性级的，为什么呢？原因在于，即便我们有对尾节点的引用，我们也无法简单回到上一个节点，并设置新的尾节点。所以，我们还是需要每次从头节点开始，依次遍历找到尾部节点的前一个节点，才能移除尾部节点。</a:t>
+              <a:t>，从单向链表中移除元素，所需时间是线性级的，为什么呢？原因在于，即便我们有对尾节点的引用，我们也无法简单回到上一个节点，然后设置新的尾节点。所以，我们还是需要每次从头节点开始，依次遍历找到尾部节点的前一个节点，才能移除尾部节点。</a:t>
             </a:r>
             <a:endParaRPr lang="en-US" dirty="0"/>
           </a:p>
@@ -4529,7 +4545,7 @@
             </a:r>
             <a:r>
               <a:rPr lang="zh-CN" altLang="en-US" dirty="0"/>
-              <a:t>。因为它的每个节点都具有前向指针，可以很方便移除最后一个节点，所以复杂度是常量级的。</a:t>
+              <a:t>。因为它的每个节点都具有前向指针，可以很方便移除最后一个节点，所以说复杂度是常量级的。</a:t>
             </a:r>
             <a:endParaRPr lang="en-US" dirty="0"/>
           </a:p>
@@ -4549,6 +4565,26 @@
               <a:rPr lang="zh-CN" altLang="en-US" dirty="0"/>
               <a:t>个节点。</a:t>
             </a:r>
+            <a:endParaRPr lang="en-US" altLang="zh-CN" dirty="0"/>
+          </a:p>
+          <a:p>
+            <a:endParaRPr lang="en-US" dirty="0"/>
+          </a:p>
+          <a:p>
+            <a:r>
+              <a:rPr lang="zh-CN" altLang="en-US" dirty="0"/>
+              <a:t>好的，关于单向和双向链表的内容，我就先介绍到这里。在下节课中，我会以现场编程方式，来展示如何实现一个双向链表，好，我们下</a:t>
+            </a:r>
+            <a:r>
+              <a:rPr lang="zh-CN" altLang="en-US"/>
+              <a:t>节课再见！</a:t>
+            </a:r>
+            <a:endParaRPr lang="en-US" altLang="zh-CN" dirty="0"/>
+          </a:p>
+          <a:p>
+            <a:endParaRPr lang="en-US" dirty="0"/>
+          </a:p>
+          <a:p>
             <a:endParaRPr dirty="0"/>
           </a:p>
         </p:txBody>
@@ -4622,7 +4658,7 @@
           <a:p>
             <a:r>
               <a:rPr lang="zh-CN" altLang="en-US" dirty="0"/>
-              <a:t>既然已经知道了什么是链表，下面我来说明数组的使用场景。</a:t>
+              <a:t>既然已经知道了什么是链表，下面我来介绍数组的使用场景。</a:t>
             </a:r>
             <a:endParaRPr dirty="0"/>
           </a:p>
@@ -4722,7 +4758,7 @@
             </a:r>
             <a:r>
               <a:rPr lang="zh-CN" altLang="en-US" dirty="0"/>
-              <a:t>，在哈希表的中，经常用链表来实现所谓分离链表法</a:t>
+              <a:t>，在哈希表的实现中，经常用链表来实现所谓分离链表法</a:t>
             </a:r>
             <a:r>
               <a:rPr lang="en-US" altLang="zh-CN" dirty="0"/>
@@ -4730,7 +4766,17 @@
             </a:r>
             <a:r>
               <a:rPr lang="zh-CN" altLang="en-US" dirty="0"/>
-              <a:t>，目的是为了解决哈希冲突问题。另外，链表也可以用于实现图的邻接表，关于图和邻接表相关内容，我们在后续视频中会讲解。</a:t>
+              <a:t>，目的是为了解决哈希冲突问题。</a:t>
+            </a:r>
+            <a:endParaRPr lang="en-US" altLang="zh-CN" dirty="0"/>
+          </a:p>
+          <a:p>
+            <a:endParaRPr lang="en-US" altLang="zh-CN" dirty="0"/>
+          </a:p>
+          <a:p>
+            <a:r>
+              <a:rPr lang="zh-CN" altLang="en-US" dirty="0"/>
+              <a:t>另外，链表也可以用于实现图的邻接表。关于哈希表、图和邻接表等相关内容，我们在后续视频中会讲解。</a:t>
             </a:r>
             <a:endParaRPr lang="en-US" dirty="0"/>
           </a:p>
@@ -4860,7 +4906,17 @@
             </a:r>
             <a:r>
               <a:rPr lang="zh-CN" altLang="en-US" dirty="0"/>
-              <a:t>。链表中的节点一般都包含数据，还有指向下一个节点的指针或者引用，这个我们之前已经讲过。根据具体的编程语言，节点可以用结构体</a:t>
+              <a:t>。链表中的节点一般都包含数据，还有指向下一个节点的指针或者引用，这个我们之前已经讲过。</a:t>
+            </a:r>
+            <a:endParaRPr lang="en-US" altLang="zh-CN" dirty="0"/>
+          </a:p>
+          <a:p>
+            <a:endParaRPr lang="en-US" altLang="zh-CN" dirty="0"/>
+          </a:p>
+          <a:p>
+            <a:r>
+              <a:rPr lang="zh-CN" altLang="en-US" dirty="0"/>
+              <a:t>根据具体的编程语言的不同，节点可以用结构体</a:t>
             </a:r>
             <a:r>
               <a:rPr lang="en-US" altLang="zh-CN" dirty="0"/>
@@ -4868,7 +4924,7 @@
             </a:r>
             <a:r>
               <a:rPr lang="zh-CN" altLang="en-US" dirty="0"/>
-              <a:t>来表示，也可以用</a:t>
+              <a:t>来表示，也可以用类</a:t>
             </a:r>
             <a:r>
               <a:rPr lang="en-US" altLang="zh-CN" dirty="0"/>
@@ -4876,7 +4932,7 @@
             </a:r>
             <a:r>
               <a:rPr lang="zh-CN" altLang="en-US" dirty="0"/>
-              <a:t>类来表示，具体实现细节我们后面会看源代码。</a:t>
+              <a:t>来表示，关于具体实现细节我们后面会看源代码。</a:t>
             </a:r>
             <a:endParaRPr lang="en-US" dirty="0"/>
           </a:p>
@@ -5156,7 +5212,7 @@
           <a:p>
             <a:r>
               <a:rPr lang="zh-CN" altLang="en-US" dirty="0"/>
-              <a:t>关于双向链表，它的一个优势在于，通过尾指针，你可以很容易对链表进行反向遍历。另外，如果你要移除链表中的某个节点，只要有对这个节点的引用，你就可以在常量时间内移除这个节点，然后也很容易填补因移除而造成的空洞，因为你可以简单访问被移除节点的前一个和后一个节点。而对于单向链表来说，移除其中的一个节点是相对比较麻烦的。</a:t>
+              <a:t>关于双向链表，它的一个优势在于，通过尾指针，你可以很容易对链表进行反向遍历。另外，如果你要移除链表中的某个节点，只要有对这个节点的引用，你就可以在常量时间内移除这个节点，然后也很容易填补因移除而造成的空洞，因为你可以简单访问被移除节点的前一个和后一个节点。但是对于单向链表来说，移除其中的一个节点是相对比较麻烦的。</a:t>
             </a:r>
             <a:endParaRPr dirty="0"/>
           </a:p>
@@ -7098,7 +7154,7 @@
           </a:ln>
           <a:extLst>
             <a:ext uri="{C572A759-6A51-4108-AA02-DFA0A04FC94B}">
-              <ma14:wrappingTextBoxFlag xmlns:ma14="http://schemas.microsoft.com/office/mac/drawingml/2011/main" xmlns="" val="1"/>
+              <ma14:wrappingTextBoxFlag xmlns="" xmlns:ma14="http://schemas.microsoft.com/office/mac/drawingml/2011/main" val="1"/>
             </a:ext>
           </a:extLst>
         </p:spPr>
@@ -7137,7 +7193,7 @@
           </a:ln>
           <a:extLst>
             <a:ext uri="{C572A759-6A51-4108-AA02-DFA0A04FC94B}">
-              <ma14:wrappingTextBoxFlag xmlns:ma14="http://schemas.microsoft.com/office/mac/drawingml/2011/main" xmlns="" val="1"/>
+              <ma14:wrappingTextBoxFlag xmlns="" xmlns:ma14="http://schemas.microsoft.com/office/mac/drawingml/2011/main" val="1"/>
             </a:ext>
           </a:extLst>
         </p:spPr>
@@ -8234,7 +8290,7 @@
           </a:ln>
           <a:extLst>
             <a:ext uri="{C572A759-6A51-4108-AA02-DFA0A04FC94B}">
-              <ma14:wrappingTextBoxFlag xmlns:ma14="http://schemas.microsoft.com/office/mac/drawingml/2011/main" xmlns="" val="1"/>
+              <ma14:wrappingTextBoxFlag xmlns="" xmlns:ma14="http://schemas.microsoft.com/office/mac/drawingml/2011/main" val="1"/>
             </a:ext>
           </a:extLst>
         </p:spPr>
@@ -8279,7 +8335,7 @@
           </a:ln>
           <a:extLst>
             <a:ext uri="{C572A759-6A51-4108-AA02-DFA0A04FC94B}">
-              <ma14:wrappingTextBoxFlag xmlns:ma14="http://schemas.microsoft.com/office/mac/drawingml/2011/main" xmlns="" val="1"/>
+              <ma14:wrappingTextBoxFlag xmlns="" xmlns:ma14="http://schemas.microsoft.com/office/mac/drawingml/2011/main" val="1"/>
             </a:ext>
           </a:extLst>
         </p:spPr>
@@ -8324,7 +8380,7 @@
           </a:ln>
           <a:extLst>
             <a:ext uri="{C572A759-6A51-4108-AA02-DFA0A04FC94B}">
-              <ma14:wrappingTextBoxFlag xmlns:ma14="http://schemas.microsoft.com/office/mac/drawingml/2011/main" xmlns="" val="1"/>
+              <ma14:wrappingTextBoxFlag xmlns="" xmlns:ma14="http://schemas.microsoft.com/office/mac/drawingml/2011/main" val="1"/>
             </a:ext>
           </a:extLst>
         </p:spPr>
@@ -8369,7 +8425,7 @@
           </a:ln>
           <a:extLst>
             <a:ext uri="{C572A759-6A51-4108-AA02-DFA0A04FC94B}">
-              <ma14:wrappingTextBoxFlag xmlns:ma14="http://schemas.microsoft.com/office/mac/drawingml/2011/main" xmlns="" val="1"/>
+              <ma14:wrappingTextBoxFlag xmlns="" xmlns:ma14="http://schemas.microsoft.com/office/mac/drawingml/2011/main" val="1"/>
             </a:ext>
           </a:extLst>
         </p:spPr>
@@ -8525,7 +8581,7 @@
           </a:ln>
           <a:extLst>
             <a:ext uri="{C572A759-6A51-4108-AA02-DFA0A04FC94B}">
-              <ma14:wrappingTextBoxFlag xmlns:ma14="http://schemas.microsoft.com/office/mac/drawingml/2011/main" xmlns="" val="1"/>
+              <ma14:wrappingTextBoxFlag xmlns="" xmlns:ma14="http://schemas.microsoft.com/office/mac/drawingml/2011/main" val="1"/>
             </a:ext>
           </a:extLst>
         </p:spPr>
@@ -8604,7 +8660,7 @@
           </a:ln>
           <a:extLst>
             <a:ext uri="{C572A759-6A51-4108-AA02-DFA0A04FC94B}">
-              <ma14:wrappingTextBoxFlag xmlns:ma14="http://schemas.microsoft.com/office/mac/drawingml/2011/main" xmlns="" val="1"/>
+              <ma14:wrappingTextBoxFlag xmlns="" xmlns:ma14="http://schemas.microsoft.com/office/mac/drawingml/2011/main" val="1"/>
             </a:ext>
           </a:extLst>
         </p:spPr>
@@ -8689,7 +8745,7 @@
           </a:ln>
           <a:extLst>
             <a:ext uri="{C572A759-6A51-4108-AA02-DFA0A04FC94B}">
-              <ma14:wrappingTextBoxFlag xmlns:ma14="http://schemas.microsoft.com/office/mac/drawingml/2011/main" xmlns="" val="1"/>
+              <ma14:wrappingTextBoxFlag xmlns="" xmlns:ma14="http://schemas.microsoft.com/office/mac/drawingml/2011/main" val="1"/>
             </a:ext>
           </a:extLst>
         </p:spPr>
@@ -8805,7 +8861,7 @@
           </a:ln>
           <a:extLst>
             <a:ext uri="{C572A759-6A51-4108-AA02-DFA0A04FC94B}">
-              <ma14:wrappingTextBoxFlag xmlns:ma14="http://schemas.microsoft.com/office/mac/drawingml/2011/main" xmlns="" val="1"/>
+              <ma14:wrappingTextBoxFlag xmlns="" xmlns:ma14="http://schemas.microsoft.com/office/mac/drawingml/2011/main" val="1"/>
             </a:ext>
           </a:extLst>
         </p:spPr>
@@ -8850,7 +8906,7 @@
           </a:ln>
           <a:extLst>
             <a:ext uri="{C572A759-6A51-4108-AA02-DFA0A04FC94B}">
-              <ma14:wrappingTextBoxFlag xmlns:ma14="http://schemas.microsoft.com/office/mac/drawingml/2011/main" xmlns="" val="1"/>
+              <ma14:wrappingTextBoxFlag xmlns="" xmlns:ma14="http://schemas.microsoft.com/office/mac/drawingml/2011/main" val="1"/>
             </a:ext>
           </a:extLst>
         </p:spPr>
@@ -8895,7 +8951,7 @@
           </a:ln>
           <a:extLst>
             <a:ext uri="{C572A759-6A51-4108-AA02-DFA0A04FC94B}">
-              <ma14:wrappingTextBoxFlag xmlns:ma14="http://schemas.microsoft.com/office/mac/drawingml/2011/main" xmlns="" val="1"/>
+              <ma14:wrappingTextBoxFlag xmlns="" xmlns:ma14="http://schemas.microsoft.com/office/mac/drawingml/2011/main" val="1"/>
             </a:ext>
           </a:extLst>
         </p:spPr>
@@ -8940,7 +8996,7 @@
           </a:ln>
           <a:extLst>
             <a:ext uri="{C572A759-6A51-4108-AA02-DFA0A04FC94B}">
-              <ma14:wrappingTextBoxFlag xmlns:ma14="http://schemas.microsoft.com/office/mac/drawingml/2011/main" xmlns="" val="1"/>
+              <ma14:wrappingTextBoxFlag xmlns="" xmlns:ma14="http://schemas.microsoft.com/office/mac/drawingml/2011/main" val="1"/>
             </a:ext>
           </a:extLst>
         </p:spPr>
@@ -9096,7 +9152,7 @@
           </a:ln>
           <a:extLst>
             <a:ext uri="{C572A759-6A51-4108-AA02-DFA0A04FC94B}">
-              <ma14:wrappingTextBoxFlag xmlns:ma14="http://schemas.microsoft.com/office/mac/drawingml/2011/main" xmlns="" val="1"/>
+              <ma14:wrappingTextBoxFlag xmlns="" xmlns:ma14="http://schemas.microsoft.com/office/mac/drawingml/2011/main" val="1"/>
             </a:ext>
           </a:extLst>
         </p:spPr>
@@ -9175,7 +9231,7 @@
           </a:ln>
           <a:extLst>
             <a:ext uri="{C572A759-6A51-4108-AA02-DFA0A04FC94B}">
-              <ma14:wrappingTextBoxFlag xmlns:ma14="http://schemas.microsoft.com/office/mac/drawingml/2011/main" xmlns="" val="1"/>
+              <ma14:wrappingTextBoxFlag xmlns="" xmlns:ma14="http://schemas.microsoft.com/office/mac/drawingml/2011/main" val="1"/>
             </a:ext>
           </a:extLst>
         </p:spPr>
@@ -9260,7 +9316,7 @@
           </a:ln>
           <a:extLst>
             <a:ext uri="{C572A759-6A51-4108-AA02-DFA0A04FC94B}">
-              <ma14:wrappingTextBoxFlag xmlns:ma14="http://schemas.microsoft.com/office/mac/drawingml/2011/main" xmlns="" val="1"/>
+              <ma14:wrappingTextBoxFlag xmlns="" xmlns:ma14="http://schemas.microsoft.com/office/mac/drawingml/2011/main" val="1"/>
             </a:ext>
           </a:extLst>
         </p:spPr>
@@ -9345,7 +9401,7 @@
           </a:ln>
           <a:extLst>
             <a:ext uri="{C572A759-6A51-4108-AA02-DFA0A04FC94B}">
-              <ma14:wrappingTextBoxFlag xmlns:ma14="http://schemas.microsoft.com/office/mac/drawingml/2011/main" xmlns="" val="1"/>
+              <ma14:wrappingTextBoxFlag xmlns="" xmlns:ma14="http://schemas.microsoft.com/office/mac/drawingml/2011/main" val="1"/>
             </a:ext>
           </a:extLst>
         </p:spPr>
@@ -9449,7 +9505,7 @@
           </a:ln>
           <a:extLst>
             <a:ext uri="{C572A759-6A51-4108-AA02-DFA0A04FC94B}">
-              <ma14:wrappingTextBoxFlag xmlns:ma14="http://schemas.microsoft.com/office/mac/drawingml/2011/main" xmlns="" val="1"/>
+              <ma14:wrappingTextBoxFlag xmlns="" xmlns:ma14="http://schemas.microsoft.com/office/mac/drawingml/2011/main" val="1"/>
             </a:ext>
           </a:extLst>
         </p:spPr>
@@ -9494,7 +9550,7 @@
           </a:ln>
           <a:extLst>
             <a:ext uri="{C572A759-6A51-4108-AA02-DFA0A04FC94B}">
-              <ma14:wrappingTextBoxFlag xmlns:ma14="http://schemas.microsoft.com/office/mac/drawingml/2011/main" xmlns="" val="1"/>
+              <ma14:wrappingTextBoxFlag xmlns="" xmlns:ma14="http://schemas.microsoft.com/office/mac/drawingml/2011/main" val="1"/>
             </a:ext>
           </a:extLst>
         </p:spPr>
@@ -9539,7 +9595,7 @@
           </a:ln>
           <a:extLst>
             <a:ext uri="{C572A759-6A51-4108-AA02-DFA0A04FC94B}">
-              <ma14:wrappingTextBoxFlag xmlns:ma14="http://schemas.microsoft.com/office/mac/drawingml/2011/main" xmlns="" val="1"/>
+              <ma14:wrappingTextBoxFlag xmlns="" xmlns:ma14="http://schemas.microsoft.com/office/mac/drawingml/2011/main" val="1"/>
             </a:ext>
           </a:extLst>
         </p:spPr>
@@ -9584,7 +9640,7 @@
           </a:ln>
           <a:extLst>
             <a:ext uri="{C572A759-6A51-4108-AA02-DFA0A04FC94B}">
-              <ma14:wrappingTextBoxFlag xmlns:ma14="http://schemas.microsoft.com/office/mac/drawingml/2011/main" xmlns="" val="1"/>
+              <ma14:wrappingTextBoxFlag xmlns="" xmlns:ma14="http://schemas.microsoft.com/office/mac/drawingml/2011/main" val="1"/>
             </a:ext>
           </a:extLst>
         </p:spPr>
@@ -9740,7 +9796,7 @@
           </a:ln>
           <a:extLst>
             <a:ext uri="{C572A759-6A51-4108-AA02-DFA0A04FC94B}">
-              <ma14:wrappingTextBoxFlag xmlns:ma14="http://schemas.microsoft.com/office/mac/drawingml/2011/main" xmlns="" val="1"/>
+              <ma14:wrappingTextBoxFlag xmlns="" xmlns:ma14="http://schemas.microsoft.com/office/mac/drawingml/2011/main" val="1"/>
             </a:ext>
           </a:extLst>
         </p:spPr>
@@ -9819,7 +9875,7 @@
           </a:ln>
           <a:extLst>
             <a:ext uri="{C572A759-6A51-4108-AA02-DFA0A04FC94B}">
-              <ma14:wrappingTextBoxFlag xmlns:ma14="http://schemas.microsoft.com/office/mac/drawingml/2011/main" xmlns="" val="1"/>
+              <ma14:wrappingTextBoxFlag xmlns="" xmlns:ma14="http://schemas.microsoft.com/office/mac/drawingml/2011/main" val="1"/>
             </a:ext>
           </a:extLst>
         </p:spPr>
@@ -9904,7 +9960,7 @@
           </a:ln>
           <a:extLst>
             <a:ext uri="{C572A759-6A51-4108-AA02-DFA0A04FC94B}">
-              <ma14:wrappingTextBoxFlag xmlns:ma14="http://schemas.microsoft.com/office/mac/drawingml/2011/main" xmlns="" val="1"/>
+              <ma14:wrappingTextBoxFlag xmlns="" xmlns:ma14="http://schemas.microsoft.com/office/mac/drawingml/2011/main" val="1"/>
             </a:ext>
           </a:extLst>
         </p:spPr>
@@ -9989,7 +10045,7 @@
           </a:ln>
           <a:extLst>
             <a:ext uri="{C572A759-6A51-4108-AA02-DFA0A04FC94B}">
-              <ma14:wrappingTextBoxFlag xmlns:ma14="http://schemas.microsoft.com/office/mac/drawingml/2011/main" xmlns="" val="1"/>
+              <ma14:wrappingTextBoxFlag xmlns="" xmlns:ma14="http://schemas.microsoft.com/office/mac/drawingml/2011/main" val="1"/>
             </a:ext>
           </a:extLst>
         </p:spPr>
@@ -10093,7 +10149,7 @@
           </a:ln>
           <a:extLst>
             <a:ext uri="{C572A759-6A51-4108-AA02-DFA0A04FC94B}">
-              <ma14:wrappingTextBoxFlag xmlns:ma14="http://schemas.microsoft.com/office/mac/drawingml/2011/main" xmlns="" val="1"/>
+              <ma14:wrappingTextBoxFlag xmlns="" xmlns:ma14="http://schemas.microsoft.com/office/mac/drawingml/2011/main" val="1"/>
             </a:ext>
           </a:extLst>
         </p:spPr>
@@ -10138,7 +10194,7 @@
           </a:ln>
           <a:extLst>
             <a:ext uri="{C572A759-6A51-4108-AA02-DFA0A04FC94B}">
-              <ma14:wrappingTextBoxFlag xmlns:ma14="http://schemas.microsoft.com/office/mac/drawingml/2011/main" xmlns="" val="1"/>
+              <ma14:wrappingTextBoxFlag xmlns="" xmlns:ma14="http://schemas.microsoft.com/office/mac/drawingml/2011/main" val="1"/>
             </a:ext>
           </a:extLst>
         </p:spPr>
@@ -10183,7 +10239,7 @@
           </a:ln>
           <a:extLst>
             <a:ext uri="{C572A759-6A51-4108-AA02-DFA0A04FC94B}">
-              <ma14:wrappingTextBoxFlag xmlns:ma14="http://schemas.microsoft.com/office/mac/drawingml/2011/main" xmlns="" val="1"/>
+              <ma14:wrappingTextBoxFlag xmlns="" xmlns:ma14="http://schemas.microsoft.com/office/mac/drawingml/2011/main" val="1"/>
             </a:ext>
           </a:extLst>
         </p:spPr>
@@ -10228,7 +10284,7 @@
           </a:ln>
           <a:extLst>
             <a:ext uri="{C572A759-6A51-4108-AA02-DFA0A04FC94B}">
-              <ma14:wrappingTextBoxFlag xmlns:ma14="http://schemas.microsoft.com/office/mac/drawingml/2011/main" xmlns="" val="1"/>
+              <ma14:wrappingTextBoxFlag xmlns="" xmlns:ma14="http://schemas.microsoft.com/office/mac/drawingml/2011/main" val="1"/>
             </a:ext>
           </a:extLst>
         </p:spPr>
@@ -10384,7 +10440,7 @@
           </a:ln>
           <a:extLst>
             <a:ext uri="{C572A759-6A51-4108-AA02-DFA0A04FC94B}">
-              <ma14:wrappingTextBoxFlag xmlns:ma14="http://schemas.microsoft.com/office/mac/drawingml/2011/main" xmlns="" val="1"/>
+              <ma14:wrappingTextBoxFlag xmlns="" xmlns:ma14="http://schemas.microsoft.com/office/mac/drawingml/2011/main" val="1"/>
             </a:ext>
           </a:extLst>
         </p:spPr>
@@ -10463,7 +10519,7 @@
           </a:ln>
           <a:extLst>
             <a:ext uri="{C572A759-6A51-4108-AA02-DFA0A04FC94B}">
-              <ma14:wrappingTextBoxFlag xmlns:ma14="http://schemas.microsoft.com/office/mac/drawingml/2011/main" xmlns="" val="1"/>
+              <ma14:wrappingTextBoxFlag xmlns="" xmlns:ma14="http://schemas.microsoft.com/office/mac/drawingml/2011/main" val="1"/>
             </a:ext>
           </a:extLst>
         </p:spPr>
@@ -10548,7 +10604,7 @@
           </a:ln>
           <a:extLst>
             <a:ext uri="{C572A759-6A51-4108-AA02-DFA0A04FC94B}">
-              <ma14:wrappingTextBoxFlag xmlns:ma14="http://schemas.microsoft.com/office/mac/drawingml/2011/main" xmlns="" val="1"/>
+              <ma14:wrappingTextBoxFlag xmlns="" xmlns:ma14="http://schemas.microsoft.com/office/mac/drawingml/2011/main" val="1"/>
             </a:ext>
           </a:extLst>
         </p:spPr>
@@ -10633,7 +10689,7 @@
           </a:ln>
           <a:extLst>
             <a:ext uri="{C572A759-6A51-4108-AA02-DFA0A04FC94B}">
-              <ma14:wrappingTextBoxFlag xmlns:ma14="http://schemas.microsoft.com/office/mac/drawingml/2011/main" xmlns="" val="1"/>
+              <ma14:wrappingTextBoxFlag xmlns="" xmlns:ma14="http://schemas.microsoft.com/office/mac/drawingml/2011/main" val="1"/>
             </a:ext>
           </a:extLst>
         </p:spPr>
@@ -10679,7 +10735,7 @@
           </a:ln>
           <a:extLst>
             <a:ext uri="{C572A759-6A51-4108-AA02-DFA0A04FC94B}">
-              <ma14:wrappingTextBoxFlag xmlns:ma14="http://schemas.microsoft.com/office/mac/drawingml/2011/main" xmlns="" val="1"/>
+              <ma14:wrappingTextBoxFlag xmlns="" xmlns:ma14="http://schemas.microsoft.com/office/mac/drawingml/2011/main" val="1"/>
             </a:ext>
           </a:extLst>
         </p:spPr>
@@ -10790,7 +10846,7 @@
           </a:ln>
           <a:extLst>
             <a:ext uri="{C572A759-6A51-4108-AA02-DFA0A04FC94B}">
-              <ma14:wrappingTextBoxFlag xmlns:ma14="http://schemas.microsoft.com/office/mac/drawingml/2011/main" xmlns="" val="1"/>
+              <ma14:wrappingTextBoxFlag xmlns="" xmlns:ma14="http://schemas.microsoft.com/office/mac/drawingml/2011/main" val="1"/>
             </a:ext>
           </a:extLst>
         </p:spPr>
@@ -10835,7 +10891,7 @@
           </a:ln>
           <a:extLst>
             <a:ext uri="{C572A759-6A51-4108-AA02-DFA0A04FC94B}">
-              <ma14:wrappingTextBoxFlag xmlns:ma14="http://schemas.microsoft.com/office/mac/drawingml/2011/main" xmlns="" val="1"/>
+              <ma14:wrappingTextBoxFlag xmlns="" xmlns:ma14="http://schemas.microsoft.com/office/mac/drawingml/2011/main" val="1"/>
             </a:ext>
           </a:extLst>
         </p:spPr>
@@ -10880,7 +10936,7 @@
           </a:ln>
           <a:extLst>
             <a:ext uri="{C572A759-6A51-4108-AA02-DFA0A04FC94B}">
-              <ma14:wrappingTextBoxFlag xmlns:ma14="http://schemas.microsoft.com/office/mac/drawingml/2011/main" xmlns="" val="1"/>
+              <ma14:wrappingTextBoxFlag xmlns="" xmlns:ma14="http://schemas.microsoft.com/office/mac/drawingml/2011/main" val="1"/>
             </a:ext>
           </a:extLst>
         </p:spPr>
@@ -10925,7 +10981,7 @@
           </a:ln>
           <a:extLst>
             <a:ext uri="{C572A759-6A51-4108-AA02-DFA0A04FC94B}">
-              <ma14:wrappingTextBoxFlag xmlns:ma14="http://schemas.microsoft.com/office/mac/drawingml/2011/main" xmlns="" val="1"/>
+              <ma14:wrappingTextBoxFlag xmlns="" xmlns:ma14="http://schemas.microsoft.com/office/mac/drawingml/2011/main" val="1"/>
             </a:ext>
           </a:extLst>
         </p:spPr>
@@ -11081,7 +11137,7 @@
           </a:ln>
           <a:extLst>
             <a:ext uri="{C572A759-6A51-4108-AA02-DFA0A04FC94B}">
-              <ma14:wrappingTextBoxFlag xmlns:ma14="http://schemas.microsoft.com/office/mac/drawingml/2011/main" xmlns="" val="1"/>
+              <ma14:wrappingTextBoxFlag xmlns="" xmlns:ma14="http://schemas.microsoft.com/office/mac/drawingml/2011/main" val="1"/>
             </a:ext>
           </a:extLst>
         </p:spPr>
@@ -11160,7 +11216,7 @@
           </a:ln>
           <a:extLst>
             <a:ext uri="{C572A759-6A51-4108-AA02-DFA0A04FC94B}">
-              <ma14:wrappingTextBoxFlag xmlns:ma14="http://schemas.microsoft.com/office/mac/drawingml/2011/main" xmlns="" val="1"/>
+              <ma14:wrappingTextBoxFlag xmlns="" xmlns:ma14="http://schemas.microsoft.com/office/mac/drawingml/2011/main" val="1"/>
             </a:ext>
           </a:extLst>
         </p:spPr>
@@ -11245,7 +11301,7 @@
           </a:ln>
           <a:extLst>
             <a:ext uri="{C572A759-6A51-4108-AA02-DFA0A04FC94B}">
-              <ma14:wrappingTextBoxFlag xmlns:ma14="http://schemas.microsoft.com/office/mac/drawingml/2011/main" xmlns="" val="1"/>
+              <ma14:wrappingTextBoxFlag xmlns="" xmlns:ma14="http://schemas.microsoft.com/office/mac/drawingml/2011/main" val="1"/>
             </a:ext>
           </a:extLst>
         </p:spPr>
@@ -11330,7 +11386,7 @@
           </a:ln>
           <a:extLst>
             <a:ext uri="{C572A759-6A51-4108-AA02-DFA0A04FC94B}">
-              <ma14:wrappingTextBoxFlag xmlns:ma14="http://schemas.microsoft.com/office/mac/drawingml/2011/main" xmlns="" val="1"/>
+              <ma14:wrappingTextBoxFlag xmlns="" xmlns:ma14="http://schemas.microsoft.com/office/mac/drawingml/2011/main" val="1"/>
             </a:ext>
           </a:extLst>
         </p:spPr>
@@ -11376,7 +11432,7 @@
           </a:ln>
           <a:extLst>
             <a:ext uri="{C572A759-6A51-4108-AA02-DFA0A04FC94B}">
-              <ma14:wrappingTextBoxFlag xmlns:ma14="http://schemas.microsoft.com/office/mac/drawingml/2011/main" xmlns="" val="1"/>
+              <ma14:wrappingTextBoxFlag xmlns="" xmlns:ma14="http://schemas.microsoft.com/office/mac/drawingml/2011/main" val="1"/>
             </a:ext>
           </a:extLst>
         </p:spPr>
@@ -11525,7 +11581,7 @@
           </a:ln>
           <a:extLst>
             <a:ext uri="{C572A759-6A51-4108-AA02-DFA0A04FC94B}">
-              <ma14:wrappingTextBoxFlag xmlns:ma14="http://schemas.microsoft.com/office/mac/drawingml/2011/main" xmlns="" val="1"/>
+              <ma14:wrappingTextBoxFlag xmlns="" xmlns:ma14="http://schemas.microsoft.com/office/mac/drawingml/2011/main" val="1"/>
             </a:ext>
           </a:extLst>
         </p:spPr>
@@ -11570,7 +11626,7 @@
           </a:ln>
           <a:extLst>
             <a:ext uri="{C572A759-6A51-4108-AA02-DFA0A04FC94B}">
-              <ma14:wrappingTextBoxFlag xmlns:ma14="http://schemas.microsoft.com/office/mac/drawingml/2011/main" xmlns="" val="1"/>
+              <ma14:wrappingTextBoxFlag xmlns="" xmlns:ma14="http://schemas.microsoft.com/office/mac/drawingml/2011/main" val="1"/>
             </a:ext>
           </a:extLst>
         </p:spPr>
@@ -11615,7 +11671,7 @@
           </a:ln>
           <a:extLst>
             <a:ext uri="{C572A759-6A51-4108-AA02-DFA0A04FC94B}">
-              <ma14:wrappingTextBoxFlag xmlns:ma14="http://schemas.microsoft.com/office/mac/drawingml/2011/main" xmlns="" val="1"/>
+              <ma14:wrappingTextBoxFlag xmlns="" xmlns:ma14="http://schemas.microsoft.com/office/mac/drawingml/2011/main" val="1"/>
             </a:ext>
           </a:extLst>
         </p:spPr>
@@ -11660,7 +11716,7 @@
           </a:ln>
           <a:extLst>
             <a:ext uri="{C572A759-6A51-4108-AA02-DFA0A04FC94B}">
-              <ma14:wrappingTextBoxFlag xmlns:ma14="http://schemas.microsoft.com/office/mac/drawingml/2011/main" xmlns="" val="1"/>
+              <ma14:wrappingTextBoxFlag xmlns="" xmlns:ma14="http://schemas.microsoft.com/office/mac/drawingml/2011/main" val="1"/>
             </a:ext>
           </a:extLst>
         </p:spPr>
@@ -11816,7 +11872,7 @@
           </a:ln>
           <a:extLst>
             <a:ext uri="{C572A759-6A51-4108-AA02-DFA0A04FC94B}">
-              <ma14:wrappingTextBoxFlag xmlns:ma14="http://schemas.microsoft.com/office/mac/drawingml/2011/main" xmlns="" val="1"/>
+              <ma14:wrappingTextBoxFlag xmlns="" xmlns:ma14="http://schemas.microsoft.com/office/mac/drawingml/2011/main" val="1"/>
             </a:ext>
           </a:extLst>
         </p:spPr>
@@ -11895,7 +11951,7 @@
           </a:ln>
           <a:extLst>
             <a:ext uri="{C572A759-6A51-4108-AA02-DFA0A04FC94B}">
-              <ma14:wrappingTextBoxFlag xmlns:ma14="http://schemas.microsoft.com/office/mac/drawingml/2011/main" xmlns="" val="1"/>
+              <ma14:wrappingTextBoxFlag xmlns="" xmlns:ma14="http://schemas.microsoft.com/office/mac/drawingml/2011/main" val="1"/>
             </a:ext>
           </a:extLst>
         </p:spPr>
@@ -11980,7 +12036,7 @@
           </a:ln>
           <a:extLst>
             <a:ext uri="{C572A759-6A51-4108-AA02-DFA0A04FC94B}">
-              <ma14:wrappingTextBoxFlag xmlns:ma14="http://schemas.microsoft.com/office/mac/drawingml/2011/main" xmlns="" val="1"/>
+              <ma14:wrappingTextBoxFlag xmlns="" xmlns:ma14="http://schemas.microsoft.com/office/mac/drawingml/2011/main" val="1"/>
             </a:ext>
           </a:extLst>
         </p:spPr>
@@ -12065,7 +12121,7 @@
           </a:ln>
           <a:extLst>
             <a:ext uri="{C572A759-6A51-4108-AA02-DFA0A04FC94B}">
-              <ma14:wrappingTextBoxFlag xmlns:ma14="http://schemas.microsoft.com/office/mac/drawingml/2011/main" xmlns="" val="1"/>
+              <ma14:wrappingTextBoxFlag xmlns="" xmlns:ma14="http://schemas.microsoft.com/office/mac/drawingml/2011/main" val="1"/>
             </a:ext>
           </a:extLst>
         </p:spPr>
@@ -12111,7 +12167,7 @@
           </a:ln>
           <a:extLst>
             <a:ext uri="{C572A759-6A51-4108-AA02-DFA0A04FC94B}">
-              <ma14:wrappingTextBoxFlag xmlns:ma14="http://schemas.microsoft.com/office/mac/drawingml/2011/main" xmlns="" val="1"/>
+              <ma14:wrappingTextBoxFlag xmlns="" xmlns:ma14="http://schemas.microsoft.com/office/mac/drawingml/2011/main" val="1"/>
             </a:ext>
           </a:extLst>
         </p:spPr>
@@ -12260,7 +12316,7 @@
           </a:ln>
           <a:extLst>
             <a:ext uri="{C572A759-6A51-4108-AA02-DFA0A04FC94B}">
-              <ma14:wrappingTextBoxFlag xmlns:ma14="http://schemas.microsoft.com/office/mac/drawingml/2011/main" xmlns="" val="1"/>
+              <ma14:wrappingTextBoxFlag xmlns="" xmlns:ma14="http://schemas.microsoft.com/office/mac/drawingml/2011/main" val="1"/>
             </a:ext>
           </a:extLst>
         </p:spPr>
@@ -12305,7 +12361,7 @@
           </a:ln>
           <a:extLst>
             <a:ext uri="{C572A759-6A51-4108-AA02-DFA0A04FC94B}">
-              <ma14:wrappingTextBoxFlag xmlns:ma14="http://schemas.microsoft.com/office/mac/drawingml/2011/main" xmlns="" val="1"/>
+              <ma14:wrappingTextBoxFlag xmlns="" xmlns:ma14="http://schemas.microsoft.com/office/mac/drawingml/2011/main" val="1"/>
             </a:ext>
           </a:extLst>
         </p:spPr>
@@ -12350,7 +12406,7 @@
           </a:ln>
           <a:extLst>
             <a:ext uri="{C572A759-6A51-4108-AA02-DFA0A04FC94B}">
-              <ma14:wrappingTextBoxFlag xmlns:ma14="http://schemas.microsoft.com/office/mac/drawingml/2011/main" xmlns="" val="1"/>
+              <ma14:wrappingTextBoxFlag xmlns="" xmlns:ma14="http://schemas.microsoft.com/office/mac/drawingml/2011/main" val="1"/>
             </a:ext>
           </a:extLst>
         </p:spPr>
@@ -12395,7 +12451,7 @@
           </a:ln>
           <a:extLst>
             <a:ext uri="{C572A759-6A51-4108-AA02-DFA0A04FC94B}">
-              <ma14:wrappingTextBoxFlag xmlns:ma14="http://schemas.microsoft.com/office/mac/drawingml/2011/main" xmlns="" val="1"/>
+              <ma14:wrappingTextBoxFlag xmlns="" xmlns:ma14="http://schemas.microsoft.com/office/mac/drawingml/2011/main" val="1"/>
             </a:ext>
           </a:extLst>
         </p:spPr>
@@ -12513,7 +12569,7 @@
           </a:ln>
           <a:extLst>
             <a:ext uri="{C572A759-6A51-4108-AA02-DFA0A04FC94B}">
-              <ma14:wrappingTextBoxFlag xmlns:ma14="http://schemas.microsoft.com/office/mac/drawingml/2011/main" xmlns="" val="1"/>
+              <ma14:wrappingTextBoxFlag xmlns="" xmlns:ma14="http://schemas.microsoft.com/office/mac/drawingml/2011/main" val="1"/>
             </a:ext>
           </a:extLst>
         </p:spPr>
@@ -12592,7 +12648,7 @@
           </a:ln>
           <a:extLst>
             <a:ext uri="{C572A759-6A51-4108-AA02-DFA0A04FC94B}">
-              <ma14:wrappingTextBoxFlag xmlns:ma14="http://schemas.microsoft.com/office/mac/drawingml/2011/main" xmlns="" val="1"/>
+              <ma14:wrappingTextBoxFlag xmlns="" xmlns:ma14="http://schemas.microsoft.com/office/mac/drawingml/2011/main" val="1"/>
             </a:ext>
           </a:extLst>
         </p:spPr>
@@ -12677,7 +12733,7 @@
           </a:ln>
           <a:extLst>
             <a:ext uri="{C572A759-6A51-4108-AA02-DFA0A04FC94B}">
-              <ma14:wrappingTextBoxFlag xmlns:ma14="http://schemas.microsoft.com/office/mac/drawingml/2011/main" xmlns="" val="1"/>
+              <ma14:wrappingTextBoxFlag xmlns="" xmlns:ma14="http://schemas.microsoft.com/office/mac/drawingml/2011/main" val="1"/>
             </a:ext>
           </a:extLst>
         </p:spPr>
@@ -12762,7 +12818,7 @@
           </a:ln>
           <a:extLst>
             <a:ext uri="{C572A759-6A51-4108-AA02-DFA0A04FC94B}">
-              <ma14:wrappingTextBoxFlag xmlns:ma14="http://schemas.microsoft.com/office/mac/drawingml/2011/main" xmlns="" val="1"/>
+              <ma14:wrappingTextBoxFlag xmlns="" xmlns:ma14="http://schemas.microsoft.com/office/mac/drawingml/2011/main" val="1"/>
             </a:ext>
           </a:extLst>
         </p:spPr>
@@ -12808,7 +12864,7 @@
           </a:ln>
           <a:extLst>
             <a:ext uri="{C572A759-6A51-4108-AA02-DFA0A04FC94B}">
-              <ma14:wrappingTextBoxFlag xmlns:ma14="http://schemas.microsoft.com/office/mac/drawingml/2011/main" xmlns="" val="1"/>
+              <ma14:wrappingTextBoxFlag xmlns="" xmlns:ma14="http://schemas.microsoft.com/office/mac/drawingml/2011/main" val="1"/>
             </a:ext>
           </a:extLst>
         </p:spPr>
@@ -12995,7 +13051,7 @@
           </a:ln>
           <a:extLst>
             <a:ext uri="{C572A759-6A51-4108-AA02-DFA0A04FC94B}">
-              <ma14:wrappingTextBoxFlag xmlns:ma14="http://schemas.microsoft.com/office/mac/drawingml/2011/main" xmlns="" val="1"/>
+              <ma14:wrappingTextBoxFlag xmlns="" xmlns:ma14="http://schemas.microsoft.com/office/mac/drawingml/2011/main" val="1"/>
             </a:ext>
           </a:extLst>
         </p:spPr>
@@ -13040,7 +13096,7 @@
           </a:ln>
           <a:extLst>
             <a:ext uri="{C572A759-6A51-4108-AA02-DFA0A04FC94B}">
-              <ma14:wrappingTextBoxFlag xmlns:ma14="http://schemas.microsoft.com/office/mac/drawingml/2011/main" xmlns="" val="1"/>
+              <ma14:wrappingTextBoxFlag xmlns="" xmlns:ma14="http://schemas.microsoft.com/office/mac/drawingml/2011/main" val="1"/>
             </a:ext>
           </a:extLst>
         </p:spPr>
@@ -13085,7 +13141,7 @@
           </a:ln>
           <a:extLst>
             <a:ext uri="{C572A759-6A51-4108-AA02-DFA0A04FC94B}">
-              <ma14:wrappingTextBoxFlag xmlns:ma14="http://schemas.microsoft.com/office/mac/drawingml/2011/main" xmlns="" val="1"/>
+              <ma14:wrappingTextBoxFlag xmlns="" xmlns:ma14="http://schemas.microsoft.com/office/mac/drawingml/2011/main" val="1"/>
             </a:ext>
           </a:extLst>
         </p:spPr>
@@ -13130,7 +13186,7 @@
           </a:ln>
           <a:extLst>
             <a:ext uri="{C572A759-6A51-4108-AA02-DFA0A04FC94B}">
-              <ma14:wrappingTextBoxFlag xmlns:ma14="http://schemas.microsoft.com/office/mac/drawingml/2011/main" xmlns="" val="1"/>
+              <ma14:wrappingTextBoxFlag xmlns="" xmlns:ma14="http://schemas.microsoft.com/office/mac/drawingml/2011/main" val="1"/>
             </a:ext>
           </a:extLst>
         </p:spPr>
@@ -13248,7 +13304,7 @@
           </a:ln>
           <a:extLst>
             <a:ext uri="{C572A759-6A51-4108-AA02-DFA0A04FC94B}">
-              <ma14:wrappingTextBoxFlag xmlns:ma14="http://schemas.microsoft.com/office/mac/drawingml/2011/main" xmlns="" val="1"/>
+              <ma14:wrappingTextBoxFlag xmlns="" xmlns:ma14="http://schemas.microsoft.com/office/mac/drawingml/2011/main" val="1"/>
             </a:ext>
           </a:extLst>
         </p:spPr>
@@ -13327,7 +13383,7 @@
           </a:ln>
           <a:extLst>
             <a:ext uri="{C572A759-6A51-4108-AA02-DFA0A04FC94B}">
-              <ma14:wrappingTextBoxFlag xmlns:ma14="http://schemas.microsoft.com/office/mac/drawingml/2011/main" xmlns="" val="1"/>
+              <ma14:wrappingTextBoxFlag xmlns="" xmlns:ma14="http://schemas.microsoft.com/office/mac/drawingml/2011/main" val="1"/>
             </a:ext>
           </a:extLst>
         </p:spPr>
@@ -13412,7 +13468,7 @@
           </a:ln>
           <a:extLst>
             <a:ext uri="{C572A759-6A51-4108-AA02-DFA0A04FC94B}">
-              <ma14:wrappingTextBoxFlag xmlns:ma14="http://schemas.microsoft.com/office/mac/drawingml/2011/main" xmlns="" val="1"/>
+              <ma14:wrappingTextBoxFlag xmlns="" xmlns:ma14="http://schemas.microsoft.com/office/mac/drawingml/2011/main" val="1"/>
             </a:ext>
           </a:extLst>
         </p:spPr>
@@ -13462,7 +13518,7 @@
           </a:ln>
           <a:extLst>
             <a:ext uri="{C572A759-6A51-4108-AA02-DFA0A04FC94B}">
-              <ma14:wrappingTextBoxFlag xmlns:ma14="http://schemas.microsoft.com/office/mac/drawingml/2011/main" xmlns="" val="1"/>
+              <ma14:wrappingTextBoxFlag xmlns="" xmlns:ma14="http://schemas.microsoft.com/office/mac/drawingml/2011/main" val="1"/>
             </a:ext>
           </a:extLst>
         </p:spPr>
@@ -13647,7 +13703,7 @@
           </a:ln>
           <a:extLst>
             <a:ext uri="{C572A759-6A51-4108-AA02-DFA0A04FC94B}">
-              <ma14:wrappingTextBoxFlag xmlns:ma14="http://schemas.microsoft.com/office/mac/drawingml/2011/main" xmlns="" val="1"/>
+              <ma14:wrappingTextBoxFlag xmlns="" xmlns:ma14="http://schemas.microsoft.com/office/mac/drawingml/2011/main" val="1"/>
             </a:ext>
           </a:extLst>
         </p:spPr>
@@ -13692,7 +13748,7 @@
           </a:ln>
           <a:extLst>
             <a:ext uri="{C572A759-6A51-4108-AA02-DFA0A04FC94B}">
-              <ma14:wrappingTextBoxFlag xmlns:ma14="http://schemas.microsoft.com/office/mac/drawingml/2011/main" xmlns="" val="1"/>
+              <ma14:wrappingTextBoxFlag xmlns="" xmlns:ma14="http://schemas.microsoft.com/office/mac/drawingml/2011/main" val="1"/>
             </a:ext>
           </a:extLst>
         </p:spPr>
@@ -13737,7 +13793,7 @@
           </a:ln>
           <a:extLst>
             <a:ext uri="{C572A759-6A51-4108-AA02-DFA0A04FC94B}">
-              <ma14:wrappingTextBoxFlag xmlns:ma14="http://schemas.microsoft.com/office/mac/drawingml/2011/main" xmlns="" val="1"/>
+              <ma14:wrappingTextBoxFlag xmlns="" xmlns:ma14="http://schemas.microsoft.com/office/mac/drawingml/2011/main" val="1"/>
             </a:ext>
           </a:extLst>
         </p:spPr>
@@ -13782,7 +13838,7 @@
           </a:ln>
           <a:extLst>
             <a:ext uri="{C572A759-6A51-4108-AA02-DFA0A04FC94B}">
-              <ma14:wrappingTextBoxFlag xmlns:ma14="http://schemas.microsoft.com/office/mac/drawingml/2011/main" xmlns="" val="1"/>
+              <ma14:wrappingTextBoxFlag xmlns="" xmlns:ma14="http://schemas.microsoft.com/office/mac/drawingml/2011/main" val="1"/>
             </a:ext>
           </a:extLst>
         </p:spPr>
@@ -13862,7 +13918,7 @@
           </a:ln>
           <a:extLst>
             <a:ext uri="{C572A759-6A51-4108-AA02-DFA0A04FC94B}">
-              <ma14:wrappingTextBoxFlag xmlns:ma14="http://schemas.microsoft.com/office/mac/drawingml/2011/main" xmlns="" val="1"/>
+              <ma14:wrappingTextBoxFlag xmlns="" xmlns:ma14="http://schemas.microsoft.com/office/mac/drawingml/2011/main" val="1"/>
             </a:ext>
           </a:extLst>
         </p:spPr>
@@ -13941,7 +13997,7 @@
           </a:ln>
           <a:extLst>
             <a:ext uri="{C572A759-6A51-4108-AA02-DFA0A04FC94B}">
-              <ma14:wrappingTextBoxFlag xmlns:ma14="http://schemas.microsoft.com/office/mac/drawingml/2011/main" xmlns="" val="1"/>
+              <ma14:wrappingTextBoxFlag xmlns="" xmlns:ma14="http://schemas.microsoft.com/office/mac/drawingml/2011/main" val="1"/>
             </a:ext>
           </a:extLst>
         </p:spPr>
@@ -14026,7 +14082,7 @@
           </a:ln>
           <a:extLst>
             <a:ext uri="{C572A759-6A51-4108-AA02-DFA0A04FC94B}">
-              <ma14:wrappingTextBoxFlag xmlns:ma14="http://schemas.microsoft.com/office/mac/drawingml/2011/main" xmlns="" val="1"/>
+              <ma14:wrappingTextBoxFlag xmlns="" xmlns:ma14="http://schemas.microsoft.com/office/mac/drawingml/2011/main" val="1"/>
             </a:ext>
           </a:extLst>
         </p:spPr>
@@ -14330,7 +14386,7 @@
           </a:ln>
           <a:extLst>
             <a:ext uri="{C572A759-6A51-4108-AA02-DFA0A04FC94B}">
-              <ma14:wrappingTextBoxFlag xmlns:ma14="http://schemas.microsoft.com/office/mac/drawingml/2011/main" xmlns="" val="1"/>
+              <ma14:wrappingTextBoxFlag xmlns="" xmlns:ma14="http://schemas.microsoft.com/office/mac/drawingml/2011/main" val="1"/>
             </a:ext>
           </a:extLst>
         </p:spPr>
@@ -14375,7 +14431,7 @@
           </a:ln>
           <a:extLst>
             <a:ext uri="{C572A759-6A51-4108-AA02-DFA0A04FC94B}">
-              <ma14:wrappingTextBoxFlag xmlns:ma14="http://schemas.microsoft.com/office/mac/drawingml/2011/main" xmlns="" val="1"/>
+              <ma14:wrappingTextBoxFlag xmlns="" xmlns:ma14="http://schemas.microsoft.com/office/mac/drawingml/2011/main" val="1"/>
             </a:ext>
           </a:extLst>
         </p:spPr>
@@ -14420,7 +14476,7 @@
           </a:ln>
           <a:extLst>
             <a:ext uri="{C572A759-6A51-4108-AA02-DFA0A04FC94B}">
-              <ma14:wrappingTextBoxFlag xmlns:ma14="http://schemas.microsoft.com/office/mac/drawingml/2011/main" xmlns="" val="1"/>
+              <ma14:wrappingTextBoxFlag xmlns="" xmlns:ma14="http://schemas.microsoft.com/office/mac/drawingml/2011/main" val="1"/>
             </a:ext>
           </a:extLst>
         </p:spPr>
@@ -14465,7 +14521,7 @@
           </a:ln>
           <a:extLst>
             <a:ext uri="{C572A759-6A51-4108-AA02-DFA0A04FC94B}">
-              <ma14:wrappingTextBoxFlag xmlns:ma14="http://schemas.microsoft.com/office/mac/drawingml/2011/main" xmlns="" val="1"/>
+              <ma14:wrappingTextBoxFlag xmlns="" xmlns:ma14="http://schemas.microsoft.com/office/mac/drawingml/2011/main" val="1"/>
             </a:ext>
           </a:extLst>
         </p:spPr>
@@ -14545,7 +14601,7 @@
           </a:ln>
           <a:extLst>
             <a:ext uri="{C572A759-6A51-4108-AA02-DFA0A04FC94B}">
-              <ma14:wrappingTextBoxFlag xmlns:ma14="http://schemas.microsoft.com/office/mac/drawingml/2011/main" xmlns="" val="1"/>
+              <ma14:wrappingTextBoxFlag xmlns="" xmlns:ma14="http://schemas.microsoft.com/office/mac/drawingml/2011/main" val="1"/>
             </a:ext>
           </a:extLst>
         </p:spPr>
@@ -14624,7 +14680,7 @@
           </a:ln>
           <a:extLst>
             <a:ext uri="{C572A759-6A51-4108-AA02-DFA0A04FC94B}">
-              <ma14:wrappingTextBoxFlag xmlns:ma14="http://schemas.microsoft.com/office/mac/drawingml/2011/main" xmlns="" val="1"/>
+              <ma14:wrappingTextBoxFlag xmlns="" xmlns:ma14="http://schemas.microsoft.com/office/mac/drawingml/2011/main" val="1"/>
             </a:ext>
           </a:extLst>
         </p:spPr>
@@ -14709,7 +14765,7 @@
           </a:ln>
           <a:extLst>
             <a:ext uri="{C572A759-6A51-4108-AA02-DFA0A04FC94B}">
-              <ma14:wrappingTextBoxFlag xmlns:ma14="http://schemas.microsoft.com/office/mac/drawingml/2011/main" xmlns="" val="1"/>
+              <ma14:wrappingTextBoxFlag xmlns="" xmlns:ma14="http://schemas.microsoft.com/office/mac/drawingml/2011/main" val="1"/>
             </a:ext>
           </a:extLst>
         </p:spPr>
@@ -14984,7 +15040,7 @@
           </a:ln>
           <a:extLst>
             <a:ext uri="{C572A759-6A51-4108-AA02-DFA0A04FC94B}">
-              <ma14:wrappingTextBoxFlag xmlns:ma14="http://schemas.microsoft.com/office/mac/drawingml/2011/main" xmlns="" val="1"/>
+              <ma14:wrappingTextBoxFlag xmlns="" xmlns:ma14="http://schemas.microsoft.com/office/mac/drawingml/2011/main" val="1"/>
             </a:ext>
           </a:extLst>
         </p:spPr>
@@ -15315,7 +15371,7 @@
           </a:ln>
           <a:extLst>
             <a:ext uri="{C572A759-6A51-4108-AA02-DFA0A04FC94B}">
-              <ma14:wrappingTextBoxFlag xmlns:ma14="http://schemas.microsoft.com/office/mac/drawingml/2011/main" xmlns="" val="1"/>
+              <ma14:wrappingTextBoxFlag xmlns="" xmlns:ma14="http://schemas.microsoft.com/office/mac/drawingml/2011/main" val="1"/>
             </a:ext>
           </a:extLst>
         </p:spPr>
@@ -15360,7 +15416,7 @@
           </a:ln>
           <a:extLst>
             <a:ext uri="{C572A759-6A51-4108-AA02-DFA0A04FC94B}">
-              <ma14:wrappingTextBoxFlag xmlns:ma14="http://schemas.microsoft.com/office/mac/drawingml/2011/main" xmlns="" val="1"/>
+              <ma14:wrappingTextBoxFlag xmlns="" xmlns:ma14="http://schemas.microsoft.com/office/mac/drawingml/2011/main" val="1"/>
             </a:ext>
           </a:extLst>
         </p:spPr>
@@ -15405,7 +15461,7 @@
           </a:ln>
           <a:extLst>
             <a:ext uri="{C572A759-6A51-4108-AA02-DFA0A04FC94B}">
-              <ma14:wrappingTextBoxFlag xmlns:ma14="http://schemas.microsoft.com/office/mac/drawingml/2011/main" xmlns="" val="1"/>
+              <ma14:wrappingTextBoxFlag xmlns="" xmlns:ma14="http://schemas.microsoft.com/office/mac/drawingml/2011/main" val="1"/>
             </a:ext>
           </a:extLst>
         </p:spPr>
@@ -15450,7 +15506,7 @@
           </a:ln>
           <a:extLst>
             <a:ext uri="{C572A759-6A51-4108-AA02-DFA0A04FC94B}">
-              <ma14:wrappingTextBoxFlag xmlns:ma14="http://schemas.microsoft.com/office/mac/drawingml/2011/main" xmlns="" val="1"/>
+              <ma14:wrappingTextBoxFlag xmlns="" xmlns:ma14="http://schemas.microsoft.com/office/mac/drawingml/2011/main" val="1"/>
             </a:ext>
           </a:extLst>
         </p:spPr>
@@ -15530,7 +15586,7 @@
           </a:ln>
           <a:extLst>
             <a:ext uri="{C572A759-6A51-4108-AA02-DFA0A04FC94B}">
-              <ma14:wrappingTextBoxFlag xmlns:ma14="http://schemas.microsoft.com/office/mac/drawingml/2011/main" xmlns="" val="1"/>
+              <ma14:wrappingTextBoxFlag xmlns="" xmlns:ma14="http://schemas.microsoft.com/office/mac/drawingml/2011/main" val="1"/>
             </a:ext>
           </a:extLst>
         </p:spPr>
@@ -15609,7 +15665,7 @@
           </a:ln>
           <a:extLst>
             <a:ext uri="{C572A759-6A51-4108-AA02-DFA0A04FC94B}">
-              <ma14:wrappingTextBoxFlag xmlns:ma14="http://schemas.microsoft.com/office/mac/drawingml/2011/main" xmlns="" val="1"/>
+              <ma14:wrappingTextBoxFlag xmlns="" xmlns:ma14="http://schemas.microsoft.com/office/mac/drawingml/2011/main" val="1"/>
             </a:ext>
           </a:extLst>
         </p:spPr>
@@ -15694,7 +15750,7 @@
           </a:ln>
           <a:extLst>
             <a:ext uri="{C572A759-6A51-4108-AA02-DFA0A04FC94B}">
-              <ma14:wrappingTextBoxFlag xmlns:ma14="http://schemas.microsoft.com/office/mac/drawingml/2011/main" xmlns="" val="1"/>
+              <ma14:wrappingTextBoxFlag xmlns="" xmlns:ma14="http://schemas.microsoft.com/office/mac/drawingml/2011/main" val="1"/>
             </a:ext>
           </a:extLst>
         </p:spPr>
@@ -15969,7 +16025,7 @@
           </a:ln>
           <a:extLst>
             <a:ext uri="{C572A759-6A51-4108-AA02-DFA0A04FC94B}">
-              <ma14:wrappingTextBoxFlag xmlns:ma14="http://schemas.microsoft.com/office/mac/drawingml/2011/main" xmlns="" val="1"/>
+              <ma14:wrappingTextBoxFlag xmlns="" xmlns:ma14="http://schemas.microsoft.com/office/mac/drawingml/2011/main" val="1"/>
             </a:ext>
           </a:extLst>
         </p:spPr>
@@ -16071,7 +16127,7 @@
           </a:ln>
           <a:extLst>
             <a:ext uri="{C572A759-6A51-4108-AA02-DFA0A04FC94B}">
-              <ma14:wrappingTextBoxFlag xmlns:ma14="http://schemas.microsoft.com/office/mac/drawingml/2011/main" xmlns="" val="1"/>
+              <ma14:wrappingTextBoxFlag xmlns="" xmlns:ma14="http://schemas.microsoft.com/office/mac/drawingml/2011/main" val="1"/>
             </a:ext>
           </a:extLst>
         </p:spPr>
@@ -16116,7 +16172,7 @@
           </a:ln>
           <a:extLst>
             <a:ext uri="{C572A759-6A51-4108-AA02-DFA0A04FC94B}">
-              <ma14:wrappingTextBoxFlag xmlns:ma14="http://schemas.microsoft.com/office/mac/drawingml/2011/main" xmlns="" val="1"/>
+              <ma14:wrappingTextBoxFlag xmlns="" xmlns:ma14="http://schemas.microsoft.com/office/mac/drawingml/2011/main" val="1"/>
             </a:ext>
           </a:extLst>
         </p:spPr>
@@ -16161,7 +16217,7 @@
           </a:ln>
           <a:extLst>
             <a:ext uri="{C572A759-6A51-4108-AA02-DFA0A04FC94B}">
-              <ma14:wrappingTextBoxFlag xmlns:ma14="http://schemas.microsoft.com/office/mac/drawingml/2011/main" xmlns="" val="1"/>
+              <ma14:wrappingTextBoxFlag xmlns="" xmlns:ma14="http://schemas.microsoft.com/office/mac/drawingml/2011/main" val="1"/>
             </a:ext>
           </a:extLst>
         </p:spPr>
@@ -16206,7 +16262,7 @@
           </a:ln>
           <a:extLst>
             <a:ext uri="{C572A759-6A51-4108-AA02-DFA0A04FC94B}">
-              <ma14:wrappingTextBoxFlag xmlns:ma14="http://schemas.microsoft.com/office/mac/drawingml/2011/main" xmlns="" val="1"/>
+              <ma14:wrappingTextBoxFlag xmlns="" xmlns:ma14="http://schemas.microsoft.com/office/mac/drawingml/2011/main" val="1"/>
             </a:ext>
           </a:extLst>
         </p:spPr>
@@ -16286,7 +16342,7 @@
           </a:ln>
           <a:extLst>
             <a:ext uri="{C572A759-6A51-4108-AA02-DFA0A04FC94B}">
-              <ma14:wrappingTextBoxFlag xmlns:ma14="http://schemas.microsoft.com/office/mac/drawingml/2011/main" xmlns="" val="1"/>
+              <ma14:wrappingTextBoxFlag xmlns="" xmlns:ma14="http://schemas.microsoft.com/office/mac/drawingml/2011/main" val="1"/>
             </a:ext>
           </a:extLst>
         </p:spPr>
@@ -16365,7 +16421,7 @@
           </a:ln>
           <a:extLst>
             <a:ext uri="{C572A759-6A51-4108-AA02-DFA0A04FC94B}">
-              <ma14:wrappingTextBoxFlag xmlns:ma14="http://schemas.microsoft.com/office/mac/drawingml/2011/main" xmlns="" val="1"/>
+              <ma14:wrappingTextBoxFlag xmlns="" xmlns:ma14="http://schemas.microsoft.com/office/mac/drawingml/2011/main" val="1"/>
             </a:ext>
           </a:extLst>
         </p:spPr>
@@ -16450,7 +16506,7 @@
           </a:ln>
           <a:extLst>
             <a:ext uri="{C572A759-6A51-4108-AA02-DFA0A04FC94B}">
-              <ma14:wrappingTextBoxFlag xmlns:ma14="http://schemas.microsoft.com/office/mac/drawingml/2011/main" xmlns="" val="1"/>
+              <ma14:wrappingTextBoxFlag xmlns="" xmlns:ma14="http://schemas.microsoft.com/office/mac/drawingml/2011/main" val="1"/>
             </a:ext>
           </a:extLst>
         </p:spPr>
@@ -16725,7 +16781,7 @@
           </a:ln>
           <a:extLst>
             <a:ext uri="{C572A759-6A51-4108-AA02-DFA0A04FC94B}">
-              <ma14:wrappingTextBoxFlag xmlns:ma14="http://schemas.microsoft.com/office/mac/drawingml/2011/main" xmlns="" val="1"/>
+              <ma14:wrappingTextBoxFlag xmlns="" xmlns:ma14="http://schemas.microsoft.com/office/mac/drawingml/2011/main" val="1"/>
             </a:ext>
           </a:extLst>
         </p:spPr>
@@ -16771,7 +16827,7 @@
           </a:ln>
           <a:extLst>
             <a:ext uri="{C572A759-6A51-4108-AA02-DFA0A04FC94B}">
-              <ma14:wrappingTextBoxFlag xmlns:ma14="http://schemas.microsoft.com/office/mac/drawingml/2011/main" xmlns="" val="1"/>
+              <ma14:wrappingTextBoxFlag xmlns="" xmlns:ma14="http://schemas.microsoft.com/office/mac/drawingml/2011/main" val="1"/>
             </a:ext>
           </a:extLst>
         </p:spPr>
@@ -16880,7 +16936,7 @@
           </a:ln>
           <a:extLst>
             <a:ext uri="{C572A759-6A51-4108-AA02-DFA0A04FC94B}">
-              <ma14:wrappingTextBoxFlag xmlns:ma14="http://schemas.microsoft.com/office/mac/drawingml/2011/main" xmlns="" val="1"/>
+              <ma14:wrappingTextBoxFlag xmlns="" xmlns:ma14="http://schemas.microsoft.com/office/mac/drawingml/2011/main" val="1"/>
             </a:ext>
           </a:extLst>
         </p:spPr>
@@ -16925,7 +16981,7 @@
           </a:ln>
           <a:extLst>
             <a:ext uri="{C572A759-6A51-4108-AA02-DFA0A04FC94B}">
-              <ma14:wrappingTextBoxFlag xmlns:ma14="http://schemas.microsoft.com/office/mac/drawingml/2011/main" xmlns="" val="1"/>
+              <ma14:wrappingTextBoxFlag xmlns="" xmlns:ma14="http://schemas.microsoft.com/office/mac/drawingml/2011/main" val="1"/>
             </a:ext>
           </a:extLst>
         </p:spPr>
@@ -16970,7 +17026,7 @@
           </a:ln>
           <a:extLst>
             <a:ext uri="{C572A759-6A51-4108-AA02-DFA0A04FC94B}">
-              <ma14:wrappingTextBoxFlag xmlns:ma14="http://schemas.microsoft.com/office/mac/drawingml/2011/main" xmlns="" val="1"/>
+              <ma14:wrappingTextBoxFlag xmlns="" xmlns:ma14="http://schemas.microsoft.com/office/mac/drawingml/2011/main" val="1"/>
             </a:ext>
           </a:extLst>
         </p:spPr>
@@ -17015,7 +17071,7 @@
           </a:ln>
           <a:extLst>
             <a:ext uri="{C572A759-6A51-4108-AA02-DFA0A04FC94B}">
-              <ma14:wrappingTextBoxFlag xmlns:ma14="http://schemas.microsoft.com/office/mac/drawingml/2011/main" xmlns="" val="1"/>
+              <ma14:wrappingTextBoxFlag xmlns="" xmlns:ma14="http://schemas.microsoft.com/office/mac/drawingml/2011/main" val="1"/>
             </a:ext>
           </a:extLst>
         </p:spPr>
@@ -17095,7 +17151,7 @@
           </a:ln>
           <a:extLst>
             <a:ext uri="{C572A759-6A51-4108-AA02-DFA0A04FC94B}">
-              <ma14:wrappingTextBoxFlag xmlns:ma14="http://schemas.microsoft.com/office/mac/drawingml/2011/main" xmlns="" val="1"/>
+              <ma14:wrappingTextBoxFlag xmlns="" xmlns:ma14="http://schemas.microsoft.com/office/mac/drawingml/2011/main" val="1"/>
             </a:ext>
           </a:extLst>
         </p:spPr>
@@ -17174,7 +17230,7 @@
           </a:ln>
           <a:extLst>
             <a:ext uri="{C572A759-6A51-4108-AA02-DFA0A04FC94B}">
-              <ma14:wrappingTextBoxFlag xmlns:ma14="http://schemas.microsoft.com/office/mac/drawingml/2011/main" xmlns="" val="1"/>
+              <ma14:wrappingTextBoxFlag xmlns="" xmlns:ma14="http://schemas.microsoft.com/office/mac/drawingml/2011/main" val="1"/>
             </a:ext>
           </a:extLst>
         </p:spPr>
@@ -17259,7 +17315,7 @@
           </a:ln>
           <a:extLst>
             <a:ext uri="{C572A759-6A51-4108-AA02-DFA0A04FC94B}">
-              <ma14:wrappingTextBoxFlag xmlns:ma14="http://schemas.microsoft.com/office/mac/drawingml/2011/main" xmlns="" val="1"/>
+              <ma14:wrappingTextBoxFlag xmlns="" xmlns:ma14="http://schemas.microsoft.com/office/mac/drawingml/2011/main" val="1"/>
             </a:ext>
           </a:extLst>
         </p:spPr>
@@ -17534,7 +17590,7 @@
           </a:ln>
           <a:extLst>
             <a:ext uri="{C572A759-6A51-4108-AA02-DFA0A04FC94B}">
-              <ma14:wrappingTextBoxFlag xmlns:ma14="http://schemas.microsoft.com/office/mac/drawingml/2011/main" xmlns="" val="1"/>
+              <ma14:wrappingTextBoxFlag xmlns="" xmlns:ma14="http://schemas.microsoft.com/office/mac/drawingml/2011/main" val="1"/>
             </a:ext>
           </a:extLst>
         </p:spPr>
@@ -17580,7 +17636,7 @@
           </a:ln>
           <a:extLst>
             <a:ext uri="{C572A759-6A51-4108-AA02-DFA0A04FC94B}">
-              <ma14:wrappingTextBoxFlag xmlns:ma14="http://schemas.microsoft.com/office/mac/drawingml/2011/main" xmlns="" val="1"/>
+              <ma14:wrappingTextBoxFlag xmlns="" xmlns:ma14="http://schemas.microsoft.com/office/mac/drawingml/2011/main" val="1"/>
             </a:ext>
           </a:extLst>
         </p:spPr>
@@ -17727,7 +17783,7 @@
           </a:ln>
           <a:extLst>
             <a:ext uri="{C572A759-6A51-4108-AA02-DFA0A04FC94B}">
-              <ma14:wrappingTextBoxFlag xmlns:ma14="http://schemas.microsoft.com/office/mac/drawingml/2011/main" xmlns="" val="1"/>
+              <ma14:wrappingTextBoxFlag xmlns="" xmlns:ma14="http://schemas.microsoft.com/office/mac/drawingml/2011/main" val="1"/>
             </a:ext>
           </a:extLst>
         </p:spPr>
@@ -17772,7 +17828,7 @@
           </a:ln>
           <a:extLst>
             <a:ext uri="{C572A759-6A51-4108-AA02-DFA0A04FC94B}">
-              <ma14:wrappingTextBoxFlag xmlns:ma14="http://schemas.microsoft.com/office/mac/drawingml/2011/main" xmlns="" val="1"/>
+              <ma14:wrappingTextBoxFlag xmlns="" xmlns:ma14="http://schemas.microsoft.com/office/mac/drawingml/2011/main" val="1"/>
             </a:ext>
           </a:extLst>
         </p:spPr>
@@ -17817,7 +17873,7 @@
           </a:ln>
           <a:extLst>
             <a:ext uri="{C572A759-6A51-4108-AA02-DFA0A04FC94B}">
-              <ma14:wrappingTextBoxFlag xmlns:ma14="http://schemas.microsoft.com/office/mac/drawingml/2011/main" xmlns="" val="1"/>
+              <ma14:wrappingTextBoxFlag xmlns="" xmlns:ma14="http://schemas.microsoft.com/office/mac/drawingml/2011/main" val="1"/>
             </a:ext>
           </a:extLst>
         </p:spPr>
@@ -17862,7 +17918,7 @@
           </a:ln>
           <a:extLst>
             <a:ext uri="{C572A759-6A51-4108-AA02-DFA0A04FC94B}">
-              <ma14:wrappingTextBoxFlag xmlns:ma14="http://schemas.microsoft.com/office/mac/drawingml/2011/main" xmlns="" val="1"/>
+              <ma14:wrappingTextBoxFlag xmlns="" xmlns:ma14="http://schemas.microsoft.com/office/mac/drawingml/2011/main" val="1"/>
             </a:ext>
           </a:extLst>
         </p:spPr>
@@ -17942,7 +17998,7 @@
           </a:ln>
           <a:extLst>
             <a:ext uri="{C572A759-6A51-4108-AA02-DFA0A04FC94B}">
-              <ma14:wrappingTextBoxFlag xmlns:ma14="http://schemas.microsoft.com/office/mac/drawingml/2011/main" xmlns="" val="1"/>
+              <ma14:wrappingTextBoxFlag xmlns="" xmlns:ma14="http://schemas.microsoft.com/office/mac/drawingml/2011/main" val="1"/>
             </a:ext>
           </a:extLst>
         </p:spPr>
@@ -18021,7 +18077,7 @@
           </a:ln>
           <a:extLst>
             <a:ext uri="{C572A759-6A51-4108-AA02-DFA0A04FC94B}">
-              <ma14:wrappingTextBoxFlag xmlns:ma14="http://schemas.microsoft.com/office/mac/drawingml/2011/main" xmlns="" val="1"/>
+              <ma14:wrappingTextBoxFlag xmlns="" xmlns:ma14="http://schemas.microsoft.com/office/mac/drawingml/2011/main" val="1"/>
             </a:ext>
           </a:extLst>
         </p:spPr>
@@ -18106,7 +18162,7 @@
           </a:ln>
           <a:extLst>
             <a:ext uri="{C572A759-6A51-4108-AA02-DFA0A04FC94B}">
-              <ma14:wrappingTextBoxFlag xmlns:ma14="http://schemas.microsoft.com/office/mac/drawingml/2011/main" xmlns="" val="1"/>
+              <ma14:wrappingTextBoxFlag xmlns="" xmlns:ma14="http://schemas.microsoft.com/office/mac/drawingml/2011/main" val="1"/>
             </a:ext>
           </a:extLst>
         </p:spPr>
@@ -18381,7 +18437,7 @@
           </a:ln>
           <a:extLst>
             <a:ext uri="{C572A759-6A51-4108-AA02-DFA0A04FC94B}">
-              <ma14:wrappingTextBoxFlag xmlns:ma14="http://schemas.microsoft.com/office/mac/drawingml/2011/main" xmlns="" val="1"/>
+              <ma14:wrappingTextBoxFlag xmlns="" xmlns:ma14="http://schemas.microsoft.com/office/mac/drawingml/2011/main" val="1"/>
             </a:ext>
           </a:extLst>
         </p:spPr>
@@ -18427,7 +18483,7 @@
           </a:ln>
           <a:extLst>
             <a:ext uri="{C572A759-6A51-4108-AA02-DFA0A04FC94B}">
-              <ma14:wrappingTextBoxFlag xmlns:ma14="http://schemas.microsoft.com/office/mac/drawingml/2011/main" xmlns="" val="1"/>
+              <ma14:wrappingTextBoxFlag xmlns="" xmlns:ma14="http://schemas.microsoft.com/office/mac/drawingml/2011/main" val="1"/>
             </a:ext>
           </a:extLst>
         </p:spPr>
@@ -18612,7 +18668,7 @@
           </a:ln>
           <a:extLst>
             <a:ext uri="{C572A759-6A51-4108-AA02-DFA0A04FC94B}">
-              <ma14:wrappingTextBoxFlag xmlns:ma14="http://schemas.microsoft.com/office/mac/drawingml/2011/main" xmlns="" val="1"/>
+              <ma14:wrappingTextBoxFlag xmlns="" xmlns:ma14="http://schemas.microsoft.com/office/mac/drawingml/2011/main" val="1"/>
             </a:ext>
           </a:extLst>
         </p:spPr>
@@ -18657,7 +18713,7 @@
           </a:ln>
           <a:extLst>
             <a:ext uri="{C572A759-6A51-4108-AA02-DFA0A04FC94B}">
-              <ma14:wrappingTextBoxFlag xmlns:ma14="http://schemas.microsoft.com/office/mac/drawingml/2011/main" xmlns="" val="1"/>
+              <ma14:wrappingTextBoxFlag xmlns="" xmlns:ma14="http://schemas.microsoft.com/office/mac/drawingml/2011/main" val="1"/>
             </a:ext>
           </a:extLst>
         </p:spPr>
@@ -18702,7 +18758,7 @@
           </a:ln>
           <a:extLst>
             <a:ext uri="{C572A759-6A51-4108-AA02-DFA0A04FC94B}">
-              <ma14:wrappingTextBoxFlag xmlns:ma14="http://schemas.microsoft.com/office/mac/drawingml/2011/main" xmlns="" val="1"/>
+              <ma14:wrappingTextBoxFlag xmlns="" xmlns:ma14="http://schemas.microsoft.com/office/mac/drawingml/2011/main" val="1"/>
             </a:ext>
           </a:extLst>
         </p:spPr>
@@ -18747,7 +18803,7 @@
           </a:ln>
           <a:extLst>
             <a:ext uri="{C572A759-6A51-4108-AA02-DFA0A04FC94B}">
-              <ma14:wrappingTextBoxFlag xmlns:ma14="http://schemas.microsoft.com/office/mac/drawingml/2011/main" xmlns="" val="1"/>
+              <ma14:wrappingTextBoxFlag xmlns="" xmlns:ma14="http://schemas.microsoft.com/office/mac/drawingml/2011/main" val="1"/>
             </a:ext>
           </a:extLst>
         </p:spPr>
@@ -18827,7 +18883,7 @@
           </a:ln>
           <a:extLst>
             <a:ext uri="{C572A759-6A51-4108-AA02-DFA0A04FC94B}">
-              <ma14:wrappingTextBoxFlag xmlns:ma14="http://schemas.microsoft.com/office/mac/drawingml/2011/main" xmlns="" val="1"/>
+              <ma14:wrappingTextBoxFlag xmlns="" xmlns:ma14="http://schemas.microsoft.com/office/mac/drawingml/2011/main" val="1"/>
             </a:ext>
           </a:extLst>
         </p:spPr>
@@ -18906,7 +18962,7 @@
           </a:ln>
           <a:extLst>
             <a:ext uri="{C572A759-6A51-4108-AA02-DFA0A04FC94B}">
-              <ma14:wrappingTextBoxFlag xmlns:ma14="http://schemas.microsoft.com/office/mac/drawingml/2011/main" xmlns="" val="1"/>
+              <ma14:wrappingTextBoxFlag xmlns="" xmlns:ma14="http://schemas.microsoft.com/office/mac/drawingml/2011/main" val="1"/>
             </a:ext>
           </a:extLst>
         </p:spPr>
@@ -18991,7 +19047,7 @@
           </a:ln>
           <a:extLst>
             <a:ext uri="{C572A759-6A51-4108-AA02-DFA0A04FC94B}">
-              <ma14:wrappingTextBoxFlag xmlns:ma14="http://schemas.microsoft.com/office/mac/drawingml/2011/main" xmlns="" val="1"/>
+              <ma14:wrappingTextBoxFlag xmlns="" xmlns:ma14="http://schemas.microsoft.com/office/mac/drawingml/2011/main" val="1"/>
             </a:ext>
           </a:extLst>
         </p:spPr>
@@ -19266,7 +19322,7 @@
           </a:ln>
           <a:extLst>
             <a:ext uri="{C572A759-6A51-4108-AA02-DFA0A04FC94B}">
-              <ma14:wrappingTextBoxFlag xmlns:ma14="http://schemas.microsoft.com/office/mac/drawingml/2011/main" xmlns="" val="1"/>
+              <ma14:wrappingTextBoxFlag xmlns="" xmlns:ma14="http://schemas.microsoft.com/office/mac/drawingml/2011/main" val="1"/>
             </a:ext>
           </a:extLst>
         </p:spPr>
@@ -19312,7 +19368,7 @@
           </a:ln>
           <a:extLst>
             <a:ext uri="{C572A759-6A51-4108-AA02-DFA0A04FC94B}">
-              <ma14:wrappingTextBoxFlag xmlns:ma14="http://schemas.microsoft.com/office/mac/drawingml/2011/main" xmlns="" val="1"/>
+              <ma14:wrappingTextBoxFlag xmlns="" xmlns:ma14="http://schemas.microsoft.com/office/mac/drawingml/2011/main" val="1"/>
             </a:ext>
           </a:extLst>
         </p:spPr>
@@ -19497,7 +19553,7 @@
           </a:ln>
           <a:extLst>
             <a:ext uri="{C572A759-6A51-4108-AA02-DFA0A04FC94B}">
-              <ma14:wrappingTextBoxFlag xmlns:ma14="http://schemas.microsoft.com/office/mac/drawingml/2011/main" xmlns="" val="1"/>
+              <ma14:wrappingTextBoxFlag xmlns="" xmlns:ma14="http://schemas.microsoft.com/office/mac/drawingml/2011/main" val="1"/>
             </a:ext>
           </a:extLst>
         </p:spPr>
@@ -19542,7 +19598,7 @@
           </a:ln>
           <a:extLst>
             <a:ext uri="{C572A759-6A51-4108-AA02-DFA0A04FC94B}">
-              <ma14:wrappingTextBoxFlag xmlns:ma14="http://schemas.microsoft.com/office/mac/drawingml/2011/main" xmlns="" val="1"/>
+              <ma14:wrappingTextBoxFlag xmlns="" xmlns:ma14="http://schemas.microsoft.com/office/mac/drawingml/2011/main" val="1"/>
             </a:ext>
           </a:extLst>
         </p:spPr>
@@ -19587,7 +19643,7 @@
           </a:ln>
           <a:extLst>
             <a:ext uri="{C572A759-6A51-4108-AA02-DFA0A04FC94B}">
-              <ma14:wrappingTextBoxFlag xmlns:ma14="http://schemas.microsoft.com/office/mac/drawingml/2011/main" xmlns="" val="1"/>
+              <ma14:wrappingTextBoxFlag xmlns="" xmlns:ma14="http://schemas.microsoft.com/office/mac/drawingml/2011/main" val="1"/>
             </a:ext>
           </a:extLst>
         </p:spPr>
@@ -19632,7 +19688,7 @@
           </a:ln>
           <a:extLst>
             <a:ext uri="{C572A759-6A51-4108-AA02-DFA0A04FC94B}">
-              <ma14:wrappingTextBoxFlag xmlns:ma14="http://schemas.microsoft.com/office/mac/drawingml/2011/main" xmlns="" val="1"/>
+              <ma14:wrappingTextBoxFlag xmlns="" xmlns:ma14="http://schemas.microsoft.com/office/mac/drawingml/2011/main" val="1"/>
             </a:ext>
           </a:extLst>
         </p:spPr>
@@ -19712,7 +19768,7 @@
           </a:ln>
           <a:extLst>
             <a:ext uri="{C572A759-6A51-4108-AA02-DFA0A04FC94B}">
-              <ma14:wrappingTextBoxFlag xmlns:ma14="http://schemas.microsoft.com/office/mac/drawingml/2011/main" xmlns="" val="1"/>
+              <ma14:wrappingTextBoxFlag xmlns="" xmlns:ma14="http://schemas.microsoft.com/office/mac/drawingml/2011/main" val="1"/>
             </a:ext>
           </a:extLst>
         </p:spPr>
@@ -19791,7 +19847,7 @@
           </a:ln>
           <a:extLst>
             <a:ext uri="{C572A759-6A51-4108-AA02-DFA0A04FC94B}">
-              <ma14:wrappingTextBoxFlag xmlns:ma14="http://schemas.microsoft.com/office/mac/drawingml/2011/main" xmlns="" val="1"/>
+              <ma14:wrappingTextBoxFlag xmlns="" xmlns:ma14="http://schemas.microsoft.com/office/mac/drawingml/2011/main" val="1"/>
             </a:ext>
           </a:extLst>
         </p:spPr>
@@ -19876,7 +19932,7 @@
           </a:ln>
           <a:extLst>
             <a:ext uri="{C572A759-6A51-4108-AA02-DFA0A04FC94B}">
-              <ma14:wrappingTextBoxFlag xmlns:ma14="http://schemas.microsoft.com/office/mac/drawingml/2011/main" xmlns="" val="1"/>
+              <ma14:wrappingTextBoxFlag xmlns="" xmlns:ma14="http://schemas.microsoft.com/office/mac/drawingml/2011/main" val="1"/>
             </a:ext>
           </a:extLst>
         </p:spPr>
@@ -20151,7 +20207,7 @@
           </a:ln>
           <a:extLst>
             <a:ext uri="{C572A759-6A51-4108-AA02-DFA0A04FC94B}">
-              <ma14:wrappingTextBoxFlag xmlns:ma14="http://schemas.microsoft.com/office/mac/drawingml/2011/main" xmlns="" val="1"/>
+              <ma14:wrappingTextBoxFlag xmlns="" xmlns:ma14="http://schemas.microsoft.com/office/mac/drawingml/2011/main" val="1"/>
             </a:ext>
           </a:extLst>
         </p:spPr>
@@ -20197,7 +20253,7 @@
           </a:ln>
           <a:extLst>
             <a:ext uri="{C572A759-6A51-4108-AA02-DFA0A04FC94B}">
-              <ma14:wrappingTextBoxFlag xmlns:ma14="http://schemas.microsoft.com/office/mac/drawingml/2011/main" xmlns="" val="1"/>
+              <ma14:wrappingTextBoxFlag xmlns="" xmlns:ma14="http://schemas.microsoft.com/office/mac/drawingml/2011/main" val="1"/>
             </a:ext>
           </a:extLst>
         </p:spPr>
@@ -20382,7 +20438,7 @@
           </a:ln>
           <a:extLst>
             <a:ext uri="{C572A759-6A51-4108-AA02-DFA0A04FC94B}">
-              <ma14:wrappingTextBoxFlag xmlns:ma14="http://schemas.microsoft.com/office/mac/drawingml/2011/main" xmlns="" val="1"/>
+              <ma14:wrappingTextBoxFlag xmlns="" xmlns:ma14="http://schemas.microsoft.com/office/mac/drawingml/2011/main" val="1"/>
             </a:ext>
           </a:extLst>
         </p:spPr>
@@ -20427,7 +20483,7 @@
           </a:ln>
           <a:extLst>
             <a:ext uri="{C572A759-6A51-4108-AA02-DFA0A04FC94B}">
-              <ma14:wrappingTextBoxFlag xmlns:ma14="http://schemas.microsoft.com/office/mac/drawingml/2011/main" xmlns="" val="1"/>
+              <ma14:wrappingTextBoxFlag xmlns="" xmlns:ma14="http://schemas.microsoft.com/office/mac/drawingml/2011/main" val="1"/>
             </a:ext>
           </a:extLst>
         </p:spPr>
@@ -20469,7 +20525,7 @@
           </a:ln>
           <a:extLst>
             <a:ext uri="{C572A759-6A51-4108-AA02-DFA0A04FC94B}">
-              <ma14:wrappingTextBoxFlag xmlns:ma14="http://schemas.microsoft.com/office/mac/drawingml/2011/main" xmlns="" val="1"/>
+              <ma14:wrappingTextBoxFlag xmlns="" xmlns:ma14="http://schemas.microsoft.com/office/mac/drawingml/2011/main" val="1"/>
             </a:ext>
           </a:extLst>
         </p:spPr>
@@ -20548,7 +20604,7 @@
           </a:ln>
           <a:extLst>
             <a:ext uri="{C572A759-6A51-4108-AA02-DFA0A04FC94B}">
-              <ma14:wrappingTextBoxFlag xmlns:ma14="http://schemas.microsoft.com/office/mac/drawingml/2011/main" xmlns="" val="1"/>
+              <ma14:wrappingTextBoxFlag xmlns="" xmlns:ma14="http://schemas.microsoft.com/office/mac/drawingml/2011/main" val="1"/>
             </a:ext>
           </a:extLst>
         </p:spPr>
@@ -20709,7 +20765,7 @@
           </a:ln>
           <a:extLst>
             <a:ext uri="{C572A759-6A51-4108-AA02-DFA0A04FC94B}">
-              <ma14:wrappingTextBoxFlag xmlns:ma14="http://schemas.microsoft.com/office/mac/drawingml/2011/main" xmlns="" val="1"/>
+              <ma14:wrappingTextBoxFlag xmlns="" xmlns:ma14="http://schemas.microsoft.com/office/mac/drawingml/2011/main" val="1"/>
             </a:ext>
           </a:extLst>
         </p:spPr>
@@ -20755,7 +20811,7 @@
           </a:ln>
           <a:extLst>
             <a:ext uri="{C572A759-6A51-4108-AA02-DFA0A04FC94B}">
-              <ma14:wrappingTextBoxFlag xmlns:ma14="http://schemas.microsoft.com/office/mac/drawingml/2011/main" xmlns="" val="1"/>
+              <ma14:wrappingTextBoxFlag xmlns="" xmlns:ma14="http://schemas.microsoft.com/office/mac/drawingml/2011/main" val="1"/>
             </a:ext>
           </a:extLst>
         </p:spPr>
@@ -20800,7 +20856,7 @@
           </a:ln>
           <a:extLst>
             <a:ext uri="{C572A759-6A51-4108-AA02-DFA0A04FC94B}">
-              <ma14:wrappingTextBoxFlag xmlns:ma14="http://schemas.microsoft.com/office/mac/drawingml/2011/main" xmlns="" val="1"/>
+              <ma14:wrappingTextBoxFlag xmlns="" xmlns:ma14="http://schemas.microsoft.com/office/mac/drawingml/2011/main" val="1"/>
             </a:ext>
           </a:extLst>
         </p:spPr>
@@ -20845,7 +20901,7 @@
           </a:ln>
           <a:extLst>
             <a:ext uri="{C572A759-6A51-4108-AA02-DFA0A04FC94B}">
-              <ma14:wrappingTextBoxFlag xmlns:ma14="http://schemas.microsoft.com/office/mac/drawingml/2011/main" xmlns="" val="1"/>
+              <ma14:wrappingTextBoxFlag xmlns="" xmlns:ma14="http://schemas.microsoft.com/office/mac/drawingml/2011/main" val="1"/>
             </a:ext>
           </a:extLst>
         </p:spPr>
@@ -21153,7 +21209,7 @@
           </a:ln>
           <a:extLst>
             <a:ext uri="{C572A759-6A51-4108-AA02-DFA0A04FC94B}">
-              <ma14:wrappingTextBoxFlag xmlns:ma14="http://schemas.microsoft.com/office/mac/drawingml/2011/main" xmlns="" val="1"/>
+              <ma14:wrappingTextBoxFlag xmlns="" xmlns:ma14="http://schemas.microsoft.com/office/mac/drawingml/2011/main" val="1"/>
             </a:ext>
           </a:extLst>
         </p:spPr>
@@ -21267,7 +21323,7 @@
           </a:ln>
           <a:extLst>
             <a:ext uri="{C572A759-6A51-4108-AA02-DFA0A04FC94B}">
-              <ma14:wrappingTextBoxFlag xmlns:ma14="http://schemas.microsoft.com/office/mac/drawingml/2011/main" xmlns="" val="1"/>
+              <ma14:wrappingTextBoxFlag xmlns="" xmlns:ma14="http://schemas.microsoft.com/office/mac/drawingml/2011/main" val="1"/>
             </a:ext>
           </a:extLst>
         </p:spPr>
@@ -21312,7 +21368,7 @@
           </a:ln>
           <a:extLst>
             <a:ext uri="{C572A759-6A51-4108-AA02-DFA0A04FC94B}">
-              <ma14:wrappingTextBoxFlag xmlns:ma14="http://schemas.microsoft.com/office/mac/drawingml/2011/main" xmlns="" val="1"/>
+              <ma14:wrappingTextBoxFlag xmlns="" xmlns:ma14="http://schemas.microsoft.com/office/mac/drawingml/2011/main" val="1"/>
             </a:ext>
           </a:extLst>
         </p:spPr>
@@ -21354,7 +21410,7 @@
           </a:ln>
           <a:extLst>
             <a:ext uri="{C572A759-6A51-4108-AA02-DFA0A04FC94B}">
-              <ma14:wrappingTextBoxFlag xmlns:ma14="http://schemas.microsoft.com/office/mac/drawingml/2011/main" xmlns="" val="1"/>
+              <ma14:wrappingTextBoxFlag xmlns="" xmlns:ma14="http://schemas.microsoft.com/office/mac/drawingml/2011/main" val="1"/>
             </a:ext>
           </a:extLst>
         </p:spPr>
@@ -21433,7 +21489,7 @@
           </a:ln>
           <a:extLst>
             <a:ext uri="{C572A759-6A51-4108-AA02-DFA0A04FC94B}">
-              <ma14:wrappingTextBoxFlag xmlns:ma14="http://schemas.microsoft.com/office/mac/drawingml/2011/main" xmlns="" val="1"/>
+              <ma14:wrappingTextBoxFlag xmlns="" xmlns:ma14="http://schemas.microsoft.com/office/mac/drawingml/2011/main" val="1"/>
             </a:ext>
           </a:extLst>
         </p:spPr>
@@ -21559,7 +21615,7 @@
           </a:ln>
           <a:extLst>
             <a:ext uri="{C572A759-6A51-4108-AA02-DFA0A04FC94B}">
-              <ma14:wrappingTextBoxFlag xmlns:ma14="http://schemas.microsoft.com/office/mac/drawingml/2011/main" xmlns="" val="1"/>
+              <ma14:wrappingTextBoxFlag xmlns="" xmlns:ma14="http://schemas.microsoft.com/office/mac/drawingml/2011/main" val="1"/>
             </a:ext>
           </a:extLst>
         </p:spPr>
@@ -21604,7 +21660,7 @@
           </a:ln>
           <a:extLst>
             <a:ext uri="{C572A759-6A51-4108-AA02-DFA0A04FC94B}">
-              <ma14:wrappingTextBoxFlag xmlns:ma14="http://schemas.microsoft.com/office/mac/drawingml/2011/main" xmlns="" val="1"/>
+              <ma14:wrappingTextBoxFlag xmlns="" xmlns:ma14="http://schemas.microsoft.com/office/mac/drawingml/2011/main" val="1"/>
             </a:ext>
           </a:extLst>
         </p:spPr>
@@ -21649,7 +21705,7 @@
           </a:ln>
           <a:extLst>
             <a:ext uri="{C572A759-6A51-4108-AA02-DFA0A04FC94B}">
-              <ma14:wrappingTextBoxFlag xmlns:ma14="http://schemas.microsoft.com/office/mac/drawingml/2011/main" xmlns="" val="1"/>
+              <ma14:wrappingTextBoxFlag xmlns="" xmlns:ma14="http://schemas.microsoft.com/office/mac/drawingml/2011/main" val="1"/>
             </a:ext>
           </a:extLst>
         </p:spPr>
@@ -21957,7 +22013,7 @@
           </a:ln>
           <a:extLst>
             <a:ext uri="{C572A759-6A51-4108-AA02-DFA0A04FC94B}">
-              <ma14:wrappingTextBoxFlag xmlns:ma14="http://schemas.microsoft.com/office/mac/drawingml/2011/main" xmlns="" val="1"/>
+              <ma14:wrappingTextBoxFlag xmlns="" xmlns:ma14="http://schemas.microsoft.com/office/mac/drawingml/2011/main" val="1"/>
             </a:ext>
           </a:extLst>
         </p:spPr>
@@ -22068,7 +22124,7 @@
           </a:ln>
           <a:extLst>
             <a:ext uri="{C572A759-6A51-4108-AA02-DFA0A04FC94B}">
-              <ma14:wrappingTextBoxFlag xmlns:ma14="http://schemas.microsoft.com/office/mac/drawingml/2011/main" xmlns="" val="1"/>
+              <ma14:wrappingTextBoxFlag xmlns="" xmlns:ma14="http://schemas.microsoft.com/office/mac/drawingml/2011/main" val="1"/>
             </a:ext>
           </a:extLst>
         </p:spPr>
@@ -22112,7 +22168,7 @@
           </a:ln>
           <a:extLst>
             <a:ext uri="{C572A759-6A51-4108-AA02-DFA0A04FC94B}">
-              <ma14:wrappingTextBoxFlag xmlns:ma14="http://schemas.microsoft.com/office/mac/drawingml/2011/main" xmlns="" val="1"/>
+              <ma14:wrappingTextBoxFlag xmlns="" xmlns:ma14="http://schemas.microsoft.com/office/mac/drawingml/2011/main" val="1"/>
             </a:ext>
           </a:extLst>
         </p:spPr>
@@ -22157,7 +22213,7 @@
           </a:ln>
           <a:extLst>
             <a:ext uri="{C572A759-6A51-4108-AA02-DFA0A04FC94B}">
-              <ma14:wrappingTextBoxFlag xmlns:ma14="http://schemas.microsoft.com/office/mac/drawingml/2011/main" xmlns="" val="1"/>
+              <ma14:wrappingTextBoxFlag xmlns="" xmlns:ma14="http://schemas.microsoft.com/office/mac/drawingml/2011/main" val="1"/>
             </a:ext>
           </a:extLst>
         </p:spPr>
@@ -22237,7 +22293,7 @@
           </a:ln>
           <a:extLst>
             <a:ext uri="{C572A759-6A51-4108-AA02-DFA0A04FC94B}">
-              <ma14:wrappingTextBoxFlag xmlns:ma14="http://schemas.microsoft.com/office/mac/drawingml/2011/main" xmlns="" val="1"/>
+              <ma14:wrappingTextBoxFlag xmlns="" xmlns:ma14="http://schemas.microsoft.com/office/mac/drawingml/2011/main" val="1"/>
             </a:ext>
           </a:extLst>
         </p:spPr>
@@ -22325,7 +22381,7 @@
           </a:ln>
           <a:extLst>
             <a:ext uri="{C572A759-6A51-4108-AA02-DFA0A04FC94B}">
-              <ma14:wrappingTextBoxFlag xmlns:ma14="http://schemas.microsoft.com/office/mac/drawingml/2011/main" xmlns="" val="1"/>
+              <ma14:wrappingTextBoxFlag xmlns="" xmlns:ma14="http://schemas.microsoft.com/office/mac/drawingml/2011/main" val="1"/>
             </a:ext>
           </a:extLst>
         </p:spPr>
@@ -22370,7 +22426,7 @@
           </a:ln>
           <a:extLst>
             <a:ext uri="{C572A759-6A51-4108-AA02-DFA0A04FC94B}">
-              <ma14:wrappingTextBoxFlag xmlns:ma14="http://schemas.microsoft.com/office/mac/drawingml/2011/main" xmlns="" val="1"/>
+              <ma14:wrappingTextBoxFlag xmlns="" xmlns:ma14="http://schemas.microsoft.com/office/mac/drawingml/2011/main" val="1"/>
             </a:ext>
           </a:extLst>
         </p:spPr>
@@ -22415,7 +22471,7 @@
           </a:ln>
           <a:extLst>
             <a:ext uri="{C572A759-6A51-4108-AA02-DFA0A04FC94B}">
-              <ma14:wrappingTextBoxFlag xmlns:ma14="http://schemas.microsoft.com/office/mac/drawingml/2011/main" xmlns="" val="1"/>
+              <ma14:wrappingTextBoxFlag xmlns="" xmlns:ma14="http://schemas.microsoft.com/office/mac/drawingml/2011/main" val="1"/>
             </a:ext>
           </a:extLst>
         </p:spPr>
@@ -22609,7 +22665,7 @@
           </a:ln>
           <a:extLst>
             <a:ext uri="{C572A759-6A51-4108-AA02-DFA0A04FC94B}">
-              <ma14:wrappingTextBoxFlag xmlns:ma14="http://schemas.microsoft.com/office/mac/drawingml/2011/main" xmlns="" val="1"/>
+              <ma14:wrappingTextBoxFlag xmlns="" xmlns:ma14="http://schemas.microsoft.com/office/mac/drawingml/2011/main" val="1"/>
             </a:ext>
           </a:extLst>
         </p:spPr>
@@ -22720,7 +22776,7 @@
           </a:ln>
           <a:extLst>
             <a:ext uri="{C572A759-6A51-4108-AA02-DFA0A04FC94B}">
-              <ma14:wrappingTextBoxFlag xmlns:ma14="http://schemas.microsoft.com/office/mac/drawingml/2011/main" xmlns="" val="1"/>
+              <ma14:wrappingTextBoxFlag xmlns="" xmlns:ma14="http://schemas.microsoft.com/office/mac/drawingml/2011/main" val="1"/>
             </a:ext>
           </a:extLst>
         </p:spPr>
@@ -22764,7 +22820,7 @@
           </a:ln>
           <a:extLst>
             <a:ext uri="{C572A759-6A51-4108-AA02-DFA0A04FC94B}">
-              <ma14:wrappingTextBoxFlag xmlns:ma14="http://schemas.microsoft.com/office/mac/drawingml/2011/main" xmlns="" val="1"/>
+              <ma14:wrappingTextBoxFlag xmlns="" xmlns:ma14="http://schemas.microsoft.com/office/mac/drawingml/2011/main" val="1"/>
             </a:ext>
           </a:extLst>
         </p:spPr>
@@ -22809,7 +22865,7 @@
           </a:ln>
           <a:extLst>
             <a:ext uri="{C572A759-6A51-4108-AA02-DFA0A04FC94B}">
-              <ma14:wrappingTextBoxFlag xmlns:ma14="http://schemas.microsoft.com/office/mac/drawingml/2011/main" xmlns="" val="1"/>
+              <ma14:wrappingTextBoxFlag xmlns="" xmlns:ma14="http://schemas.microsoft.com/office/mac/drawingml/2011/main" val="1"/>
             </a:ext>
           </a:extLst>
         </p:spPr>
@@ -22889,7 +22945,7 @@
           </a:ln>
           <a:extLst>
             <a:ext uri="{C572A759-6A51-4108-AA02-DFA0A04FC94B}">
-              <ma14:wrappingTextBoxFlag xmlns:ma14="http://schemas.microsoft.com/office/mac/drawingml/2011/main" xmlns="" val="1"/>
+              <ma14:wrappingTextBoxFlag xmlns="" xmlns:ma14="http://schemas.microsoft.com/office/mac/drawingml/2011/main" val="1"/>
             </a:ext>
           </a:extLst>
         </p:spPr>
@@ -22977,7 +23033,7 @@
           </a:ln>
           <a:extLst>
             <a:ext uri="{C572A759-6A51-4108-AA02-DFA0A04FC94B}">
-              <ma14:wrappingTextBoxFlag xmlns:ma14="http://schemas.microsoft.com/office/mac/drawingml/2011/main" xmlns="" val="1"/>
+              <ma14:wrappingTextBoxFlag xmlns="" xmlns:ma14="http://schemas.microsoft.com/office/mac/drawingml/2011/main" val="1"/>
             </a:ext>
           </a:extLst>
         </p:spPr>
@@ -23022,7 +23078,7 @@
           </a:ln>
           <a:extLst>
             <a:ext uri="{C572A759-6A51-4108-AA02-DFA0A04FC94B}">
-              <ma14:wrappingTextBoxFlag xmlns:ma14="http://schemas.microsoft.com/office/mac/drawingml/2011/main" xmlns="" val="1"/>
+              <ma14:wrappingTextBoxFlag xmlns="" xmlns:ma14="http://schemas.microsoft.com/office/mac/drawingml/2011/main" val="1"/>
             </a:ext>
           </a:extLst>
         </p:spPr>
@@ -23067,7 +23123,7 @@
           </a:ln>
           <a:extLst>
             <a:ext uri="{C572A759-6A51-4108-AA02-DFA0A04FC94B}">
-              <ma14:wrappingTextBoxFlag xmlns:ma14="http://schemas.microsoft.com/office/mac/drawingml/2011/main" xmlns="" val="1"/>
+              <ma14:wrappingTextBoxFlag xmlns="" xmlns:ma14="http://schemas.microsoft.com/office/mac/drawingml/2011/main" val="1"/>
             </a:ext>
           </a:extLst>
         </p:spPr>
@@ -23261,7 +23317,7 @@
           </a:ln>
           <a:extLst>
             <a:ext uri="{C572A759-6A51-4108-AA02-DFA0A04FC94B}">
-              <ma14:wrappingTextBoxFlag xmlns:ma14="http://schemas.microsoft.com/office/mac/drawingml/2011/main" xmlns="" val="1"/>
+              <ma14:wrappingTextBoxFlag xmlns="" xmlns:ma14="http://schemas.microsoft.com/office/mac/drawingml/2011/main" val="1"/>
             </a:ext>
           </a:extLst>
         </p:spPr>
@@ -23384,7 +23440,7 @@
           </a:ln>
           <a:extLst>
             <a:ext uri="{C572A759-6A51-4108-AA02-DFA0A04FC94B}">
-              <ma14:wrappingTextBoxFlag xmlns:ma14="http://schemas.microsoft.com/office/mac/drawingml/2011/main" xmlns="" val="1"/>
+              <ma14:wrappingTextBoxFlag xmlns="" xmlns:ma14="http://schemas.microsoft.com/office/mac/drawingml/2011/main" val="1"/>
             </a:ext>
           </a:extLst>
         </p:spPr>
@@ -23423,7 +23479,7 @@
           </a:ln>
           <a:extLst>
             <a:ext uri="{C572A759-6A51-4108-AA02-DFA0A04FC94B}">
-              <ma14:wrappingTextBoxFlag xmlns:ma14="http://schemas.microsoft.com/office/mac/drawingml/2011/main" xmlns="" val="1"/>
+              <ma14:wrappingTextBoxFlag xmlns="" xmlns:ma14="http://schemas.microsoft.com/office/mac/drawingml/2011/main" val="1"/>
             </a:ext>
           </a:extLst>
         </p:spPr>
@@ -23587,7 +23643,7 @@
           </a:ln>
           <a:extLst>
             <a:ext uri="{C572A759-6A51-4108-AA02-DFA0A04FC94B}">
-              <ma14:wrappingTextBoxFlag xmlns:ma14="http://schemas.microsoft.com/office/mac/drawingml/2011/main" xmlns="" val="1"/>
+              <ma14:wrappingTextBoxFlag xmlns="" xmlns:ma14="http://schemas.microsoft.com/office/mac/drawingml/2011/main" val="1"/>
             </a:ext>
           </a:extLst>
         </p:spPr>
@@ -23631,7 +23687,7 @@
           </a:ln>
           <a:extLst>
             <a:ext uri="{C572A759-6A51-4108-AA02-DFA0A04FC94B}">
-              <ma14:wrappingTextBoxFlag xmlns:ma14="http://schemas.microsoft.com/office/mac/drawingml/2011/main" xmlns="" val="1"/>
+              <ma14:wrappingTextBoxFlag xmlns="" xmlns:ma14="http://schemas.microsoft.com/office/mac/drawingml/2011/main" val="1"/>
             </a:ext>
           </a:extLst>
         </p:spPr>
@@ -23676,7 +23732,7 @@
           </a:ln>
           <a:extLst>
             <a:ext uri="{C572A759-6A51-4108-AA02-DFA0A04FC94B}">
-              <ma14:wrappingTextBoxFlag xmlns:ma14="http://schemas.microsoft.com/office/mac/drawingml/2011/main" xmlns="" val="1"/>
+              <ma14:wrappingTextBoxFlag xmlns="" xmlns:ma14="http://schemas.microsoft.com/office/mac/drawingml/2011/main" val="1"/>
             </a:ext>
           </a:extLst>
         </p:spPr>
@@ -23756,7 +23812,7 @@
           </a:ln>
           <a:extLst>
             <a:ext uri="{C572A759-6A51-4108-AA02-DFA0A04FC94B}">
-              <ma14:wrappingTextBoxFlag xmlns:ma14="http://schemas.microsoft.com/office/mac/drawingml/2011/main" xmlns="" val="1"/>
+              <ma14:wrappingTextBoxFlag xmlns="" xmlns:ma14="http://schemas.microsoft.com/office/mac/drawingml/2011/main" val="1"/>
             </a:ext>
           </a:extLst>
         </p:spPr>
@@ -23844,7 +23900,7 @@
           </a:ln>
           <a:extLst>
             <a:ext uri="{C572A759-6A51-4108-AA02-DFA0A04FC94B}">
-              <ma14:wrappingTextBoxFlag xmlns:ma14="http://schemas.microsoft.com/office/mac/drawingml/2011/main" xmlns="" val="1"/>
+              <ma14:wrappingTextBoxFlag xmlns="" xmlns:ma14="http://schemas.microsoft.com/office/mac/drawingml/2011/main" val="1"/>
             </a:ext>
           </a:extLst>
         </p:spPr>
@@ -23889,7 +23945,7 @@
           </a:ln>
           <a:extLst>
             <a:ext uri="{C572A759-6A51-4108-AA02-DFA0A04FC94B}">
-              <ma14:wrappingTextBoxFlag xmlns:ma14="http://schemas.microsoft.com/office/mac/drawingml/2011/main" xmlns="" val="1"/>
+              <ma14:wrappingTextBoxFlag xmlns="" xmlns:ma14="http://schemas.microsoft.com/office/mac/drawingml/2011/main" val="1"/>
             </a:ext>
           </a:extLst>
         </p:spPr>
@@ -23934,7 +23990,7 @@
           </a:ln>
           <a:extLst>
             <a:ext uri="{C572A759-6A51-4108-AA02-DFA0A04FC94B}">
-              <ma14:wrappingTextBoxFlag xmlns:ma14="http://schemas.microsoft.com/office/mac/drawingml/2011/main" xmlns="" val="1"/>
+              <ma14:wrappingTextBoxFlag xmlns="" xmlns:ma14="http://schemas.microsoft.com/office/mac/drawingml/2011/main" val="1"/>
             </a:ext>
           </a:extLst>
         </p:spPr>
@@ -24128,7 +24184,7 @@
           </a:ln>
           <a:extLst>
             <a:ext uri="{C572A759-6A51-4108-AA02-DFA0A04FC94B}">
-              <ma14:wrappingTextBoxFlag xmlns:ma14="http://schemas.microsoft.com/office/mac/drawingml/2011/main" xmlns="" val="1"/>
+              <ma14:wrappingTextBoxFlag xmlns="" xmlns:ma14="http://schemas.microsoft.com/office/mac/drawingml/2011/main" val="1"/>
             </a:ext>
           </a:extLst>
         </p:spPr>
@@ -24251,7 +24307,7 @@
           </a:ln>
           <a:extLst>
             <a:ext uri="{C572A759-6A51-4108-AA02-DFA0A04FC94B}">
-              <ma14:wrappingTextBoxFlag xmlns:ma14="http://schemas.microsoft.com/office/mac/drawingml/2011/main" xmlns="" val="1"/>
+              <ma14:wrappingTextBoxFlag xmlns="" xmlns:ma14="http://schemas.microsoft.com/office/mac/drawingml/2011/main" val="1"/>
             </a:ext>
           </a:extLst>
         </p:spPr>
@@ -24290,7 +24346,7 @@
           </a:ln>
           <a:extLst>
             <a:ext uri="{C572A759-6A51-4108-AA02-DFA0A04FC94B}">
-              <ma14:wrappingTextBoxFlag xmlns:ma14="http://schemas.microsoft.com/office/mac/drawingml/2011/main" xmlns="" val="1"/>
+              <ma14:wrappingTextBoxFlag xmlns="" xmlns:ma14="http://schemas.microsoft.com/office/mac/drawingml/2011/main" val="1"/>
             </a:ext>
           </a:extLst>
         </p:spPr>
@@ -24393,7 +24449,7 @@
           </a:ln>
           <a:extLst>
             <a:ext uri="{C572A759-6A51-4108-AA02-DFA0A04FC94B}">
-              <ma14:wrappingTextBoxFlag xmlns:ma14="http://schemas.microsoft.com/office/mac/drawingml/2011/main" xmlns="" val="1"/>
+              <ma14:wrappingTextBoxFlag xmlns="" xmlns:ma14="http://schemas.microsoft.com/office/mac/drawingml/2011/main" val="1"/>
             </a:ext>
           </a:extLst>
         </p:spPr>
@@ -24437,7 +24493,7 @@
           </a:ln>
           <a:extLst>
             <a:ext uri="{C572A759-6A51-4108-AA02-DFA0A04FC94B}">
-              <ma14:wrappingTextBoxFlag xmlns:ma14="http://schemas.microsoft.com/office/mac/drawingml/2011/main" xmlns="" val="1"/>
+              <ma14:wrappingTextBoxFlag xmlns="" xmlns:ma14="http://schemas.microsoft.com/office/mac/drawingml/2011/main" val="1"/>
             </a:ext>
           </a:extLst>
         </p:spPr>
@@ -24482,7 +24538,7 @@
           </a:ln>
           <a:extLst>
             <a:ext uri="{C572A759-6A51-4108-AA02-DFA0A04FC94B}">
-              <ma14:wrappingTextBoxFlag xmlns:ma14="http://schemas.microsoft.com/office/mac/drawingml/2011/main" xmlns="" val="1"/>
+              <ma14:wrappingTextBoxFlag xmlns="" xmlns:ma14="http://schemas.microsoft.com/office/mac/drawingml/2011/main" val="1"/>
             </a:ext>
           </a:extLst>
         </p:spPr>
@@ -24562,7 +24618,7 @@
           </a:ln>
           <a:extLst>
             <a:ext uri="{C572A759-6A51-4108-AA02-DFA0A04FC94B}">
-              <ma14:wrappingTextBoxFlag xmlns:ma14="http://schemas.microsoft.com/office/mac/drawingml/2011/main" xmlns="" val="1"/>
+              <ma14:wrappingTextBoxFlag xmlns="" xmlns:ma14="http://schemas.microsoft.com/office/mac/drawingml/2011/main" val="1"/>
             </a:ext>
           </a:extLst>
         </p:spPr>
@@ -24650,7 +24706,7 @@
           </a:ln>
           <a:extLst>
             <a:ext uri="{C572A759-6A51-4108-AA02-DFA0A04FC94B}">
-              <ma14:wrappingTextBoxFlag xmlns:ma14="http://schemas.microsoft.com/office/mac/drawingml/2011/main" xmlns="" val="1"/>
+              <ma14:wrappingTextBoxFlag xmlns="" xmlns:ma14="http://schemas.microsoft.com/office/mac/drawingml/2011/main" val="1"/>
             </a:ext>
           </a:extLst>
         </p:spPr>
@@ -24695,7 +24751,7 @@
           </a:ln>
           <a:extLst>
             <a:ext uri="{C572A759-6A51-4108-AA02-DFA0A04FC94B}">
-              <ma14:wrappingTextBoxFlag xmlns:ma14="http://schemas.microsoft.com/office/mac/drawingml/2011/main" xmlns="" val="1"/>
+              <ma14:wrappingTextBoxFlag xmlns="" xmlns:ma14="http://schemas.microsoft.com/office/mac/drawingml/2011/main" val="1"/>
             </a:ext>
           </a:extLst>
         </p:spPr>
@@ -24740,7 +24796,7 @@
           </a:ln>
           <a:extLst>
             <a:ext uri="{C572A759-6A51-4108-AA02-DFA0A04FC94B}">
-              <ma14:wrappingTextBoxFlag xmlns:ma14="http://schemas.microsoft.com/office/mac/drawingml/2011/main" xmlns="" val="1"/>
+              <ma14:wrappingTextBoxFlag xmlns="" xmlns:ma14="http://schemas.microsoft.com/office/mac/drawingml/2011/main" val="1"/>
             </a:ext>
           </a:extLst>
         </p:spPr>
@@ -24934,7 +24990,7 @@
           </a:ln>
           <a:extLst>
             <a:ext uri="{C572A759-6A51-4108-AA02-DFA0A04FC94B}">
-              <ma14:wrappingTextBoxFlag xmlns:ma14="http://schemas.microsoft.com/office/mac/drawingml/2011/main" xmlns="" val="1"/>
+              <ma14:wrappingTextBoxFlag xmlns="" xmlns:ma14="http://schemas.microsoft.com/office/mac/drawingml/2011/main" val="1"/>
             </a:ext>
           </a:extLst>
         </p:spPr>
@@ -25057,7 +25113,7 @@
           </a:ln>
           <a:extLst>
             <a:ext uri="{C572A759-6A51-4108-AA02-DFA0A04FC94B}">
-              <ma14:wrappingTextBoxFlag xmlns:ma14="http://schemas.microsoft.com/office/mac/drawingml/2011/main" xmlns="" val="1"/>
+              <ma14:wrappingTextBoxFlag xmlns="" xmlns:ma14="http://schemas.microsoft.com/office/mac/drawingml/2011/main" val="1"/>
             </a:ext>
           </a:extLst>
         </p:spPr>
@@ -25096,7 +25152,7 @@
           </a:ln>
           <a:extLst>
             <a:ext uri="{C572A759-6A51-4108-AA02-DFA0A04FC94B}">
-              <ma14:wrappingTextBoxFlag xmlns:ma14="http://schemas.microsoft.com/office/mac/drawingml/2011/main" xmlns="" val="1"/>
+              <ma14:wrappingTextBoxFlag xmlns="" xmlns:ma14="http://schemas.microsoft.com/office/mac/drawingml/2011/main" val="1"/>
             </a:ext>
           </a:extLst>
         </p:spPr>
@@ -25199,7 +25255,7 @@
           </a:ln>
           <a:extLst>
             <a:ext uri="{C572A759-6A51-4108-AA02-DFA0A04FC94B}">
-              <ma14:wrappingTextBoxFlag xmlns:ma14="http://schemas.microsoft.com/office/mac/drawingml/2011/main" xmlns="" val="1"/>
+              <ma14:wrappingTextBoxFlag xmlns="" xmlns:ma14="http://schemas.microsoft.com/office/mac/drawingml/2011/main" val="1"/>
             </a:ext>
           </a:extLst>
         </p:spPr>
@@ -25243,7 +25299,7 @@
           </a:ln>
           <a:extLst>
             <a:ext uri="{C572A759-6A51-4108-AA02-DFA0A04FC94B}">
-              <ma14:wrappingTextBoxFlag xmlns:ma14="http://schemas.microsoft.com/office/mac/drawingml/2011/main" xmlns="" val="1"/>
+              <ma14:wrappingTextBoxFlag xmlns="" xmlns:ma14="http://schemas.microsoft.com/office/mac/drawingml/2011/main" val="1"/>
             </a:ext>
           </a:extLst>
         </p:spPr>
@@ -25288,7 +25344,7 @@
           </a:ln>
           <a:extLst>
             <a:ext uri="{C572A759-6A51-4108-AA02-DFA0A04FC94B}">
-              <ma14:wrappingTextBoxFlag xmlns:ma14="http://schemas.microsoft.com/office/mac/drawingml/2011/main" xmlns="" val="1"/>
+              <ma14:wrappingTextBoxFlag xmlns="" xmlns:ma14="http://schemas.microsoft.com/office/mac/drawingml/2011/main" val="1"/>
             </a:ext>
           </a:extLst>
         </p:spPr>
@@ -25368,7 +25424,7 @@
           </a:ln>
           <a:extLst>
             <a:ext uri="{C572A759-6A51-4108-AA02-DFA0A04FC94B}">
-              <ma14:wrappingTextBoxFlag xmlns:ma14="http://schemas.microsoft.com/office/mac/drawingml/2011/main" xmlns="" val="1"/>
+              <ma14:wrappingTextBoxFlag xmlns="" xmlns:ma14="http://schemas.microsoft.com/office/mac/drawingml/2011/main" val="1"/>
             </a:ext>
           </a:extLst>
         </p:spPr>
@@ -25456,7 +25512,7 @@
           </a:ln>
           <a:extLst>
             <a:ext uri="{C572A759-6A51-4108-AA02-DFA0A04FC94B}">
-              <ma14:wrappingTextBoxFlag xmlns:ma14="http://schemas.microsoft.com/office/mac/drawingml/2011/main" xmlns="" val="1"/>
+              <ma14:wrappingTextBoxFlag xmlns="" xmlns:ma14="http://schemas.microsoft.com/office/mac/drawingml/2011/main" val="1"/>
             </a:ext>
           </a:extLst>
         </p:spPr>
@@ -25501,7 +25557,7 @@
           </a:ln>
           <a:extLst>
             <a:ext uri="{C572A759-6A51-4108-AA02-DFA0A04FC94B}">
-              <ma14:wrappingTextBoxFlag xmlns:ma14="http://schemas.microsoft.com/office/mac/drawingml/2011/main" xmlns="" val="1"/>
+              <ma14:wrappingTextBoxFlag xmlns="" xmlns:ma14="http://schemas.microsoft.com/office/mac/drawingml/2011/main" val="1"/>
             </a:ext>
           </a:extLst>
         </p:spPr>
@@ -25546,7 +25602,7 @@
           </a:ln>
           <a:extLst>
             <a:ext uri="{C572A759-6A51-4108-AA02-DFA0A04FC94B}">
-              <ma14:wrappingTextBoxFlag xmlns:ma14="http://schemas.microsoft.com/office/mac/drawingml/2011/main" xmlns="" val="1"/>
+              <ma14:wrappingTextBoxFlag xmlns="" xmlns:ma14="http://schemas.microsoft.com/office/mac/drawingml/2011/main" val="1"/>
             </a:ext>
           </a:extLst>
         </p:spPr>
@@ -25740,7 +25796,7 @@
           </a:ln>
           <a:extLst>
             <a:ext uri="{C572A759-6A51-4108-AA02-DFA0A04FC94B}">
-              <ma14:wrappingTextBoxFlag xmlns:ma14="http://schemas.microsoft.com/office/mac/drawingml/2011/main" xmlns="" val="1"/>
+              <ma14:wrappingTextBoxFlag xmlns="" xmlns:ma14="http://schemas.microsoft.com/office/mac/drawingml/2011/main" val="1"/>
             </a:ext>
           </a:extLst>
         </p:spPr>
@@ -25863,7 +25919,7 @@
           </a:ln>
           <a:extLst>
             <a:ext uri="{C572A759-6A51-4108-AA02-DFA0A04FC94B}">
-              <ma14:wrappingTextBoxFlag xmlns:ma14="http://schemas.microsoft.com/office/mac/drawingml/2011/main" xmlns="" val="1"/>
+              <ma14:wrappingTextBoxFlag xmlns="" xmlns:ma14="http://schemas.microsoft.com/office/mac/drawingml/2011/main" val="1"/>
             </a:ext>
           </a:extLst>
         </p:spPr>
@@ -25902,7 +25958,7 @@
           </a:ln>
           <a:extLst>
             <a:ext uri="{C572A759-6A51-4108-AA02-DFA0A04FC94B}">
-              <ma14:wrappingTextBoxFlag xmlns:ma14="http://schemas.microsoft.com/office/mac/drawingml/2011/main" xmlns="" val="1"/>
+              <ma14:wrappingTextBoxFlag xmlns="" xmlns:ma14="http://schemas.microsoft.com/office/mac/drawingml/2011/main" val="1"/>
             </a:ext>
           </a:extLst>
         </p:spPr>
@@ -25979,7 +26035,7 @@
           </a:ln>
           <a:extLst>
             <a:ext uri="{C572A759-6A51-4108-AA02-DFA0A04FC94B}">
-              <ma14:wrappingTextBoxFlag xmlns:ma14="http://schemas.microsoft.com/office/mac/drawingml/2011/main" xmlns="" val="1"/>
+              <ma14:wrappingTextBoxFlag xmlns="" xmlns:ma14="http://schemas.microsoft.com/office/mac/drawingml/2011/main" val="1"/>
             </a:ext>
           </a:extLst>
         </p:spPr>
@@ -26082,7 +26138,7 @@
           </a:ln>
           <a:extLst>
             <a:ext uri="{C572A759-6A51-4108-AA02-DFA0A04FC94B}">
-              <ma14:wrappingTextBoxFlag xmlns:ma14="http://schemas.microsoft.com/office/mac/drawingml/2011/main" xmlns="" val="1"/>
+              <ma14:wrappingTextBoxFlag xmlns="" xmlns:ma14="http://schemas.microsoft.com/office/mac/drawingml/2011/main" val="1"/>
             </a:ext>
           </a:extLst>
         </p:spPr>
@@ -26126,7 +26182,7 @@
           </a:ln>
           <a:extLst>
             <a:ext uri="{C572A759-6A51-4108-AA02-DFA0A04FC94B}">
-              <ma14:wrappingTextBoxFlag xmlns:ma14="http://schemas.microsoft.com/office/mac/drawingml/2011/main" xmlns="" val="1"/>
+              <ma14:wrappingTextBoxFlag xmlns="" xmlns:ma14="http://schemas.microsoft.com/office/mac/drawingml/2011/main" val="1"/>
             </a:ext>
           </a:extLst>
         </p:spPr>
@@ -26171,7 +26227,7 @@
           </a:ln>
           <a:extLst>
             <a:ext uri="{C572A759-6A51-4108-AA02-DFA0A04FC94B}">
-              <ma14:wrappingTextBoxFlag xmlns:ma14="http://schemas.microsoft.com/office/mac/drawingml/2011/main" xmlns="" val="1"/>
+              <ma14:wrappingTextBoxFlag xmlns="" xmlns:ma14="http://schemas.microsoft.com/office/mac/drawingml/2011/main" val="1"/>
             </a:ext>
           </a:extLst>
         </p:spPr>
@@ -26251,7 +26307,7 @@
           </a:ln>
           <a:extLst>
             <a:ext uri="{C572A759-6A51-4108-AA02-DFA0A04FC94B}">
-              <ma14:wrappingTextBoxFlag xmlns:ma14="http://schemas.microsoft.com/office/mac/drawingml/2011/main" xmlns="" val="1"/>
+              <ma14:wrappingTextBoxFlag xmlns="" xmlns:ma14="http://schemas.microsoft.com/office/mac/drawingml/2011/main" val="1"/>
             </a:ext>
           </a:extLst>
         </p:spPr>
@@ -26339,7 +26395,7 @@
           </a:ln>
           <a:extLst>
             <a:ext uri="{C572A759-6A51-4108-AA02-DFA0A04FC94B}">
-              <ma14:wrappingTextBoxFlag xmlns:ma14="http://schemas.microsoft.com/office/mac/drawingml/2011/main" xmlns="" val="1"/>
+              <ma14:wrappingTextBoxFlag xmlns="" xmlns:ma14="http://schemas.microsoft.com/office/mac/drawingml/2011/main" val="1"/>
             </a:ext>
           </a:extLst>
         </p:spPr>
@@ -26384,7 +26440,7 @@
           </a:ln>
           <a:extLst>
             <a:ext uri="{C572A759-6A51-4108-AA02-DFA0A04FC94B}">
-              <ma14:wrappingTextBoxFlag xmlns:ma14="http://schemas.microsoft.com/office/mac/drawingml/2011/main" xmlns="" val="1"/>
+              <ma14:wrappingTextBoxFlag xmlns="" xmlns:ma14="http://schemas.microsoft.com/office/mac/drawingml/2011/main" val="1"/>
             </a:ext>
           </a:extLst>
         </p:spPr>
@@ -26429,7 +26485,7 @@
           </a:ln>
           <a:extLst>
             <a:ext uri="{C572A759-6A51-4108-AA02-DFA0A04FC94B}">
-              <ma14:wrappingTextBoxFlag xmlns:ma14="http://schemas.microsoft.com/office/mac/drawingml/2011/main" xmlns="" val="1"/>
+              <ma14:wrappingTextBoxFlag xmlns="" xmlns:ma14="http://schemas.microsoft.com/office/mac/drawingml/2011/main" val="1"/>
             </a:ext>
           </a:extLst>
         </p:spPr>
@@ -26623,7 +26679,7 @@
           </a:ln>
           <a:extLst>
             <a:ext uri="{C572A759-6A51-4108-AA02-DFA0A04FC94B}">
-              <ma14:wrappingTextBoxFlag xmlns:ma14="http://schemas.microsoft.com/office/mac/drawingml/2011/main" xmlns="" val="1"/>
+              <ma14:wrappingTextBoxFlag xmlns="" xmlns:ma14="http://schemas.microsoft.com/office/mac/drawingml/2011/main" val="1"/>
             </a:ext>
           </a:extLst>
         </p:spPr>
@@ -26746,7 +26802,7 @@
           </a:ln>
           <a:extLst>
             <a:ext uri="{C572A759-6A51-4108-AA02-DFA0A04FC94B}">
-              <ma14:wrappingTextBoxFlag xmlns:ma14="http://schemas.microsoft.com/office/mac/drawingml/2011/main" xmlns="" val="1"/>
+              <ma14:wrappingTextBoxFlag xmlns="" xmlns:ma14="http://schemas.microsoft.com/office/mac/drawingml/2011/main" val="1"/>
             </a:ext>
           </a:extLst>
         </p:spPr>
@@ -26785,7 +26841,7 @@
           </a:ln>
           <a:extLst>
             <a:ext uri="{C572A759-6A51-4108-AA02-DFA0A04FC94B}">
-              <ma14:wrappingTextBoxFlag xmlns:ma14="http://schemas.microsoft.com/office/mac/drawingml/2011/main" xmlns="" val="1"/>
+              <ma14:wrappingTextBoxFlag xmlns="" xmlns:ma14="http://schemas.microsoft.com/office/mac/drawingml/2011/main" val="1"/>
             </a:ext>
           </a:extLst>
         </p:spPr>
@@ -26862,7 +26918,7 @@
           </a:ln>
           <a:extLst>
             <a:ext uri="{C572A759-6A51-4108-AA02-DFA0A04FC94B}">
-              <ma14:wrappingTextBoxFlag xmlns:ma14="http://schemas.microsoft.com/office/mac/drawingml/2011/main" xmlns="" val="1"/>
+              <ma14:wrappingTextBoxFlag xmlns="" xmlns:ma14="http://schemas.microsoft.com/office/mac/drawingml/2011/main" val="1"/>
             </a:ext>
           </a:extLst>
         </p:spPr>
@@ -26965,7 +27021,7 @@
           </a:ln>
           <a:extLst>
             <a:ext uri="{C572A759-6A51-4108-AA02-DFA0A04FC94B}">
-              <ma14:wrappingTextBoxFlag xmlns:ma14="http://schemas.microsoft.com/office/mac/drawingml/2011/main" xmlns="" val="1"/>
+              <ma14:wrappingTextBoxFlag xmlns="" xmlns:ma14="http://schemas.microsoft.com/office/mac/drawingml/2011/main" val="1"/>
             </a:ext>
           </a:extLst>
         </p:spPr>
@@ -27009,7 +27065,7 @@
           </a:ln>
           <a:extLst>
             <a:ext uri="{C572A759-6A51-4108-AA02-DFA0A04FC94B}">
-              <ma14:wrappingTextBoxFlag xmlns:ma14="http://schemas.microsoft.com/office/mac/drawingml/2011/main" xmlns="" val="1"/>
+              <ma14:wrappingTextBoxFlag xmlns="" xmlns:ma14="http://schemas.microsoft.com/office/mac/drawingml/2011/main" val="1"/>
             </a:ext>
           </a:extLst>
         </p:spPr>
@@ -27054,7 +27110,7 @@
           </a:ln>
           <a:extLst>
             <a:ext uri="{C572A759-6A51-4108-AA02-DFA0A04FC94B}">
-              <ma14:wrappingTextBoxFlag xmlns:ma14="http://schemas.microsoft.com/office/mac/drawingml/2011/main" xmlns="" val="1"/>
+              <ma14:wrappingTextBoxFlag xmlns="" xmlns:ma14="http://schemas.microsoft.com/office/mac/drawingml/2011/main" val="1"/>
             </a:ext>
           </a:extLst>
         </p:spPr>
@@ -27134,7 +27190,7 @@
           </a:ln>
           <a:extLst>
             <a:ext uri="{C572A759-6A51-4108-AA02-DFA0A04FC94B}">
-              <ma14:wrappingTextBoxFlag xmlns:ma14="http://schemas.microsoft.com/office/mac/drawingml/2011/main" xmlns="" val="1"/>
+              <ma14:wrappingTextBoxFlag xmlns="" xmlns:ma14="http://schemas.microsoft.com/office/mac/drawingml/2011/main" val="1"/>
             </a:ext>
           </a:extLst>
         </p:spPr>
@@ -27222,7 +27278,7 @@
           </a:ln>
           <a:extLst>
             <a:ext uri="{C572A759-6A51-4108-AA02-DFA0A04FC94B}">
-              <ma14:wrappingTextBoxFlag xmlns:ma14="http://schemas.microsoft.com/office/mac/drawingml/2011/main" xmlns="" val="1"/>
+              <ma14:wrappingTextBoxFlag xmlns="" xmlns:ma14="http://schemas.microsoft.com/office/mac/drawingml/2011/main" val="1"/>
             </a:ext>
           </a:extLst>
         </p:spPr>
@@ -27267,7 +27323,7 @@
           </a:ln>
           <a:extLst>
             <a:ext uri="{C572A759-6A51-4108-AA02-DFA0A04FC94B}">
-              <ma14:wrappingTextBoxFlag xmlns:ma14="http://schemas.microsoft.com/office/mac/drawingml/2011/main" xmlns="" val="1"/>
+              <ma14:wrappingTextBoxFlag xmlns="" xmlns:ma14="http://schemas.microsoft.com/office/mac/drawingml/2011/main" val="1"/>
             </a:ext>
           </a:extLst>
         </p:spPr>
@@ -27312,7 +27368,7 @@
           </a:ln>
           <a:extLst>
             <a:ext uri="{C572A759-6A51-4108-AA02-DFA0A04FC94B}">
-              <ma14:wrappingTextBoxFlag xmlns:ma14="http://schemas.microsoft.com/office/mac/drawingml/2011/main" xmlns="" val="1"/>
+              <ma14:wrappingTextBoxFlag xmlns="" xmlns:ma14="http://schemas.microsoft.com/office/mac/drawingml/2011/main" val="1"/>
             </a:ext>
           </a:extLst>
         </p:spPr>
@@ -27468,7 +27524,7 @@
           </a:ln>
           <a:extLst>
             <a:ext uri="{C572A759-6A51-4108-AA02-DFA0A04FC94B}">
-              <ma14:wrappingTextBoxFlag xmlns:ma14="http://schemas.microsoft.com/office/mac/drawingml/2011/main" xmlns="" val="1"/>
+              <ma14:wrappingTextBoxFlag xmlns="" xmlns:ma14="http://schemas.microsoft.com/office/mac/drawingml/2011/main" val="1"/>
             </a:ext>
           </a:extLst>
         </p:spPr>
@@ -27591,7 +27647,7 @@
           </a:ln>
           <a:extLst>
             <a:ext uri="{C572A759-6A51-4108-AA02-DFA0A04FC94B}">
-              <ma14:wrappingTextBoxFlag xmlns:ma14="http://schemas.microsoft.com/office/mac/drawingml/2011/main" xmlns="" val="1"/>
+              <ma14:wrappingTextBoxFlag xmlns="" xmlns:ma14="http://schemas.microsoft.com/office/mac/drawingml/2011/main" val="1"/>
             </a:ext>
           </a:extLst>
         </p:spPr>
@@ -27630,7 +27686,7 @@
           </a:ln>
           <a:extLst>
             <a:ext uri="{C572A759-6A51-4108-AA02-DFA0A04FC94B}">
-              <ma14:wrappingTextBoxFlag xmlns:ma14="http://schemas.microsoft.com/office/mac/drawingml/2011/main" xmlns="" val="1"/>
+              <ma14:wrappingTextBoxFlag xmlns="" xmlns:ma14="http://schemas.microsoft.com/office/mac/drawingml/2011/main" val="1"/>
             </a:ext>
           </a:extLst>
         </p:spPr>
@@ -27707,7 +27763,7 @@
           </a:ln>
           <a:extLst>
             <a:ext uri="{C572A759-6A51-4108-AA02-DFA0A04FC94B}">
-              <ma14:wrappingTextBoxFlag xmlns:ma14="http://schemas.microsoft.com/office/mac/drawingml/2011/main" xmlns="" val="1"/>
+              <ma14:wrappingTextBoxFlag xmlns="" xmlns:ma14="http://schemas.microsoft.com/office/mac/drawingml/2011/main" val="1"/>
             </a:ext>
           </a:extLst>
         </p:spPr>
@@ -27906,7 +27962,7 @@
           </a:ln>
           <a:extLst>
             <a:ext uri="{C572A759-6A51-4108-AA02-DFA0A04FC94B}">
-              <ma14:wrappingTextBoxFlag xmlns:ma14="http://schemas.microsoft.com/office/mac/drawingml/2011/main" xmlns="" val="1"/>
+              <ma14:wrappingTextBoxFlag xmlns="" xmlns:ma14="http://schemas.microsoft.com/office/mac/drawingml/2011/main" val="1"/>
             </a:ext>
           </a:extLst>
         </p:spPr>
@@ -27950,7 +28006,7 @@
           </a:ln>
           <a:extLst>
             <a:ext uri="{C572A759-6A51-4108-AA02-DFA0A04FC94B}">
-              <ma14:wrappingTextBoxFlag xmlns:ma14="http://schemas.microsoft.com/office/mac/drawingml/2011/main" xmlns="" val="1"/>
+              <ma14:wrappingTextBoxFlag xmlns="" xmlns:ma14="http://schemas.microsoft.com/office/mac/drawingml/2011/main" val="1"/>
             </a:ext>
           </a:extLst>
         </p:spPr>
@@ -27995,7 +28051,7 @@
           </a:ln>
           <a:extLst>
             <a:ext uri="{C572A759-6A51-4108-AA02-DFA0A04FC94B}">
-              <ma14:wrappingTextBoxFlag xmlns:ma14="http://schemas.microsoft.com/office/mac/drawingml/2011/main" xmlns="" val="1"/>
+              <ma14:wrappingTextBoxFlag xmlns="" xmlns:ma14="http://schemas.microsoft.com/office/mac/drawingml/2011/main" val="1"/>
             </a:ext>
           </a:extLst>
         </p:spPr>
@@ -28075,7 +28131,7 @@
           </a:ln>
           <a:extLst>
             <a:ext uri="{C572A759-6A51-4108-AA02-DFA0A04FC94B}">
-              <ma14:wrappingTextBoxFlag xmlns:ma14="http://schemas.microsoft.com/office/mac/drawingml/2011/main" xmlns="" val="1"/>
+              <ma14:wrappingTextBoxFlag xmlns="" xmlns:ma14="http://schemas.microsoft.com/office/mac/drawingml/2011/main" val="1"/>
             </a:ext>
           </a:extLst>
         </p:spPr>
@@ -28163,7 +28219,7 @@
           </a:ln>
           <a:extLst>
             <a:ext uri="{C572A759-6A51-4108-AA02-DFA0A04FC94B}">
-              <ma14:wrappingTextBoxFlag xmlns:ma14="http://schemas.microsoft.com/office/mac/drawingml/2011/main" xmlns="" val="1"/>
+              <ma14:wrappingTextBoxFlag xmlns="" xmlns:ma14="http://schemas.microsoft.com/office/mac/drawingml/2011/main" val="1"/>
             </a:ext>
           </a:extLst>
         </p:spPr>
@@ -28208,7 +28264,7 @@
           </a:ln>
           <a:extLst>
             <a:ext uri="{C572A759-6A51-4108-AA02-DFA0A04FC94B}">
-              <ma14:wrappingTextBoxFlag xmlns:ma14="http://schemas.microsoft.com/office/mac/drawingml/2011/main" xmlns="" val="1"/>
+              <ma14:wrappingTextBoxFlag xmlns="" xmlns:ma14="http://schemas.microsoft.com/office/mac/drawingml/2011/main" val="1"/>
             </a:ext>
           </a:extLst>
         </p:spPr>
@@ -28326,7 +28382,7 @@
           </a:ln>
           <a:extLst>
             <a:ext uri="{C572A759-6A51-4108-AA02-DFA0A04FC94B}">
-              <ma14:wrappingTextBoxFlag xmlns:ma14="http://schemas.microsoft.com/office/mac/drawingml/2011/main" xmlns="" val="1"/>
+              <ma14:wrappingTextBoxFlag xmlns="" xmlns:ma14="http://schemas.microsoft.com/office/mac/drawingml/2011/main" val="1"/>
             </a:ext>
           </a:extLst>
         </p:spPr>
@@ -28449,7 +28505,7 @@
           </a:ln>
           <a:extLst>
             <a:ext uri="{C572A759-6A51-4108-AA02-DFA0A04FC94B}">
-              <ma14:wrappingTextBoxFlag xmlns:ma14="http://schemas.microsoft.com/office/mac/drawingml/2011/main" xmlns="" val="1"/>
+              <ma14:wrappingTextBoxFlag xmlns="" xmlns:ma14="http://schemas.microsoft.com/office/mac/drawingml/2011/main" val="1"/>
             </a:ext>
           </a:extLst>
         </p:spPr>
@@ -28488,7 +28544,7 @@
           </a:ln>
           <a:extLst>
             <a:ext uri="{C572A759-6A51-4108-AA02-DFA0A04FC94B}">
-              <ma14:wrappingTextBoxFlag xmlns:ma14="http://schemas.microsoft.com/office/mac/drawingml/2011/main" xmlns="" val="1"/>
+              <ma14:wrappingTextBoxFlag xmlns="" xmlns:ma14="http://schemas.microsoft.com/office/mac/drawingml/2011/main" val="1"/>
             </a:ext>
           </a:extLst>
         </p:spPr>
@@ -28687,7 +28743,7 @@
           </a:ln>
           <a:extLst>
             <a:ext uri="{C572A759-6A51-4108-AA02-DFA0A04FC94B}">
-              <ma14:wrappingTextBoxFlag xmlns:ma14="http://schemas.microsoft.com/office/mac/drawingml/2011/main" xmlns="" val="1"/>
+              <ma14:wrappingTextBoxFlag xmlns="" xmlns:ma14="http://schemas.microsoft.com/office/mac/drawingml/2011/main" val="1"/>
             </a:ext>
           </a:extLst>
         </p:spPr>
@@ -28731,7 +28787,7 @@
           </a:ln>
           <a:extLst>
             <a:ext uri="{C572A759-6A51-4108-AA02-DFA0A04FC94B}">
-              <ma14:wrappingTextBoxFlag xmlns:ma14="http://schemas.microsoft.com/office/mac/drawingml/2011/main" xmlns="" val="1"/>
+              <ma14:wrappingTextBoxFlag xmlns="" xmlns:ma14="http://schemas.microsoft.com/office/mac/drawingml/2011/main" val="1"/>
             </a:ext>
           </a:extLst>
         </p:spPr>
@@ -28776,7 +28832,7 @@
           </a:ln>
           <a:extLst>
             <a:ext uri="{C572A759-6A51-4108-AA02-DFA0A04FC94B}">
-              <ma14:wrappingTextBoxFlag xmlns:ma14="http://schemas.microsoft.com/office/mac/drawingml/2011/main" xmlns="" val="1"/>
+              <ma14:wrappingTextBoxFlag xmlns="" xmlns:ma14="http://schemas.microsoft.com/office/mac/drawingml/2011/main" val="1"/>
             </a:ext>
           </a:extLst>
         </p:spPr>
@@ -28856,7 +28912,7 @@
           </a:ln>
           <a:extLst>
             <a:ext uri="{C572A759-6A51-4108-AA02-DFA0A04FC94B}">
-              <ma14:wrappingTextBoxFlag xmlns:ma14="http://schemas.microsoft.com/office/mac/drawingml/2011/main" xmlns="" val="1"/>
+              <ma14:wrappingTextBoxFlag xmlns="" xmlns:ma14="http://schemas.microsoft.com/office/mac/drawingml/2011/main" val="1"/>
             </a:ext>
           </a:extLst>
         </p:spPr>
@@ -28944,7 +29000,7 @@
           </a:ln>
           <a:extLst>
             <a:ext uri="{C572A759-6A51-4108-AA02-DFA0A04FC94B}">
-              <ma14:wrappingTextBoxFlag xmlns:ma14="http://schemas.microsoft.com/office/mac/drawingml/2011/main" xmlns="" val="1"/>
+              <ma14:wrappingTextBoxFlag xmlns="" xmlns:ma14="http://schemas.microsoft.com/office/mac/drawingml/2011/main" val="1"/>
             </a:ext>
           </a:extLst>
         </p:spPr>
@@ -28989,7 +29045,7 @@
           </a:ln>
           <a:extLst>
             <a:ext uri="{C572A759-6A51-4108-AA02-DFA0A04FC94B}">
-              <ma14:wrappingTextBoxFlag xmlns:ma14="http://schemas.microsoft.com/office/mac/drawingml/2011/main" xmlns="" val="1"/>
+              <ma14:wrappingTextBoxFlag xmlns="" xmlns:ma14="http://schemas.microsoft.com/office/mac/drawingml/2011/main" val="1"/>
             </a:ext>
           </a:extLst>
         </p:spPr>
@@ -29107,7 +29163,7 @@
           </a:ln>
           <a:extLst>
             <a:ext uri="{C572A759-6A51-4108-AA02-DFA0A04FC94B}">
-              <ma14:wrappingTextBoxFlag xmlns:ma14="http://schemas.microsoft.com/office/mac/drawingml/2011/main" xmlns="" val="1"/>
+              <ma14:wrappingTextBoxFlag xmlns="" xmlns:ma14="http://schemas.microsoft.com/office/mac/drawingml/2011/main" val="1"/>
             </a:ext>
           </a:extLst>
         </p:spPr>
@@ -29192,7 +29248,7 @@
           </a:ln>
           <a:extLst>
             <a:ext uri="{C572A759-6A51-4108-AA02-DFA0A04FC94B}">
-              <ma14:wrappingTextBoxFlag xmlns:ma14="http://schemas.microsoft.com/office/mac/drawingml/2011/main" xmlns="" val="1"/>
+              <ma14:wrappingTextBoxFlag xmlns="" xmlns:ma14="http://schemas.microsoft.com/office/mac/drawingml/2011/main" val="1"/>
             </a:ext>
           </a:extLst>
         </p:spPr>
@@ -29307,7 +29363,7 @@
           </a:ln>
           <a:extLst>
             <a:ext uri="{C572A759-6A51-4108-AA02-DFA0A04FC94B}">
-              <ma14:wrappingTextBoxFlag xmlns:ma14="http://schemas.microsoft.com/office/mac/drawingml/2011/main" xmlns="" val="1"/>
+              <ma14:wrappingTextBoxFlag xmlns="" xmlns:ma14="http://schemas.microsoft.com/office/mac/drawingml/2011/main" val="1"/>
             </a:ext>
           </a:extLst>
         </p:spPr>
@@ -29410,7 +29466,7 @@
           </a:ln>
           <a:extLst>
             <a:ext uri="{C572A759-6A51-4108-AA02-DFA0A04FC94B}">
-              <ma14:wrappingTextBoxFlag xmlns:ma14="http://schemas.microsoft.com/office/mac/drawingml/2011/main" xmlns="" val="1"/>
+              <ma14:wrappingTextBoxFlag xmlns="" xmlns:ma14="http://schemas.microsoft.com/office/mac/drawingml/2011/main" val="1"/>
             </a:ext>
           </a:extLst>
         </p:spPr>
@@ -29454,7 +29510,7 @@
           </a:ln>
           <a:extLst>
             <a:ext uri="{C572A759-6A51-4108-AA02-DFA0A04FC94B}">
-              <ma14:wrappingTextBoxFlag xmlns:ma14="http://schemas.microsoft.com/office/mac/drawingml/2011/main" xmlns="" val="1"/>
+              <ma14:wrappingTextBoxFlag xmlns="" xmlns:ma14="http://schemas.microsoft.com/office/mac/drawingml/2011/main" val="1"/>
             </a:ext>
           </a:extLst>
         </p:spPr>
@@ -29499,7 +29555,7 @@
           </a:ln>
           <a:extLst>
             <a:ext uri="{C572A759-6A51-4108-AA02-DFA0A04FC94B}">
-              <ma14:wrappingTextBoxFlag xmlns:ma14="http://schemas.microsoft.com/office/mac/drawingml/2011/main" xmlns="" val="1"/>
+              <ma14:wrappingTextBoxFlag xmlns="" xmlns:ma14="http://schemas.microsoft.com/office/mac/drawingml/2011/main" val="1"/>
             </a:ext>
           </a:extLst>
         </p:spPr>
@@ -29579,7 +29635,7 @@
           </a:ln>
           <a:extLst>
             <a:ext uri="{C572A759-6A51-4108-AA02-DFA0A04FC94B}">
-              <ma14:wrappingTextBoxFlag xmlns:ma14="http://schemas.microsoft.com/office/mac/drawingml/2011/main" xmlns="" val="1"/>
+              <ma14:wrappingTextBoxFlag xmlns="" xmlns:ma14="http://schemas.microsoft.com/office/mac/drawingml/2011/main" val="1"/>
             </a:ext>
           </a:extLst>
         </p:spPr>
@@ -29667,7 +29723,7 @@
           </a:ln>
           <a:extLst>
             <a:ext uri="{C572A759-6A51-4108-AA02-DFA0A04FC94B}">
-              <ma14:wrappingTextBoxFlag xmlns:ma14="http://schemas.microsoft.com/office/mac/drawingml/2011/main" xmlns="" val="1"/>
+              <ma14:wrappingTextBoxFlag xmlns="" xmlns:ma14="http://schemas.microsoft.com/office/mac/drawingml/2011/main" val="1"/>
             </a:ext>
           </a:extLst>
         </p:spPr>
@@ -29712,7 +29768,7 @@
           </a:ln>
           <a:extLst>
             <a:ext uri="{C572A759-6A51-4108-AA02-DFA0A04FC94B}">
-              <ma14:wrappingTextBoxFlag xmlns:ma14="http://schemas.microsoft.com/office/mac/drawingml/2011/main" xmlns="" val="1"/>
+              <ma14:wrappingTextBoxFlag xmlns="" xmlns:ma14="http://schemas.microsoft.com/office/mac/drawingml/2011/main" val="1"/>
             </a:ext>
           </a:extLst>
         </p:spPr>
@@ -29830,7 +29886,7 @@
           </a:ln>
           <a:extLst>
             <a:ext uri="{C572A759-6A51-4108-AA02-DFA0A04FC94B}">
-              <ma14:wrappingTextBoxFlag xmlns:ma14="http://schemas.microsoft.com/office/mac/drawingml/2011/main" xmlns="" val="1"/>
+              <ma14:wrappingTextBoxFlag xmlns="" xmlns:ma14="http://schemas.microsoft.com/office/mac/drawingml/2011/main" val="1"/>
             </a:ext>
           </a:extLst>
         </p:spPr>
@@ -29979,7 +30035,7 @@
           </a:ln>
           <a:extLst>
             <a:ext uri="{C572A759-6A51-4108-AA02-DFA0A04FC94B}">
-              <ma14:wrappingTextBoxFlag xmlns:ma14="http://schemas.microsoft.com/office/mac/drawingml/2011/main" xmlns="" val="1"/>
+              <ma14:wrappingTextBoxFlag xmlns="" xmlns:ma14="http://schemas.microsoft.com/office/mac/drawingml/2011/main" val="1"/>
             </a:ext>
           </a:extLst>
         </p:spPr>
@@ -30023,7 +30079,7 @@
           </a:ln>
           <a:extLst>
             <a:ext uri="{C572A759-6A51-4108-AA02-DFA0A04FC94B}">
-              <ma14:wrappingTextBoxFlag xmlns:ma14="http://schemas.microsoft.com/office/mac/drawingml/2011/main" xmlns="" val="1"/>
+              <ma14:wrappingTextBoxFlag xmlns="" xmlns:ma14="http://schemas.microsoft.com/office/mac/drawingml/2011/main" val="1"/>
             </a:ext>
           </a:extLst>
         </p:spPr>
@@ -30068,7 +30124,7 @@
           </a:ln>
           <a:extLst>
             <a:ext uri="{C572A759-6A51-4108-AA02-DFA0A04FC94B}">
-              <ma14:wrappingTextBoxFlag xmlns:ma14="http://schemas.microsoft.com/office/mac/drawingml/2011/main" xmlns="" val="1"/>
+              <ma14:wrappingTextBoxFlag xmlns="" xmlns:ma14="http://schemas.microsoft.com/office/mac/drawingml/2011/main" val="1"/>
             </a:ext>
           </a:extLst>
         </p:spPr>
@@ -30148,7 +30204,7 @@
           </a:ln>
           <a:extLst>
             <a:ext uri="{C572A759-6A51-4108-AA02-DFA0A04FC94B}">
-              <ma14:wrappingTextBoxFlag xmlns:ma14="http://schemas.microsoft.com/office/mac/drawingml/2011/main" xmlns="" val="1"/>
+              <ma14:wrappingTextBoxFlag xmlns="" xmlns:ma14="http://schemas.microsoft.com/office/mac/drawingml/2011/main" val="1"/>
             </a:ext>
           </a:extLst>
         </p:spPr>
@@ -30236,7 +30292,7 @@
           </a:ln>
           <a:extLst>
             <a:ext uri="{C572A759-6A51-4108-AA02-DFA0A04FC94B}">
-              <ma14:wrappingTextBoxFlag xmlns:ma14="http://schemas.microsoft.com/office/mac/drawingml/2011/main" xmlns="" val="1"/>
+              <ma14:wrappingTextBoxFlag xmlns="" xmlns:ma14="http://schemas.microsoft.com/office/mac/drawingml/2011/main" val="1"/>
             </a:ext>
           </a:extLst>
         </p:spPr>
@@ -30281,7 +30337,7 @@
           </a:ln>
           <a:extLst>
             <a:ext uri="{C572A759-6A51-4108-AA02-DFA0A04FC94B}">
-              <ma14:wrappingTextBoxFlag xmlns:ma14="http://schemas.microsoft.com/office/mac/drawingml/2011/main" xmlns="" val="1"/>
+              <ma14:wrappingTextBoxFlag xmlns="" xmlns:ma14="http://schemas.microsoft.com/office/mac/drawingml/2011/main" val="1"/>
             </a:ext>
           </a:extLst>
         </p:spPr>
@@ -30326,7 +30382,7 @@
           </a:ln>
           <a:extLst>
             <a:ext uri="{C572A759-6A51-4108-AA02-DFA0A04FC94B}">
-              <ma14:wrappingTextBoxFlag xmlns:ma14="http://schemas.microsoft.com/office/mac/drawingml/2011/main" xmlns="" val="1"/>
+              <ma14:wrappingTextBoxFlag xmlns="" xmlns:ma14="http://schemas.microsoft.com/office/mac/drawingml/2011/main" val="1"/>
             </a:ext>
           </a:extLst>
         </p:spPr>
@@ -30406,7 +30462,7 @@
           </a:ln>
           <a:extLst>
             <a:ext uri="{C572A759-6A51-4108-AA02-DFA0A04FC94B}">
-              <ma14:wrappingTextBoxFlag xmlns:ma14="http://schemas.microsoft.com/office/mac/drawingml/2011/main" xmlns="" val="1"/>
+              <ma14:wrappingTextBoxFlag xmlns="" xmlns:ma14="http://schemas.microsoft.com/office/mac/drawingml/2011/main" val="1"/>
             </a:ext>
           </a:extLst>
         </p:spPr>
@@ -30783,7 +30839,7 @@
           </a:ln>
           <a:extLst>
             <a:ext uri="{C572A759-6A51-4108-AA02-DFA0A04FC94B}">
-              <ma14:wrappingTextBoxFlag xmlns:ma14="http://schemas.microsoft.com/office/mac/drawingml/2011/main" xmlns="" val="1"/>
+              <ma14:wrappingTextBoxFlag xmlns="" xmlns:ma14="http://schemas.microsoft.com/office/mac/drawingml/2011/main" val="1"/>
             </a:ext>
           </a:extLst>
         </p:spPr>
@@ -30827,7 +30883,7 @@
           </a:ln>
           <a:extLst>
             <a:ext uri="{C572A759-6A51-4108-AA02-DFA0A04FC94B}">
-              <ma14:wrappingTextBoxFlag xmlns:ma14="http://schemas.microsoft.com/office/mac/drawingml/2011/main" xmlns="" val="1"/>
+              <ma14:wrappingTextBoxFlag xmlns="" xmlns:ma14="http://schemas.microsoft.com/office/mac/drawingml/2011/main" val="1"/>
             </a:ext>
           </a:extLst>
         </p:spPr>
@@ -30872,7 +30928,7 @@
           </a:ln>
           <a:extLst>
             <a:ext uri="{C572A759-6A51-4108-AA02-DFA0A04FC94B}">
-              <ma14:wrappingTextBoxFlag xmlns:ma14="http://schemas.microsoft.com/office/mac/drawingml/2011/main" xmlns="" val="1"/>
+              <ma14:wrappingTextBoxFlag xmlns="" xmlns:ma14="http://schemas.microsoft.com/office/mac/drawingml/2011/main" val="1"/>
             </a:ext>
           </a:extLst>
         </p:spPr>
@@ -30952,7 +31008,7 @@
           </a:ln>
           <a:extLst>
             <a:ext uri="{C572A759-6A51-4108-AA02-DFA0A04FC94B}">
-              <ma14:wrappingTextBoxFlag xmlns:ma14="http://schemas.microsoft.com/office/mac/drawingml/2011/main" xmlns="" val="1"/>
+              <ma14:wrappingTextBoxFlag xmlns="" xmlns:ma14="http://schemas.microsoft.com/office/mac/drawingml/2011/main" val="1"/>
             </a:ext>
           </a:extLst>
         </p:spPr>
@@ -31040,7 +31096,7 @@
           </a:ln>
           <a:extLst>
             <a:ext uri="{C572A759-6A51-4108-AA02-DFA0A04FC94B}">
-              <ma14:wrappingTextBoxFlag xmlns:ma14="http://schemas.microsoft.com/office/mac/drawingml/2011/main" xmlns="" val="1"/>
+              <ma14:wrappingTextBoxFlag xmlns="" xmlns:ma14="http://schemas.microsoft.com/office/mac/drawingml/2011/main" val="1"/>
             </a:ext>
           </a:extLst>
         </p:spPr>
@@ -31085,7 +31141,7 @@
           </a:ln>
           <a:extLst>
             <a:ext uri="{C572A759-6A51-4108-AA02-DFA0A04FC94B}">
-              <ma14:wrappingTextBoxFlag xmlns:ma14="http://schemas.microsoft.com/office/mac/drawingml/2011/main" xmlns="" val="1"/>
+              <ma14:wrappingTextBoxFlag xmlns="" xmlns:ma14="http://schemas.microsoft.com/office/mac/drawingml/2011/main" val="1"/>
             </a:ext>
           </a:extLst>
         </p:spPr>
@@ -31130,7 +31186,7 @@
           </a:ln>
           <a:extLst>
             <a:ext uri="{C572A759-6A51-4108-AA02-DFA0A04FC94B}">
-              <ma14:wrappingTextBoxFlag xmlns:ma14="http://schemas.microsoft.com/office/mac/drawingml/2011/main" xmlns="" val="1"/>
+              <ma14:wrappingTextBoxFlag xmlns="" xmlns:ma14="http://schemas.microsoft.com/office/mac/drawingml/2011/main" val="1"/>
             </a:ext>
           </a:extLst>
         </p:spPr>
@@ -31210,7 +31266,7 @@
           </a:ln>
           <a:extLst>
             <a:ext uri="{C572A759-6A51-4108-AA02-DFA0A04FC94B}">
-              <ma14:wrappingTextBoxFlag xmlns:ma14="http://schemas.microsoft.com/office/mac/drawingml/2011/main" xmlns="" val="1"/>
+              <ma14:wrappingTextBoxFlag xmlns="" xmlns:ma14="http://schemas.microsoft.com/office/mac/drawingml/2011/main" val="1"/>
             </a:ext>
           </a:extLst>
         </p:spPr>
@@ -31561,7 +31617,7 @@
           </a:ln>
           <a:extLst>
             <a:ext uri="{C572A759-6A51-4108-AA02-DFA0A04FC94B}">
-              <ma14:wrappingTextBoxFlag xmlns:ma14="http://schemas.microsoft.com/office/mac/drawingml/2011/main" xmlns="" val="1"/>
+              <ma14:wrappingTextBoxFlag xmlns="" xmlns:ma14="http://schemas.microsoft.com/office/mac/drawingml/2011/main" val="1"/>
             </a:ext>
           </a:extLst>
         </p:spPr>
@@ -31657,7 +31713,7 @@
           </a:ln>
           <a:extLst>
             <a:ext uri="{C572A759-6A51-4108-AA02-DFA0A04FC94B}">
-              <ma14:wrappingTextBoxFlag xmlns:ma14="http://schemas.microsoft.com/office/mac/drawingml/2011/main" xmlns="" val="1"/>
+              <ma14:wrappingTextBoxFlag xmlns="" xmlns:ma14="http://schemas.microsoft.com/office/mac/drawingml/2011/main" val="1"/>
             </a:ext>
           </a:extLst>
         </p:spPr>
@@ -31705,7 +31761,7 @@
           </a:ln>
           <a:extLst>
             <a:ext uri="{C572A759-6A51-4108-AA02-DFA0A04FC94B}">
-              <ma14:wrappingTextBoxFlag xmlns:ma14="http://schemas.microsoft.com/office/mac/drawingml/2011/main" xmlns="" val="1"/>
+              <ma14:wrappingTextBoxFlag xmlns="" xmlns:ma14="http://schemas.microsoft.com/office/mac/drawingml/2011/main" val="1"/>
             </a:ext>
           </a:extLst>
         </p:spPr>
@@ -31750,7 +31806,7 @@
           </a:ln>
           <a:extLst>
             <a:ext uri="{C572A759-6A51-4108-AA02-DFA0A04FC94B}">
-              <ma14:wrappingTextBoxFlag xmlns:ma14="http://schemas.microsoft.com/office/mac/drawingml/2011/main" xmlns="" val="1"/>
+              <ma14:wrappingTextBoxFlag xmlns="" xmlns:ma14="http://schemas.microsoft.com/office/mac/drawingml/2011/main" val="1"/>
             </a:ext>
           </a:extLst>
         </p:spPr>
@@ -31795,7 +31851,7 @@
           </a:ln>
           <a:extLst>
             <a:ext uri="{C572A759-6A51-4108-AA02-DFA0A04FC94B}">
-              <ma14:wrappingTextBoxFlag xmlns:ma14="http://schemas.microsoft.com/office/mac/drawingml/2011/main" xmlns="" val="1"/>
+              <ma14:wrappingTextBoxFlag xmlns="" xmlns:ma14="http://schemas.microsoft.com/office/mac/drawingml/2011/main" val="1"/>
             </a:ext>
           </a:extLst>
         </p:spPr>
@@ -31840,7 +31896,7 @@
           </a:ln>
           <a:extLst>
             <a:ext uri="{C572A759-6A51-4108-AA02-DFA0A04FC94B}">
-              <ma14:wrappingTextBoxFlag xmlns:ma14="http://schemas.microsoft.com/office/mac/drawingml/2011/main" xmlns="" val="1"/>
+              <ma14:wrappingTextBoxFlag xmlns="" xmlns:ma14="http://schemas.microsoft.com/office/mac/drawingml/2011/main" val="1"/>
             </a:ext>
           </a:extLst>
         </p:spPr>
@@ -32007,7 +32063,7 @@
           </a:ln>
           <a:extLst>
             <a:ext uri="{C572A759-6A51-4108-AA02-DFA0A04FC94B}">
-              <ma14:wrappingTextBoxFlag xmlns:ma14="http://schemas.microsoft.com/office/mac/drawingml/2011/main" xmlns="" val="1"/>
+              <ma14:wrappingTextBoxFlag xmlns="" xmlns:ma14="http://schemas.microsoft.com/office/mac/drawingml/2011/main" val="1"/>
             </a:ext>
           </a:extLst>
         </p:spPr>
@@ -32151,7 +32207,7 @@
           </a:ln>
           <a:extLst>
             <a:ext uri="{C572A759-6A51-4108-AA02-DFA0A04FC94B}">
-              <ma14:wrappingTextBoxFlag xmlns:ma14="http://schemas.microsoft.com/office/mac/drawingml/2011/main" xmlns="" val="1"/>
+              <ma14:wrappingTextBoxFlag xmlns="" xmlns:ma14="http://schemas.microsoft.com/office/mac/drawingml/2011/main" val="1"/>
             </a:ext>
           </a:extLst>
         </p:spPr>
@@ -32195,7 +32251,7 @@
           </a:ln>
           <a:extLst>
             <a:ext uri="{C572A759-6A51-4108-AA02-DFA0A04FC94B}">
-              <ma14:wrappingTextBoxFlag xmlns:ma14="http://schemas.microsoft.com/office/mac/drawingml/2011/main" xmlns="" val="1"/>
+              <ma14:wrappingTextBoxFlag xmlns="" xmlns:ma14="http://schemas.microsoft.com/office/mac/drawingml/2011/main" val="1"/>
             </a:ext>
           </a:extLst>
         </p:spPr>
@@ -32240,7 +32296,7 @@
           </a:ln>
           <a:extLst>
             <a:ext uri="{C572A759-6A51-4108-AA02-DFA0A04FC94B}">
-              <ma14:wrappingTextBoxFlag xmlns:ma14="http://schemas.microsoft.com/office/mac/drawingml/2011/main" xmlns="" val="1"/>
+              <ma14:wrappingTextBoxFlag xmlns="" xmlns:ma14="http://schemas.microsoft.com/office/mac/drawingml/2011/main" val="1"/>
             </a:ext>
           </a:extLst>
         </p:spPr>
@@ -32320,7 +32376,7 @@
           </a:ln>
           <a:extLst>
             <a:ext uri="{C572A759-6A51-4108-AA02-DFA0A04FC94B}">
-              <ma14:wrappingTextBoxFlag xmlns:ma14="http://schemas.microsoft.com/office/mac/drawingml/2011/main" xmlns="" val="1"/>
+              <ma14:wrappingTextBoxFlag xmlns="" xmlns:ma14="http://schemas.microsoft.com/office/mac/drawingml/2011/main" val="1"/>
             </a:ext>
           </a:extLst>
         </p:spPr>
@@ -32408,7 +32464,7 @@
           </a:ln>
           <a:extLst>
             <a:ext uri="{C572A759-6A51-4108-AA02-DFA0A04FC94B}">
-              <ma14:wrappingTextBoxFlag xmlns:ma14="http://schemas.microsoft.com/office/mac/drawingml/2011/main" xmlns="" val="1"/>
+              <ma14:wrappingTextBoxFlag xmlns="" xmlns:ma14="http://schemas.microsoft.com/office/mac/drawingml/2011/main" val="1"/>
             </a:ext>
           </a:extLst>
         </p:spPr>
@@ -32453,7 +32509,7 @@
           </a:ln>
           <a:extLst>
             <a:ext uri="{C572A759-6A51-4108-AA02-DFA0A04FC94B}">
-              <ma14:wrappingTextBoxFlag xmlns:ma14="http://schemas.microsoft.com/office/mac/drawingml/2011/main" xmlns="" val="1"/>
+              <ma14:wrappingTextBoxFlag xmlns="" xmlns:ma14="http://schemas.microsoft.com/office/mac/drawingml/2011/main" val="1"/>
             </a:ext>
           </a:extLst>
         </p:spPr>
@@ -32498,7 +32554,7 @@
           </a:ln>
           <a:extLst>
             <a:ext uri="{C572A759-6A51-4108-AA02-DFA0A04FC94B}">
-              <ma14:wrappingTextBoxFlag xmlns:ma14="http://schemas.microsoft.com/office/mac/drawingml/2011/main" xmlns="" val="1"/>
+              <ma14:wrappingTextBoxFlag xmlns="" xmlns:ma14="http://schemas.microsoft.com/office/mac/drawingml/2011/main" val="1"/>
             </a:ext>
           </a:extLst>
         </p:spPr>
@@ -32578,7 +32634,7 @@
           </a:ln>
           <a:extLst>
             <a:ext uri="{C572A759-6A51-4108-AA02-DFA0A04FC94B}">
-              <ma14:wrappingTextBoxFlag xmlns:ma14="http://schemas.microsoft.com/office/mac/drawingml/2011/main" xmlns="" val="1"/>
+              <ma14:wrappingTextBoxFlag xmlns="" xmlns:ma14="http://schemas.microsoft.com/office/mac/drawingml/2011/main" val="1"/>
             </a:ext>
           </a:extLst>
         </p:spPr>
@@ -32929,7 +32985,7 @@
           </a:ln>
           <a:extLst>
             <a:ext uri="{C572A759-6A51-4108-AA02-DFA0A04FC94B}">
-              <ma14:wrappingTextBoxFlag xmlns:ma14="http://schemas.microsoft.com/office/mac/drawingml/2011/main" xmlns="" val="1"/>
+              <ma14:wrappingTextBoxFlag xmlns="" xmlns:ma14="http://schemas.microsoft.com/office/mac/drawingml/2011/main" val="1"/>
             </a:ext>
           </a:extLst>
         </p:spPr>
@@ -33028,7 +33084,7 @@
           </a:ln>
           <a:extLst>
             <a:ext uri="{C572A759-6A51-4108-AA02-DFA0A04FC94B}">
-              <ma14:wrappingTextBoxFlag xmlns:ma14="http://schemas.microsoft.com/office/mac/drawingml/2011/main" xmlns="" val="1"/>
+              <ma14:wrappingTextBoxFlag xmlns="" xmlns:ma14="http://schemas.microsoft.com/office/mac/drawingml/2011/main" val="1"/>
             </a:ext>
           </a:extLst>
         </p:spPr>
@@ -33072,7 +33128,7 @@
           </a:ln>
           <a:extLst>
             <a:ext uri="{C572A759-6A51-4108-AA02-DFA0A04FC94B}">
-              <ma14:wrappingTextBoxFlag xmlns:ma14="http://schemas.microsoft.com/office/mac/drawingml/2011/main" xmlns="" val="1"/>
+              <ma14:wrappingTextBoxFlag xmlns="" xmlns:ma14="http://schemas.microsoft.com/office/mac/drawingml/2011/main" val="1"/>
             </a:ext>
           </a:extLst>
         </p:spPr>
@@ -33117,7 +33173,7 @@
           </a:ln>
           <a:extLst>
             <a:ext uri="{C572A759-6A51-4108-AA02-DFA0A04FC94B}">
-              <ma14:wrappingTextBoxFlag xmlns:ma14="http://schemas.microsoft.com/office/mac/drawingml/2011/main" xmlns="" val="1"/>
+              <ma14:wrappingTextBoxFlag xmlns="" xmlns:ma14="http://schemas.microsoft.com/office/mac/drawingml/2011/main" val="1"/>
             </a:ext>
           </a:extLst>
         </p:spPr>
@@ -33197,7 +33253,7 @@
           </a:ln>
           <a:extLst>
             <a:ext uri="{C572A759-6A51-4108-AA02-DFA0A04FC94B}">
-              <ma14:wrappingTextBoxFlag xmlns:ma14="http://schemas.microsoft.com/office/mac/drawingml/2011/main" xmlns="" val="1"/>
+              <ma14:wrappingTextBoxFlag xmlns="" xmlns:ma14="http://schemas.microsoft.com/office/mac/drawingml/2011/main" val="1"/>
             </a:ext>
           </a:extLst>
         </p:spPr>
@@ -33285,7 +33341,7 @@
           </a:ln>
           <a:extLst>
             <a:ext uri="{C572A759-6A51-4108-AA02-DFA0A04FC94B}">
-              <ma14:wrappingTextBoxFlag xmlns:ma14="http://schemas.microsoft.com/office/mac/drawingml/2011/main" xmlns="" val="1"/>
+              <ma14:wrappingTextBoxFlag xmlns="" xmlns:ma14="http://schemas.microsoft.com/office/mac/drawingml/2011/main" val="1"/>
             </a:ext>
           </a:extLst>
         </p:spPr>
@@ -33330,7 +33386,7 @@
           </a:ln>
           <a:extLst>
             <a:ext uri="{C572A759-6A51-4108-AA02-DFA0A04FC94B}">
-              <ma14:wrappingTextBoxFlag xmlns:ma14="http://schemas.microsoft.com/office/mac/drawingml/2011/main" xmlns="" val="1"/>
+              <ma14:wrappingTextBoxFlag xmlns="" xmlns:ma14="http://schemas.microsoft.com/office/mac/drawingml/2011/main" val="1"/>
             </a:ext>
           </a:extLst>
         </p:spPr>
@@ -33375,7 +33431,7 @@
           </a:ln>
           <a:extLst>
             <a:ext uri="{C572A759-6A51-4108-AA02-DFA0A04FC94B}">
-              <ma14:wrappingTextBoxFlag xmlns:ma14="http://schemas.microsoft.com/office/mac/drawingml/2011/main" xmlns="" val="1"/>
+              <ma14:wrappingTextBoxFlag xmlns="" xmlns:ma14="http://schemas.microsoft.com/office/mac/drawingml/2011/main" val="1"/>
             </a:ext>
           </a:extLst>
         </p:spPr>
@@ -33455,7 +33511,7 @@
           </a:ln>
           <a:extLst>
             <a:ext uri="{C572A759-6A51-4108-AA02-DFA0A04FC94B}">
-              <ma14:wrappingTextBoxFlag xmlns:ma14="http://schemas.microsoft.com/office/mac/drawingml/2011/main" xmlns="" val="1"/>
+              <ma14:wrappingTextBoxFlag xmlns="" xmlns:ma14="http://schemas.microsoft.com/office/mac/drawingml/2011/main" val="1"/>
             </a:ext>
           </a:extLst>
         </p:spPr>
@@ -33806,7 +33862,7 @@
           </a:ln>
           <a:extLst>
             <a:ext uri="{C572A759-6A51-4108-AA02-DFA0A04FC94B}">
-              <ma14:wrappingTextBoxFlag xmlns:ma14="http://schemas.microsoft.com/office/mac/drawingml/2011/main" xmlns="" val="1"/>
+              <ma14:wrappingTextBoxFlag xmlns="" xmlns:ma14="http://schemas.microsoft.com/office/mac/drawingml/2011/main" val="1"/>
             </a:ext>
           </a:extLst>
         </p:spPr>
@@ -33905,7 +33961,7 @@
           </a:ln>
           <a:extLst>
             <a:ext uri="{C572A759-6A51-4108-AA02-DFA0A04FC94B}">
-              <ma14:wrappingTextBoxFlag xmlns:ma14="http://schemas.microsoft.com/office/mac/drawingml/2011/main" xmlns="" val="1"/>
+              <ma14:wrappingTextBoxFlag xmlns="" xmlns:ma14="http://schemas.microsoft.com/office/mac/drawingml/2011/main" val="1"/>
             </a:ext>
           </a:extLst>
         </p:spPr>
@@ -33949,7 +34005,7 @@
           </a:ln>
           <a:extLst>
             <a:ext uri="{C572A759-6A51-4108-AA02-DFA0A04FC94B}">
-              <ma14:wrappingTextBoxFlag xmlns:ma14="http://schemas.microsoft.com/office/mac/drawingml/2011/main" xmlns="" val="1"/>
+              <ma14:wrappingTextBoxFlag xmlns="" xmlns:ma14="http://schemas.microsoft.com/office/mac/drawingml/2011/main" val="1"/>
             </a:ext>
           </a:extLst>
         </p:spPr>
@@ -33994,7 +34050,7 @@
           </a:ln>
           <a:extLst>
             <a:ext uri="{C572A759-6A51-4108-AA02-DFA0A04FC94B}">
-              <ma14:wrappingTextBoxFlag xmlns:ma14="http://schemas.microsoft.com/office/mac/drawingml/2011/main" xmlns="" val="1"/>
+              <ma14:wrappingTextBoxFlag xmlns="" xmlns:ma14="http://schemas.microsoft.com/office/mac/drawingml/2011/main" val="1"/>
             </a:ext>
           </a:extLst>
         </p:spPr>
@@ -34074,7 +34130,7 @@
           </a:ln>
           <a:extLst>
             <a:ext uri="{C572A759-6A51-4108-AA02-DFA0A04FC94B}">
-              <ma14:wrappingTextBoxFlag xmlns:ma14="http://schemas.microsoft.com/office/mac/drawingml/2011/main" xmlns="" val="1"/>
+              <ma14:wrappingTextBoxFlag xmlns="" xmlns:ma14="http://schemas.microsoft.com/office/mac/drawingml/2011/main" val="1"/>
             </a:ext>
           </a:extLst>
         </p:spPr>
@@ -34162,7 +34218,7 @@
           </a:ln>
           <a:extLst>
             <a:ext uri="{C572A759-6A51-4108-AA02-DFA0A04FC94B}">
-              <ma14:wrappingTextBoxFlag xmlns:ma14="http://schemas.microsoft.com/office/mac/drawingml/2011/main" xmlns="" val="1"/>
+              <ma14:wrappingTextBoxFlag xmlns="" xmlns:ma14="http://schemas.microsoft.com/office/mac/drawingml/2011/main" val="1"/>
             </a:ext>
           </a:extLst>
         </p:spPr>
@@ -34207,7 +34263,7 @@
           </a:ln>
           <a:extLst>
             <a:ext uri="{C572A759-6A51-4108-AA02-DFA0A04FC94B}">
-              <ma14:wrappingTextBoxFlag xmlns:ma14="http://schemas.microsoft.com/office/mac/drawingml/2011/main" xmlns="" val="1"/>
+              <ma14:wrappingTextBoxFlag xmlns="" xmlns:ma14="http://schemas.microsoft.com/office/mac/drawingml/2011/main" val="1"/>
             </a:ext>
           </a:extLst>
         </p:spPr>
@@ -34252,7 +34308,7 @@
           </a:ln>
           <a:extLst>
             <a:ext uri="{C572A759-6A51-4108-AA02-DFA0A04FC94B}">
-              <ma14:wrappingTextBoxFlag xmlns:ma14="http://schemas.microsoft.com/office/mac/drawingml/2011/main" xmlns="" val="1"/>
+              <ma14:wrappingTextBoxFlag xmlns="" xmlns:ma14="http://schemas.microsoft.com/office/mac/drawingml/2011/main" val="1"/>
             </a:ext>
           </a:extLst>
         </p:spPr>
@@ -34332,7 +34388,7 @@
           </a:ln>
           <a:extLst>
             <a:ext uri="{C572A759-6A51-4108-AA02-DFA0A04FC94B}">
-              <ma14:wrappingTextBoxFlag xmlns:ma14="http://schemas.microsoft.com/office/mac/drawingml/2011/main" xmlns="" val="1"/>
+              <ma14:wrappingTextBoxFlag xmlns="" xmlns:ma14="http://schemas.microsoft.com/office/mac/drawingml/2011/main" val="1"/>
             </a:ext>
           </a:extLst>
         </p:spPr>
@@ -34683,7 +34739,7 @@
           </a:ln>
           <a:extLst>
             <a:ext uri="{C572A759-6A51-4108-AA02-DFA0A04FC94B}">
-              <ma14:wrappingTextBoxFlag xmlns:ma14="http://schemas.microsoft.com/office/mac/drawingml/2011/main" xmlns="" val="1"/>
+              <ma14:wrappingTextBoxFlag xmlns="" xmlns:ma14="http://schemas.microsoft.com/office/mac/drawingml/2011/main" val="1"/>
             </a:ext>
           </a:extLst>
         </p:spPr>
@@ -34782,7 +34838,7 @@
           </a:ln>
           <a:extLst>
             <a:ext uri="{C572A759-6A51-4108-AA02-DFA0A04FC94B}">
-              <ma14:wrappingTextBoxFlag xmlns:ma14="http://schemas.microsoft.com/office/mac/drawingml/2011/main" xmlns="" val="1"/>
+              <ma14:wrappingTextBoxFlag xmlns="" xmlns:ma14="http://schemas.microsoft.com/office/mac/drawingml/2011/main" val="1"/>
             </a:ext>
           </a:extLst>
         </p:spPr>
@@ -34826,7 +34882,7 @@
           </a:ln>
           <a:extLst>
             <a:ext uri="{C572A759-6A51-4108-AA02-DFA0A04FC94B}">
-              <ma14:wrappingTextBoxFlag xmlns:ma14="http://schemas.microsoft.com/office/mac/drawingml/2011/main" xmlns="" val="1"/>
+              <ma14:wrappingTextBoxFlag xmlns="" xmlns:ma14="http://schemas.microsoft.com/office/mac/drawingml/2011/main" val="1"/>
             </a:ext>
           </a:extLst>
         </p:spPr>
@@ -34871,7 +34927,7 @@
           </a:ln>
           <a:extLst>
             <a:ext uri="{C572A759-6A51-4108-AA02-DFA0A04FC94B}">
-              <ma14:wrappingTextBoxFlag xmlns:ma14="http://schemas.microsoft.com/office/mac/drawingml/2011/main" xmlns="" val="1"/>
+              <ma14:wrappingTextBoxFlag xmlns="" xmlns:ma14="http://schemas.microsoft.com/office/mac/drawingml/2011/main" val="1"/>
             </a:ext>
           </a:extLst>
         </p:spPr>
@@ -34951,7 +35007,7 @@
           </a:ln>
           <a:extLst>
             <a:ext uri="{C572A759-6A51-4108-AA02-DFA0A04FC94B}">
-              <ma14:wrappingTextBoxFlag xmlns:ma14="http://schemas.microsoft.com/office/mac/drawingml/2011/main" xmlns="" val="1"/>
+              <ma14:wrappingTextBoxFlag xmlns="" xmlns:ma14="http://schemas.microsoft.com/office/mac/drawingml/2011/main" val="1"/>
             </a:ext>
           </a:extLst>
         </p:spPr>
@@ -35039,7 +35095,7 @@
           </a:ln>
           <a:extLst>
             <a:ext uri="{C572A759-6A51-4108-AA02-DFA0A04FC94B}">
-              <ma14:wrappingTextBoxFlag xmlns:ma14="http://schemas.microsoft.com/office/mac/drawingml/2011/main" xmlns="" val="1"/>
+              <ma14:wrappingTextBoxFlag xmlns="" xmlns:ma14="http://schemas.microsoft.com/office/mac/drawingml/2011/main" val="1"/>
             </a:ext>
           </a:extLst>
         </p:spPr>
@@ -35084,7 +35140,7 @@
           </a:ln>
           <a:extLst>
             <a:ext uri="{C572A759-6A51-4108-AA02-DFA0A04FC94B}">
-              <ma14:wrappingTextBoxFlag xmlns:ma14="http://schemas.microsoft.com/office/mac/drawingml/2011/main" xmlns="" val="1"/>
+              <ma14:wrappingTextBoxFlag xmlns="" xmlns:ma14="http://schemas.microsoft.com/office/mac/drawingml/2011/main" val="1"/>
             </a:ext>
           </a:extLst>
         </p:spPr>
@@ -35129,7 +35185,7 @@
           </a:ln>
           <a:extLst>
             <a:ext uri="{C572A759-6A51-4108-AA02-DFA0A04FC94B}">
-              <ma14:wrappingTextBoxFlag xmlns:ma14="http://schemas.microsoft.com/office/mac/drawingml/2011/main" xmlns="" val="1"/>
+              <ma14:wrappingTextBoxFlag xmlns="" xmlns:ma14="http://schemas.microsoft.com/office/mac/drawingml/2011/main" val="1"/>
             </a:ext>
           </a:extLst>
         </p:spPr>
@@ -35209,7 +35265,7 @@
           </a:ln>
           <a:extLst>
             <a:ext uri="{C572A759-6A51-4108-AA02-DFA0A04FC94B}">
-              <ma14:wrappingTextBoxFlag xmlns:ma14="http://schemas.microsoft.com/office/mac/drawingml/2011/main" xmlns="" val="1"/>
+              <ma14:wrappingTextBoxFlag xmlns="" xmlns:ma14="http://schemas.microsoft.com/office/mac/drawingml/2011/main" val="1"/>
             </a:ext>
           </a:extLst>
         </p:spPr>
@@ -35522,7 +35578,7 @@
           </a:ln>
           <a:extLst>
             <a:ext uri="{C572A759-6A51-4108-AA02-DFA0A04FC94B}">
-              <ma14:wrappingTextBoxFlag xmlns:ma14="http://schemas.microsoft.com/office/mac/drawingml/2011/main" xmlns="" val="1"/>
+              <ma14:wrappingTextBoxFlag xmlns="" xmlns:ma14="http://schemas.microsoft.com/office/mac/drawingml/2011/main" val="1"/>
             </a:ext>
           </a:extLst>
         </p:spPr>
@@ -35717,7 +35773,7 @@
           </a:ln>
           <a:extLst>
             <a:ext uri="{C572A759-6A51-4108-AA02-DFA0A04FC94B}">
-              <ma14:wrappingTextBoxFlag xmlns:ma14="http://schemas.microsoft.com/office/mac/drawingml/2011/main" xmlns="" val="1"/>
+              <ma14:wrappingTextBoxFlag xmlns="" xmlns:ma14="http://schemas.microsoft.com/office/mac/drawingml/2011/main" val="1"/>
             </a:ext>
           </a:extLst>
         </p:spPr>
@@ -35761,7 +35817,7 @@
           </a:ln>
           <a:extLst>
             <a:ext uri="{C572A759-6A51-4108-AA02-DFA0A04FC94B}">
-              <ma14:wrappingTextBoxFlag xmlns:ma14="http://schemas.microsoft.com/office/mac/drawingml/2011/main" xmlns="" val="1"/>
+              <ma14:wrappingTextBoxFlag xmlns="" xmlns:ma14="http://schemas.microsoft.com/office/mac/drawingml/2011/main" val="1"/>
             </a:ext>
           </a:extLst>
         </p:spPr>
@@ -35806,7 +35862,7 @@
           </a:ln>
           <a:extLst>
             <a:ext uri="{C572A759-6A51-4108-AA02-DFA0A04FC94B}">
-              <ma14:wrappingTextBoxFlag xmlns:ma14="http://schemas.microsoft.com/office/mac/drawingml/2011/main" xmlns="" val="1"/>
+              <ma14:wrappingTextBoxFlag xmlns="" xmlns:ma14="http://schemas.microsoft.com/office/mac/drawingml/2011/main" val="1"/>
             </a:ext>
           </a:extLst>
         </p:spPr>
@@ -35886,7 +35942,7 @@
           </a:ln>
           <a:extLst>
             <a:ext uri="{C572A759-6A51-4108-AA02-DFA0A04FC94B}">
-              <ma14:wrappingTextBoxFlag xmlns:ma14="http://schemas.microsoft.com/office/mac/drawingml/2011/main" xmlns="" val="1"/>
+              <ma14:wrappingTextBoxFlag xmlns="" xmlns:ma14="http://schemas.microsoft.com/office/mac/drawingml/2011/main" val="1"/>
             </a:ext>
           </a:extLst>
         </p:spPr>
@@ -35974,7 +36030,7 @@
           </a:ln>
           <a:extLst>
             <a:ext uri="{C572A759-6A51-4108-AA02-DFA0A04FC94B}">
-              <ma14:wrappingTextBoxFlag xmlns:ma14="http://schemas.microsoft.com/office/mac/drawingml/2011/main" xmlns="" val="1"/>
+              <ma14:wrappingTextBoxFlag xmlns="" xmlns:ma14="http://schemas.microsoft.com/office/mac/drawingml/2011/main" val="1"/>
             </a:ext>
           </a:extLst>
         </p:spPr>
@@ -36019,7 +36075,7 @@
           </a:ln>
           <a:extLst>
             <a:ext uri="{C572A759-6A51-4108-AA02-DFA0A04FC94B}">
-              <ma14:wrappingTextBoxFlag xmlns:ma14="http://schemas.microsoft.com/office/mac/drawingml/2011/main" xmlns="" val="1"/>
+              <ma14:wrappingTextBoxFlag xmlns="" xmlns:ma14="http://schemas.microsoft.com/office/mac/drawingml/2011/main" val="1"/>
             </a:ext>
           </a:extLst>
         </p:spPr>
@@ -36064,7 +36120,7 @@
           </a:ln>
           <a:extLst>
             <a:ext uri="{C572A759-6A51-4108-AA02-DFA0A04FC94B}">
-              <ma14:wrappingTextBoxFlag xmlns:ma14="http://schemas.microsoft.com/office/mac/drawingml/2011/main" xmlns="" val="1"/>
+              <ma14:wrappingTextBoxFlag xmlns="" xmlns:ma14="http://schemas.microsoft.com/office/mac/drawingml/2011/main" val="1"/>
             </a:ext>
           </a:extLst>
         </p:spPr>
@@ -36144,7 +36200,7 @@
           </a:ln>
           <a:extLst>
             <a:ext uri="{C572A759-6A51-4108-AA02-DFA0A04FC94B}">
-              <ma14:wrappingTextBoxFlag xmlns:ma14="http://schemas.microsoft.com/office/mac/drawingml/2011/main" xmlns="" val="1"/>
+              <ma14:wrappingTextBoxFlag xmlns="" xmlns:ma14="http://schemas.microsoft.com/office/mac/drawingml/2011/main" val="1"/>
             </a:ext>
           </a:extLst>
         </p:spPr>
@@ -36457,7 +36513,7 @@
           </a:ln>
           <a:extLst>
             <a:ext uri="{C572A759-6A51-4108-AA02-DFA0A04FC94B}">
-              <ma14:wrappingTextBoxFlag xmlns:ma14="http://schemas.microsoft.com/office/mac/drawingml/2011/main" xmlns="" val="1"/>
+              <ma14:wrappingTextBoxFlag xmlns="" xmlns:ma14="http://schemas.microsoft.com/office/mac/drawingml/2011/main" val="1"/>
             </a:ext>
           </a:extLst>
         </p:spPr>
@@ -36652,7 +36708,7 @@
           </a:ln>
           <a:extLst>
             <a:ext uri="{C572A759-6A51-4108-AA02-DFA0A04FC94B}">
-              <ma14:wrappingTextBoxFlag xmlns:ma14="http://schemas.microsoft.com/office/mac/drawingml/2011/main" xmlns="" val="1"/>
+              <ma14:wrappingTextBoxFlag xmlns="" xmlns:ma14="http://schemas.microsoft.com/office/mac/drawingml/2011/main" val="1"/>
             </a:ext>
           </a:extLst>
         </p:spPr>
@@ -36696,7 +36752,7 @@
           </a:ln>
           <a:extLst>
             <a:ext uri="{C572A759-6A51-4108-AA02-DFA0A04FC94B}">
-              <ma14:wrappingTextBoxFlag xmlns:ma14="http://schemas.microsoft.com/office/mac/drawingml/2011/main" xmlns="" val="1"/>
+              <ma14:wrappingTextBoxFlag xmlns="" xmlns:ma14="http://schemas.microsoft.com/office/mac/drawingml/2011/main" val="1"/>
             </a:ext>
           </a:extLst>
         </p:spPr>
@@ -36741,7 +36797,7 @@
           </a:ln>
           <a:extLst>
             <a:ext uri="{C572A759-6A51-4108-AA02-DFA0A04FC94B}">
-              <ma14:wrappingTextBoxFlag xmlns:ma14="http://schemas.microsoft.com/office/mac/drawingml/2011/main" xmlns="" val="1"/>
+              <ma14:wrappingTextBoxFlag xmlns="" xmlns:ma14="http://schemas.microsoft.com/office/mac/drawingml/2011/main" val="1"/>
             </a:ext>
           </a:extLst>
         </p:spPr>
@@ -36821,7 +36877,7 @@
           </a:ln>
           <a:extLst>
             <a:ext uri="{C572A759-6A51-4108-AA02-DFA0A04FC94B}">
-              <ma14:wrappingTextBoxFlag xmlns:ma14="http://schemas.microsoft.com/office/mac/drawingml/2011/main" xmlns="" val="1"/>
+              <ma14:wrappingTextBoxFlag xmlns="" xmlns:ma14="http://schemas.microsoft.com/office/mac/drawingml/2011/main" val="1"/>
             </a:ext>
           </a:extLst>
         </p:spPr>
@@ -36909,7 +36965,7 @@
           </a:ln>
           <a:extLst>
             <a:ext uri="{C572A759-6A51-4108-AA02-DFA0A04FC94B}">
-              <ma14:wrappingTextBoxFlag xmlns:ma14="http://schemas.microsoft.com/office/mac/drawingml/2011/main" xmlns="" val="1"/>
+              <ma14:wrappingTextBoxFlag xmlns="" xmlns:ma14="http://schemas.microsoft.com/office/mac/drawingml/2011/main" val="1"/>
             </a:ext>
           </a:extLst>
         </p:spPr>
@@ -36954,7 +37010,7 @@
           </a:ln>
           <a:extLst>
             <a:ext uri="{C572A759-6A51-4108-AA02-DFA0A04FC94B}">
-              <ma14:wrappingTextBoxFlag xmlns:ma14="http://schemas.microsoft.com/office/mac/drawingml/2011/main" xmlns="" val="1"/>
+              <ma14:wrappingTextBoxFlag xmlns="" xmlns:ma14="http://schemas.microsoft.com/office/mac/drawingml/2011/main" val="1"/>
             </a:ext>
           </a:extLst>
         </p:spPr>
@@ -37034,7 +37090,7 @@
           </a:ln>
           <a:extLst>
             <a:ext uri="{C572A759-6A51-4108-AA02-DFA0A04FC94B}">
-              <ma14:wrappingTextBoxFlag xmlns:ma14="http://schemas.microsoft.com/office/mac/drawingml/2011/main" xmlns="" val="1"/>
+              <ma14:wrappingTextBoxFlag xmlns="" xmlns:ma14="http://schemas.microsoft.com/office/mac/drawingml/2011/main" val="1"/>
             </a:ext>
           </a:extLst>
         </p:spPr>
@@ -37393,7 +37449,7 @@
           </a:ln>
           <a:extLst>
             <a:ext uri="{C572A759-6A51-4108-AA02-DFA0A04FC94B}">
-              <ma14:wrappingTextBoxFlag xmlns:ma14="http://schemas.microsoft.com/office/mac/drawingml/2011/main" xmlns="" val="1"/>
+              <ma14:wrappingTextBoxFlag xmlns="" xmlns:ma14="http://schemas.microsoft.com/office/mac/drawingml/2011/main" val="1"/>
             </a:ext>
           </a:extLst>
         </p:spPr>
@@ -37437,7 +37493,7 @@
           </a:ln>
           <a:extLst>
             <a:ext uri="{C572A759-6A51-4108-AA02-DFA0A04FC94B}">
-              <ma14:wrappingTextBoxFlag xmlns:ma14="http://schemas.microsoft.com/office/mac/drawingml/2011/main" xmlns="" val="1"/>
+              <ma14:wrappingTextBoxFlag xmlns="" xmlns:ma14="http://schemas.microsoft.com/office/mac/drawingml/2011/main" val="1"/>
             </a:ext>
           </a:extLst>
         </p:spPr>
@@ -37482,7 +37538,7 @@
           </a:ln>
           <a:extLst>
             <a:ext uri="{C572A759-6A51-4108-AA02-DFA0A04FC94B}">
-              <ma14:wrappingTextBoxFlag xmlns:ma14="http://schemas.microsoft.com/office/mac/drawingml/2011/main" xmlns="" val="1"/>
+              <ma14:wrappingTextBoxFlag xmlns="" xmlns:ma14="http://schemas.microsoft.com/office/mac/drawingml/2011/main" val="1"/>
             </a:ext>
           </a:extLst>
         </p:spPr>
@@ -37562,7 +37618,7 @@
           </a:ln>
           <a:extLst>
             <a:ext uri="{C572A759-6A51-4108-AA02-DFA0A04FC94B}">
-              <ma14:wrappingTextBoxFlag xmlns:ma14="http://schemas.microsoft.com/office/mac/drawingml/2011/main" xmlns="" val="1"/>
+              <ma14:wrappingTextBoxFlag xmlns="" xmlns:ma14="http://schemas.microsoft.com/office/mac/drawingml/2011/main" val="1"/>
             </a:ext>
           </a:extLst>
         </p:spPr>
@@ -37650,7 +37706,7 @@
           </a:ln>
           <a:extLst>
             <a:ext uri="{C572A759-6A51-4108-AA02-DFA0A04FC94B}">
-              <ma14:wrappingTextBoxFlag xmlns:ma14="http://schemas.microsoft.com/office/mac/drawingml/2011/main" xmlns="" val="1"/>
+              <ma14:wrappingTextBoxFlag xmlns="" xmlns:ma14="http://schemas.microsoft.com/office/mac/drawingml/2011/main" val="1"/>
             </a:ext>
           </a:extLst>
         </p:spPr>
@@ -37695,7 +37751,7 @@
           </a:ln>
           <a:extLst>
             <a:ext uri="{C572A759-6A51-4108-AA02-DFA0A04FC94B}">
-              <ma14:wrappingTextBoxFlag xmlns:ma14="http://schemas.microsoft.com/office/mac/drawingml/2011/main" xmlns="" val="1"/>
+              <ma14:wrappingTextBoxFlag xmlns="" xmlns:ma14="http://schemas.microsoft.com/office/mac/drawingml/2011/main" val="1"/>
             </a:ext>
           </a:extLst>
         </p:spPr>
@@ -37775,7 +37831,7 @@
           </a:ln>
           <a:extLst>
             <a:ext uri="{C572A759-6A51-4108-AA02-DFA0A04FC94B}">
-              <ma14:wrappingTextBoxFlag xmlns:ma14="http://schemas.microsoft.com/office/mac/drawingml/2011/main" xmlns="" val="1"/>
+              <ma14:wrappingTextBoxFlag xmlns="" xmlns:ma14="http://schemas.microsoft.com/office/mac/drawingml/2011/main" val="1"/>
             </a:ext>
           </a:extLst>
         </p:spPr>
@@ -38582,7 +38638,7 @@
           </a:ln>
           <a:extLst>
             <a:ext uri="{C572A759-6A51-4108-AA02-DFA0A04FC94B}">
-              <ma14:wrappingTextBoxFlag xmlns:ma14="http://schemas.microsoft.com/office/mac/drawingml/2011/main" xmlns="" val="1"/>
+              <ma14:wrappingTextBoxFlag xmlns="" xmlns:ma14="http://schemas.microsoft.com/office/mac/drawingml/2011/main" val="1"/>
             </a:ext>
           </a:extLst>
         </p:spPr>
@@ -38623,7 +38679,7 @@
           </a:ln>
           <a:extLst>
             <a:ext uri="{C572A759-6A51-4108-AA02-DFA0A04FC94B}">
-              <ma14:wrappingTextBoxFlag xmlns:ma14="http://schemas.microsoft.com/office/mac/drawingml/2011/main" xmlns="" val="1"/>
+              <ma14:wrappingTextBoxFlag xmlns="" xmlns:ma14="http://schemas.microsoft.com/office/mac/drawingml/2011/main" val="1"/>
             </a:ext>
           </a:extLst>
         </p:spPr>
@@ -39143,7 +39199,7 @@
           </a:ln>
           <a:extLst>
             <a:ext uri="{C572A759-6A51-4108-AA02-DFA0A04FC94B}">
-              <ma14:wrappingTextBoxFlag xmlns:ma14="http://schemas.microsoft.com/office/mac/drawingml/2011/main" xmlns="" val="1"/>
+              <ma14:wrappingTextBoxFlag xmlns="" xmlns:ma14="http://schemas.microsoft.com/office/mac/drawingml/2011/main" val="1"/>
             </a:ext>
           </a:extLst>
         </p:spPr>
@@ -39184,7 +39240,7 @@
           </a:ln>
           <a:extLst>
             <a:ext uri="{C572A759-6A51-4108-AA02-DFA0A04FC94B}">
-              <ma14:wrappingTextBoxFlag xmlns:ma14="http://schemas.microsoft.com/office/mac/drawingml/2011/main" xmlns="" val="1"/>
+              <ma14:wrappingTextBoxFlag xmlns="" xmlns:ma14="http://schemas.microsoft.com/office/mac/drawingml/2011/main" val="1"/>
             </a:ext>
           </a:extLst>
         </p:spPr>
@@ -39315,7 +39371,7 @@
           </a:ln>
           <a:extLst>
             <a:ext uri="{C572A759-6A51-4108-AA02-DFA0A04FC94B}">
-              <ma14:wrappingTextBoxFlag xmlns:ma14="http://schemas.microsoft.com/office/mac/drawingml/2011/main" xmlns="" val="1"/>
+              <ma14:wrappingTextBoxFlag xmlns="" xmlns:ma14="http://schemas.microsoft.com/office/mac/drawingml/2011/main" val="1"/>
             </a:ext>
           </a:extLst>
         </p:spPr>
@@ -39559,7 +39615,7 @@
           </a:ln>
           <a:extLst>
             <a:ext uri="{C572A759-6A51-4108-AA02-DFA0A04FC94B}">
-              <ma14:wrappingTextBoxFlag xmlns:ma14="http://schemas.microsoft.com/office/mac/drawingml/2011/main" xmlns="" val="1"/>
+              <ma14:wrappingTextBoxFlag xmlns="" xmlns:ma14="http://schemas.microsoft.com/office/mac/drawingml/2011/main" val="1"/>
             </a:ext>
           </a:extLst>
         </p:spPr>
@@ -39615,7 +39671,7 @@
           </a:ln>
           <a:extLst>
             <a:ext uri="{C572A759-6A51-4108-AA02-DFA0A04FC94B}">
-              <ma14:wrappingTextBoxFlag xmlns:ma14="http://schemas.microsoft.com/office/mac/drawingml/2011/main" xmlns="" val="1"/>
+              <ma14:wrappingTextBoxFlag xmlns="" xmlns:ma14="http://schemas.microsoft.com/office/mac/drawingml/2011/main" val="1"/>
             </a:ext>
           </a:extLst>
         </p:spPr>
@@ -39698,7 +39754,7 @@
           </a:ln>
           <a:extLst>
             <a:ext uri="{C572A759-6A51-4108-AA02-DFA0A04FC94B}">
-              <ma14:wrappingTextBoxFlag xmlns:ma14="http://schemas.microsoft.com/office/mac/drawingml/2011/main" xmlns="" val="1"/>
+              <ma14:wrappingTextBoxFlag xmlns="" xmlns:ma14="http://schemas.microsoft.com/office/mac/drawingml/2011/main" val="1"/>
             </a:ext>
           </a:extLst>
         </p:spPr>
@@ -39749,7 +39805,7 @@
           </a:ln>
           <a:extLst>
             <a:ext uri="{C572A759-6A51-4108-AA02-DFA0A04FC94B}">
-              <ma14:wrappingTextBoxFlag xmlns:ma14="http://schemas.microsoft.com/office/mac/drawingml/2011/main" xmlns="" val="1"/>
+              <ma14:wrappingTextBoxFlag xmlns="" xmlns:ma14="http://schemas.microsoft.com/office/mac/drawingml/2011/main" val="1"/>
             </a:ext>
           </a:extLst>
         </p:spPr>
@@ -39800,7 +39856,7 @@
           </a:ln>
           <a:extLst>
             <a:ext uri="{C572A759-6A51-4108-AA02-DFA0A04FC94B}">
-              <ma14:wrappingTextBoxFlag xmlns:ma14="http://schemas.microsoft.com/office/mac/drawingml/2011/main" xmlns="" val="1"/>
+              <ma14:wrappingTextBoxFlag xmlns="" xmlns:ma14="http://schemas.microsoft.com/office/mac/drawingml/2011/main" val="1"/>
             </a:ext>
           </a:extLst>
         </p:spPr>
@@ -39966,7 +40022,7 @@
           </a:ln>
           <a:extLst>
             <a:ext uri="{C572A759-6A51-4108-AA02-DFA0A04FC94B}">
-              <ma14:wrappingTextBoxFlag xmlns:ma14="http://schemas.microsoft.com/office/mac/drawingml/2011/main" xmlns="" val="1"/>
+              <ma14:wrappingTextBoxFlag xmlns="" xmlns:ma14="http://schemas.microsoft.com/office/mac/drawingml/2011/main" val="1"/>
             </a:ext>
           </a:extLst>
         </p:spPr>
@@ -40010,7 +40066,7 @@
           </a:ln>
           <a:extLst>
             <a:ext uri="{C572A759-6A51-4108-AA02-DFA0A04FC94B}">
-              <ma14:wrappingTextBoxFlag xmlns:ma14="http://schemas.microsoft.com/office/mac/drawingml/2011/main" xmlns="" val="1"/>
+              <ma14:wrappingTextBoxFlag xmlns="" xmlns:ma14="http://schemas.microsoft.com/office/mac/drawingml/2011/main" val="1"/>
             </a:ext>
           </a:extLst>
         </p:spPr>
@@ -40100,7 +40156,7 @@
           </a:ln>
           <a:extLst>
             <a:ext uri="{C572A759-6A51-4108-AA02-DFA0A04FC94B}">
-              <ma14:wrappingTextBoxFlag xmlns:ma14="http://schemas.microsoft.com/office/mac/drawingml/2011/main" xmlns="" val="1"/>
+              <ma14:wrappingTextBoxFlag xmlns="" xmlns:ma14="http://schemas.microsoft.com/office/mac/drawingml/2011/main" val="1"/>
             </a:ext>
           </a:extLst>
         </p:spPr>
@@ -40272,7 +40328,7 @@
           </a:ln>
           <a:extLst>
             <a:ext uri="{C572A759-6A51-4108-AA02-DFA0A04FC94B}">
-              <ma14:wrappingTextBoxFlag xmlns:ma14="http://schemas.microsoft.com/office/mac/drawingml/2011/main" xmlns="" val="1"/>
+              <ma14:wrappingTextBoxFlag xmlns="" xmlns:ma14="http://schemas.microsoft.com/office/mac/drawingml/2011/main" val="1"/>
             </a:ext>
           </a:extLst>
         </p:spPr>
@@ -40366,7 +40422,7 @@
           </a:ln>
           <a:extLst>
             <a:ext uri="{C572A759-6A51-4108-AA02-DFA0A04FC94B}">
-              <ma14:wrappingTextBoxFlag xmlns:ma14="http://schemas.microsoft.com/office/mac/drawingml/2011/main" xmlns="" val="1"/>
+              <ma14:wrappingTextBoxFlag xmlns="" xmlns:ma14="http://schemas.microsoft.com/office/mac/drawingml/2011/main" val="1"/>
             </a:ext>
           </a:extLst>
         </p:spPr>
@@ -40848,7 +40904,7 @@
           </a:ln>
           <a:extLst>
             <a:ext uri="{C572A759-6A51-4108-AA02-DFA0A04FC94B}">
-              <ma14:wrappingTextBoxFlag xmlns:ma14="http://schemas.microsoft.com/office/mac/drawingml/2011/main" xmlns="" val="1"/>
+              <ma14:wrappingTextBoxFlag xmlns="" xmlns:ma14="http://schemas.microsoft.com/office/mac/drawingml/2011/main" val="1"/>
             </a:ext>
           </a:extLst>
         </p:spPr>
@@ -40894,7 +40950,7 @@
           </a:ln>
           <a:extLst>
             <a:ext uri="{C572A759-6A51-4108-AA02-DFA0A04FC94B}">
-              <ma14:wrappingTextBoxFlag xmlns:ma14="http://schemas.microsoft.com/office/mac/drawingml/2011/main" xmlns="" val="1"/>
+              <ma14:wrappingTextBoxFlag xmlns="" xmlns:ma14="http://schemas.microsoft.com/office/mac/drawingml/2011/main" val="1"/>
             </a:ext>
           </a:extLst>
         </p:spPr>
@@ -40940,7 +40996,7 @@
           </a:ln>
           <a:extLst>
             <a:ext uri="{C572A759-6A51-4108-AA02-DFA0A04FC94B}">
-              <ma14:wrappingTextBoxFlag xmlns:ma14="http://schemas.microsoft.com/office/mac/drawingml/2011/main" xmlns="" val="1"/>
+              <ma14:wrappingTextBoxFlag xmlns="" xmlns:ma14="http://schemas.microsoft.com/office/mac/drawingml/2011/main" val="1"/>
             </a:ext>
           </a:extLst>
         </p:spPr>
@@ -41000,7 +41056,7 @@
           </a:ln>
           <a:extLst>
             <a:ext uri="{C572A759-6A51-4108-AA02-DFA0A04FC94B}">
-              <ma14:wrappingTextBoxFlag xmlns:ma14="http://schemas.microsoft.com/office/mac/drawingml/2011/main" xmlns="" val="1"/>
+              <ma14:wrappingTextBoxFlag xmlns="" xmlns:ma14="http://schemas.microsoft.com/office/mac/drawingml/2011/main" val="1"/>
             </a:ext>
           </a:extLst>
         </p:spPr>

</xml_diff>